<commit_message>
Recherches sur Design Pattern Observateur
</commit_message>
<xml_diff>
--- a/106_DesignPattern/Cours/Observateur/Observateur.pptx
+++ b/106_DesignPattern/Cours/Observateur/Observateur.pptx
@@ -7,7 +7,9 @@
   <p:sldIdLst>
     <p:sldId id="256" r:id="rId2"/>
     <p:sldId id="258" r:id="rId3"/>
-    <p:sldId id="259" r:id="rId4"/>
+    <p:sldId id="260" r:id="rId4"/>
+    <p:sldId id="261" r:id="rId5"/>
+    <p:sldId id="259" r:id="rId6"/>
   </p:sldIdLst>
   <p:sldSz cx="12192000" cy="6858000"/>
   <p:notesSz cx="6858000" cy="9144000"/>
@@ -106,7 +108,759 @@
       </a:defRPr>
     </a:lvl9pPr>
   </p:defaultTextStyle>
+  <p:extLst>
+    <p:ext uri="{EFAFB233-063F-42B5-8137-9DF3F51BA10A}">
+      <p15:sldGuideLst xmlns:p15="http://schemas.microsoft.com/office/powerpoint/2012/main"/>
+    </p:ext>
+  </p:extLst>
 </p:presentation>
+</file>
+
+<file path=ppt/revisionInfo.xml><?xml version="1.0" encoding="utf-8"?>
+<p1510:revInfo xmlns:a="http://schemas.openxmlformats.org/drawingml/2006/main" xmlns:r="http://schemas.openxmlformats.org/officeDocument/2006/relationships" xmlns:p1510="http://schemas.microsoft.com/office/powerpoint/2015/10/main">
+  <p1510:revLst>
+    <p1510:client id="{FC976D47-49AC-41B6-B5F5-80E15325E9E0}" v="28" dt="2023-07-20T05:46:06.247"/>
+  </p1510:revLst>
+</p1510:revInfo>
+</file>
+
+<file path=ppt/changesInfos/changesInfo1.xml><?xml version="1.0" encoding="utf-8"?>
+<pc:chgInfo xmlns:a="http://schemas.openxmlformats.org/drawingml/2006/main" xmlns:r="http://schemas.openxmlformats.org/officeDocument/2006/relationships" xmlns:ac="http://schemas.microsoft.com/office/drawing/2013/main/command" xmlns:pc="http://schemas.microsoft.com/office/powerpoint/2013/main/command">
+  <pc:docChgLst>
+    <pc:chgData name="David CRAVO" userId="ba75d8fe6eadcc5e" providerId="LiveId" clId="{FC976D47-49AC-41B6-B5F5-80E15325E9E0}"/>
+    <pc:docChg chg="undo custSel addSld modSld">
+      <pc:chgData name="David CRAVO" userId="ba75d8fe6eadcc5e" providerId="LiveId" clId="{FC976D47-49AC-41B6-B5F5-80E15325E9E0}" dt="2023-07-20T05:47:47.425" v="398" actId="1076"/>
+      <pc:docMkLst>
+        <pc:docMk/>
+      </pc:docMkLst>
+      <pc:sldChg chg="addSp delSp modSp mod">
+        <pc:chgData name="David CRAVO" userId="ba75d8fe6eadcc5e" providerId="LiveId" clId="{FC976D47-49AC-41B6-B5F5-80E15325E9E0}" dt="2023-07-19T20:30:23.310" v="211" actId="1582"/>
+        <pc:sldMkLst>
+          <pc:docMk/>
+          <pc:sldMk cId="991438220" sldId="258"/>
+        </pc:sldMkLst>
+        <pc:spChg chg="mod">
+          <ac:chgData name="David CRAVO" userId="ba75d8fe6eadcc5e" providerId="LiveId" clId="{FC976D47-49AC-41B6-B5F5-80E15325E9E0}" dt="2023-07-19T20:12:56.114" v="136" actId="1076"/>
+          <ac:spMkLst>
+            <pc:docMk/>
+            <pc:sldMk cId="991438220" sldId="258"/>
+            <ac:spMk id="4" creationId="{FF128ED7-1627-A072-0893-6EE9F8332AD7}"/>
+          </ac:spMkLst>
+        </pc:spChg>
+        <pc:spChg chg="mod">
+          <ac:chgData name="David CRAVO" userId="ba75d8fe6eadcc5e" providerId="LiveId" clId="{FC976D47-49AC-41B6-B5F5-80E15325E9E0}" dt="2023-07-19T20:04:00.739" v="57" actId="1076"/>
+          <ac:spMkLst>
+            <pc:docMk/>
+            <pc:sldMk cId="991438220" sldId="258"/>
+            <ac:spMk id="5" creationId="{057CC279-BCE0-5BE1-C62D-C8EE18066C7A}"/>
+          </ac:spMkLst>
+        </pc:spChg>
+        <pc:spChg chg="mod">
+          <ac:chgData name="David CRAVO" userId="ba75d8fe6eadcc5e" providerId="LiveId" clId="{FC976D47-49AC-41B6-B5F5-80E15325E9E0}" dt="2023-07-19T20:13:03.533" v="138" actId="20577"/>
+          <ac:spMkLst>
+            <pc:docMk/>
+            <pc:sldMk cId="991438220" sldId="258"/>
+            <ac:spMk id="6" creationId="{ED4996EA-B60A-E71D-2CA0-559AC16AB894}"/>
+          </ac:spMkLst>
+        </pc:spChg>
+        <pc:spChg chg="mod">
+          <ac:chgData name="David CRAVO" userId="ba75d8fe6eadcc5e" providerId="LiveId" clId="{FC976D47-49AC-41B6-B5F5-80E15325E9E0}" dt="2023-07-19T20:04:57.599" v="67"/>
+          <ac:spMkLst>
+            <pc:docMk/>
+            <pc:sldMk cId="991438220" sldId="258"/>
+            <ac:spMk id="7" creationId="{82564053-97EE-B258-7E98-6803E85AA713}"/>
+          </ac:spMkLst>
+        </pc:spChg>
+        <pc:spChg chg="del mod">
+          <ac:chgData name="David CRAVO" userId="ba75d8fe6eadcc5e" providerId="LiveId" clId="{FC976D47-49AC-41B6-B5F5-80E15325E9E0}" dt="2023-07-19T20:04:23.783" v="62" actId="478"/>
+          <ac:spMkLst>
+            <pc:docMk/>
+            <pc:sldMk cId="991438220" sldId="258"/>
+            <ac:spMk id="8" creationId="{28D33C03-2237-F343-4122-6CF5FA42DBA7}"/>
+          </ac:spMkLst>
+        </pc:spChg>
+        <pc:spChg chg="del">
+          <ac:chgData name="David CRAVO" userId="ba75d8fe6eadcc5e" providerId="LiveId" clId="{FC976D47-49AC-41B6-B5F5-80E15325E9E0}" dt="2023-07-19T20:04:33.019" v="63" actId="478"/>
+          <ac:spMkLst>
+            <pc:docMk/>
+            <pc:sldMk cId="991438220" sldId="258"/>
+            <ac:spMk id="10" creationId="{CBF0FE16-F605-EFD9-9042-3354A2E9FD30}"/>
+          </ac:spMkLst>
+        </pc:spChg>
+        <pc:spChg chg="add mod">
+          <ac:chgData name="David CRAVO" userId="ba75d8fe6eadcc5e" providerId="LiveId" clId="{FC976D47-49AC-41B6-B5F5-80E15325E9E0}" dt="2023-07-19T20:13:10.597" v="140" actId="20577"/>
+          <ac:spMkLst>
+            <pc:docMk/>
+            <pc:sldMk cId="991438220" sldId="258"/>
+            <ac:spMk id="11" creationId="{8D316B63-4121-DBCB-724A-D228723CCEBC}"/>
+          </ac:spMkLst>
+        </pc:spChg>
+        <pc:spChg chg="add mod">
+          <ac:chgData name="David CRAVO" userId="ba75d8fe6eadcc5e" providerId="LiveId" clId="{FC976D47-49AC-41B6-B5F5-80E15325E9E0}" dt="2023-07-19T20:13:16.782" v="142" actId="20577"/>
+          <ac:spMkLst>
+            <pc:docMk/>
+            <pc:sldMk cId="991438220" sldId="258"/>
+            <ac:spMk id="12" creationId="{F88AC6B2-EBA0-0C0C-AC27-2F3A7AF70635}"/>
+          </ac:spMkLst>
+        </pc:spChg>
+        <pc:spChg chg="mod">
+          <ac:chgData name="David CRAVO" userId="ba75d8fe6eadcc5e" providerId="LiveId" clId="{FC976D47-49AC-41B6-B5F5-80E15325E9E0}" dt="2023-07-19T20:07:54.748" v="83" actId="207"/>
+          <ac:spMkLst>
+            <pc:docMk/>
+            <pc:sldMk cId="991438220" sldId="258"/>
+            <ac:spMk id="20" creationId="{4B234187-AA20-D1F0-224E-89D6CF0E80E1}"/>
+          </ac:spMkLst>
+        </pc:spChg>
+        <pc:spChg chg="mod">
+          <ac:chgData name="David CRAVO" userId="ba75d8fe6eadcc5e" providerId="LiveId" clId="{FC976D47-49AC-41B6-B5F5-80E15325E9E0}" dt="2023-07-19T20:11:34.532" v="114" actId="1076"/>
+          <ac:spMkLst>
+            <pc:docMk/>
+            <pc:sldMk cId="991438220" sldId="258"/>
+            <ac:spMk id="23" creationId="{3CC6A6D8-F6C7-D47E-A97B-F20556F96CDA}"/>
+          </ac:spMkLst>
+        </pc:spChg>
+        <pc:spChg chg="mod">
+          <ac:chgData name="David CRAVO" userId="ba75d8fe6eadcc5e" providerId="LiveId" clId="{FC976D47-49AC-41B6-B5F5-80E15325E9E0}" dt="2023-07-19T20:11:57.901" v="115" actId="1076"/>
+          <ac:spMkLst>
+            <pc:docMk/>
+            <pc:sldMk cId="991438220" sldId="258"/>
+            <ac:spMk id="24" creationId="{8A164738-B1CA-07BB-52C5-606C8B66E600}"/>
+          </ac:spMkLst>
+        </pc:spChg>
+        <pc:spChg chg="add mod">
+          <ac:chgData name="David CRAVO" userId="ba75d8fe6eadcc5e" providerId="LiveId" clId="{FC976D47-49AC-41B6-B5F5-80E15325E9E0}" dt="2023-07-19T20:11:09.391" v="109"/>
+          <ac:spMkLst>
+            <pc:docMk/>
+            <pc:sldMk cId="991438220" sldId="258"/>
+            <ac:spMk id="26" creationId="{A1ED68B9-9B02-C6A6-795A-50D117556973}"/>
+          </ac:spMkLst>
+        </pc:spChg>
+        <pc:spChg chg="add mod">
+          <ac:chgData name="David CRAVO" userId="ba75d8fe6eadcc5e" providerId="LiveId" clId="{FC976D47-49AC-41B6-B5F5-80E15325E9E0}" dt="2023-07-19T20:11:28.339" v="113" actId="1076"/>
+          <ac:spMkLst>
+            <pc:docMk/>
+            <pc:sldMk cId="991438220" sldId="258"/>
+            <ac:spMk id="27" creationId="{99555ED7-DC25-75ED-626F-72313E740E87}"/>
+          </ac:spMkLst>
+        </pc:spChg>
+        <pc:spChg chg="add mod">
+          <ac:chgData name="David CRAVO" userId="ba75d8fe6eadcc5e" providerId="LiveId" clId="{FC976D47-49AC-41B6-B5F5-80E15325E9E0}" dt="2023-07-19T20:11:21.909" v="112" actId="1076"/>
+          <ac:spMkLst>
+            <pc:docMk/>
+            <pc:sldMk cId="991438220" sldId="258"/>
+            <ac:spMk id="28" creationId="{5EC815C0-DCE6-5F27-3F0B-30A4DDE28932}"/>
+          </ac:spMkLst>
+        </pc:spChg>
+        <pc:cxnChg chg="mod">
+          <ac:chgData name="David CRAVO" userId="ba75d8fe6eadcc5e" providerId="LiveId" clId="{FC976D47-49AC-41B6-B5F5-80E15325E9E0}" dt="2023-07-19T20:30:23.310" v="211" actId="1582"/>
+          <ac:cxnSpMkLst>
+            <pc:docMk/>
+            <pc:sldMk cId="991438220" sldId="258"/>
+            <ac:cxnSpMk id="14" creationId="{5FB3C4B5-B22F-C581-2ED3-053B65231F62}"/>
+          </ac:cxnSpMkLst>
+        </pc:cxnChg>
+        <pc:cxnChg chg="add mod">
+          <ac:chgData name="David CRAVO" userId="ba75d8fe6eadcc5e" providerId="LiveId" clId="{FC976D47-49AC-41B6-B5F5-80E15325E9E0}" dt="2023-07-19T20:30:23.310" v="211" actId="1582"/>
+          <ac:cxnSpMkLst>
+            <pc:docMk/>
+            <pc:sldMk cId="991438220" sldId="258"/>
+            <ac:cxnSpMk id="15" creationId="{74F64545-63E1-1593-E815-C41C6FE4539C}"/>
+          </ac:cxnSpMkLst>
+        </pc:cxnChg>
+        <pc:cxnChg chg="mod">
+          <ac:chgData name="David CRAVO" userId="ba75d8fe6eadcc5e" providerId="LiveId" clId="{FC976D47-49AC-41B6-B5F5-80E15325E9E0}" dt="2023-07-19T20:30:23.310" v="211" actId="1582"/>
+          <ac:cxnSpMkLst>
+            <pc:docMk/>
+            <pc:sldMk cId="991438220" sldId="258"/>
+            <ac:cxnSpMk id="16" creationId="{6234E92F-A561-4CED-02D9-3DBB05BA7290}"/>
+          </ac:cxnSpMkLst>
+        </pc:cxnChg>
+        <pc:cxnChg chg="mod">
+          <ac:chgData name="David CRAVO" userId="ba75d8fe6eadcc5e" providerId="LiveId" clId="{FC976D47-49AC-41B6-B5F5-80E15325E9E0}" dt="2023-07-19T20:30:23.310" v="211" actId="1582"/>
+          <ac:cxnSpMkLst>
+            <pc:docMk/>
+            <pc:sldMk cId="991438220" sldId="258"/>
+            <ac:cxnSpMk id="18" creationId="{F537C275-EE69-233A-F0B5-290AF637C35A}"/>
+          </ac:cxnSpMkLst>
+        </pc:cxnChg>
+        <pc:cxnChg chg="add mod">
+          <ac:chgData name="David CRAVO" userId="ba75d8fe6eadcc5e" providerId="LiveId" clId="{FC976D47-49AC-41B6-B5F5-80E15325E9E0}" dt="2023-07-19T20:30:23.310" v="211" actId="1582"/>
+          <ac:cxnSpMkLst>
+            <pc:docMk/>
+            <pc:sldMk cId="991438220" sldId="258"/>
+            <ac:cxnSpMk id="19" creationId="{4B78E69C-7175-C43F-98EF-39CC67A8B861}"/>
+          </ac:cxnSpMkLst>
+        </pc:cxnChg>
+        <pc:cxnChg chg="add mod">
+          <ac:chgData name="David CRAVO" userId="ba75d8fe6eadcc5e" providerId="LiveId" clId="{FC976D47-49AC-41B6-B5F5-80E15325E9E0}" dt="2023-07-19T20:30:23.310" v="211" actId="1582"/>
+          <ac:cxnSpMkLst>
+            <pc:docMk/>
+            <pc:sldMk cId="991438220" sldId="258"/>
+            <ac:cxnSpMk id="25" creationId="{DA6A501C-1F70-BC7B-D916-8DBB11FFEB8F}"/>
+          </ac:cxnSpMkLst>
+        </pc:cxnChg>
+      </pc:sldChg>
+      <pc:sldChg chg="addSp modSp new mod">
+        <pc:chgData name="David CRAVO" userId="ba75d8fe6eadcc5e" providerId="LiveId" clId="{FC976D47-49AC-41B6-B5F5-80E15325E9E0}" dt="2023-07-19T20:28:20.856" v="210" actId="208"/>
+        <pc:sldMkLst>
+          <pc:docMk/>
+          <pc:sldMk cId="2829809620" sldId="260"/>
+        </pc:sldMkLst>
+        <pc:spChg chg="add mod">
+          <ac:chgData name="David CRAVO" userId="ba75d8fe6eadcc5e" providerId="LiveId" clId="{FC976D47-49AC-41B6-B5F5-80E15325E9E0}" dt="2023-07-19T20:17:41.901" v="144"/>
+          <ac:spMkLst>
+            <pc:docMk/>
+            <pc:sldMk cId="2829809620" sldId="260"/>
+            <ac:spMk id="2" creationId="{ECA2B811-7811-2F67-357B-673176043A00}"/>
+          </ac:spMkLst>
+        </pc:spChg>
+        <pc:spChg chg="add mod">
+          <ac:chgData name="David CRAVO" userId="ba75d8fe6eadcc5e" providerId="LiveId" clId="{FC976D47-49AC-41B6-B5F5-80E15325E9E0}" dt="2023-07-19T20:17:41.901" v="144"/>
+          <ac:spMkLst>
+            <pc:docMk/>
+            <pc:sldMk cId="2829809620" sldId="260"/>
+            <ac:spMk id="3" creationId="{07FA8C73-8B87-53DE-E9B9-A2872F22116D}"/>
+          </ac:spMkLst>
+        </pc:spChg>
+        <pc:spChg chg="add mod">
+          <ac:chgData name="David CRAVO" userId="ba75d8fe6eadcc5e" providerId="LiveId" clId="{FC976D47-49AC-41B6-B5F5-80E15325E9E0}" dt="2023-07-19T20:17:41.901" v="144"/>
+          <ac:spMkLst>
+            <pc:docMk/>
+            <pc:sldMk cId="2829809620" sldId="260"/>
+            <ac:spMk id="4" creationId="{F9003BE7-EB5B-BFB7-82F9-ECC25EFF90CA}"/>
+          </ac:spMkLst>
+        </pc:spChg>
+        <pc:spChg chg="add mod">
+          <ac:chgData name="David CRAVO" userId="ba75d8fe6eadcc5e" providerId="LiveId" clId="{FC976D47-49AC-41B6-B5F5-80E15325E9E0}" dt="2023-07-19T20:17:41.901" v="144"/>
+          <ac:spMkLst>
+            <pc:docMk/>
+            <pc:sldMk cId="2829809620" sldId="260"/>
+            <ac:spMk id="5" creationId="{9DFBD309-A93C-C0B7-2F87-C332AB5C980E}"/>
+          </ac:spMkLst>
+        </pc:spChg>
+        <pc:spChg chg="add mod">
+          <ac:chgData name="David CRAVO" userId="ba75d8fe6eadcc5e" providerId="LiveId" clId="{FC976D47-49AC-41B6-B5F5-80E15325E9E0}" dt="2023-07-19T20:17:41.901" v="144"/>
+          <ac:spMkLst>
+            <pc:docMk/>
+            <pc:sldMk cId="2829809620" sldId="260"/>
+            <ac:spMk id="6" creationId="{C4B53183-8D78-1C15-7E20-6C92F469EF37}"/>
+          </ac:spMkLst>
+        </pc:spChg>
+        <pc:spChg chg="add mod">
+          <ac:chgData name="David CRAVO" userId="ba75d8fe6eadcc5e" providerId="LiveId" clId="{FC976D47-49AC-41B6-B5F5-80E15325E9E0}" dt="2023-07-19T20:17:41.901" v="144"/>
+          <ac:spMkLst>
+            <pc:docMk/>
+            <pc:sldMk cId="2829809620" sldId="260"/>
+            <ac:spMk id="7" creationId="{7935C112-5988-6357-B5E2-C03FC3B35C04}"/>
+          </ac:spMkLst>
+        </pc:spChg>
+        <pc:spChg chg="add mod">
+          <ac:chgData name="David CRAVO" userId="ba75d8fe6eadcc5e" providerId="LiveId" clId="{FC976D47-49AC-41B6-B5F5-80E15325E9E0}" dt="2023-07-19T20:18:05" v="146" actId="1076"/>
+          <ac:spMkLst>
+            <pc:docMk/>
+            <pc:sldMk cId="2829809620" sldId="260"/>
+            <ac:spMk id="8" creationId="{07653A5A-CB82-77FD-B617-FDCD21625DE1}"/>
+          </ac:spMkLst>
+        </pc:spChg>
+        <pc:spChg chg="add mod">
+          <ac:chgData name="David CRAVO" userId="ba75d8fe6eadcc5e" providerId="LiveId" clId="{FC976D47-49AC-41B6-B5F5-80E15325E9E0}" dt="2023-07-19T20:18:05" v="146" actId="1076"/>
+          <ac:spMkLst>
+            <pc:docMk/>
+            <pc:sldMk cId="2829809620" sldId="260"/>
+            <ac:spMk id="9" creationId="{9D43C214-A3E4-8B64-979A-94D954136777}"/>
+          </ac:spMkLst>
+        </pc:spChg>
+        <pc:spChg chg="add mod">
+          <ac:chgData name="David CRAVO" userId="ba75d8fe6eadcc5e" providerId="LiveId" clId="{FC976D47-49AC-41B6-B5F5-80E15325E9E0}" dt="2023-07-19T20:18:32.333" v="151" actId="1076"/>
+          <ac:spMkLst>
+            <pc:docMk/>
+            <pc:sldMk cId="2829809620" sldId="260"/>
+            <ac:spMk id="10" creationId="{ECDB9E3A-BF0F-DE57-9052-40691C3FC99C}"/>
+          </ac:spMkLst>
+        </pc:spChg>
+        <pc:spChg chg="add mod">
+          <ac:chgData name="David CRAVO" userId="ba75d8fe6eadcc5e" providerId="LiveId" clId="{FC976D47-49AC-41B6-B5F5-80E15325E9E0}" dt="2023-07-19T20:18:45.703" v="152" actId="1076"/>
+          <ac:spMkLst>
+            <pc:docMk/>
+            <pc:sldMk cId="2829809620" sldId="260"/>
+            <ac:spMk id="11" creationId="{74DD0BBA-1A3F-DA96-C0D1-62847BAA6AB0}"/>
+          </ac:spMkLst>
+        </pc:spChg>
+        <pc:spChg chg="add mod">
+          <ac:chgData name="David CRAVO" userId="ba75d8fe6eadcc5e" providerId="LiveId" clId="{FC976D47-49AC-41B6-B5F5-80E15325E9E0}" dt="2023-07-19T20:18:15.354" v="149" actId="1076"/>
+          <ac:spMkLst>
+            <pc:docMk/>
+            <pc:sldMk cId="2829809620" sldId="260"/>
+            <ac:spMk id="12" creationId="{89CE6048-CEF2-104D-DD73-A02AC6CCDEE1}"/>
+          </ac:spMkLst>
+        </pc:spChg>
+        <pc:spChg chg="add mod">
+          <ac:chgData name="David CRAVO" userId="ba75d8fe6eadcc5e" providerId="LiveId" clId="{FC976D47-49AC-41B6-B5F5-80E15325E9E0}" dt="2023-07-19T20:18:15.354" v="149" actId="1076"/>
+          <ac:spMkLst>
+            <pc:docMk/>
+            <pc:sldMk cId="2829809620" sldId="260"/>
+            <ac:spMk id="13" creationId="{59CC8E33-F57A-5746-9EBB-14001950475E}"/>
+          </ac:spMkLst>
+        </pc:spChg>
+        <pc:spChg chg="add mod">
+          <ac:chgData name="David CRAVO" userId="ba75d8fe6eadcc5e" providerId="LiveId" clId="{FC976D47-49AC-41B6-B5F5-80E15325E9E0}" dt="2023-07-19T20:19:21.590" v="156" actId="207"/>
+          <ac:spMkLst>
+            <pc:docMk/>
+            <pc:sldMk cId="2829809620" sldId="260"/>
+            <ac:spMk id="14" creationId="{50CE4EEB-D4C7-A62C-CEF9-D4C52B9C2B85}"/>
+          </ac:spMkLst>
+        </pc:spChg>
+        <pc:spChg chg="add mod">
+          <ac:chgData name="David CRAVO" userId="ba75d8fe6eadcc5e" providerId="LiveId" clId="{FC976D47-49AC-41B6-B5F5-80E15325E9E0}" dt="2023-07-19T20:19:59.078" v="168" actId="1076"/>
+          <ac:spMkLst>
+            <pc:docMk/>
+            <pc:sldMk cId="2829809620" sldId="260"/>
+            <ac:spMk id="15" creationId="{7D2A617B-9997-E2A2-9548-F9792986F843}"/>
+          </ac:spMkLst>
+        </pc:spChg>
+        <pc:cxnChg chg="add mod">
+          <ac:chgData name="David CRAVO" userId="ba75d8fe6eadcc5e" providerId="LiveId" clId="{FC976D47-49AC-41B6-B5F5-80E15325E9E0}" dt="2023-07-19T20:27:12.169" v="204" actId="1076"/>
+          <ac:cxnSpMkLst>
+            <pc:docMk/>
+            <pc:sldMk cId="2829809620" sldId="260"/>
+            <ac:cxnSpMk id="17" creationId="{E7F5791B-D9CA-1C4F-6A67-CFBDDDD5B78B}"/>
+          </ac:cxnSpMkLst>
+        </pc:cxnChg>
+        <pc:cxnChg chg="add mod">
+          <ac:chgData name="David CRAVO" userId="ba75d8fe6eadcc5e" providerId="LiveId" clId="{FC976D47-49AC-41B6-B5F5-80E15325E9E0}" dt="2023-07-19T20:27:37.408" v="207" actId="1076"/>
+          <ac:cxnSpMkLst>
+            <pc:docMk/>
+            <pc:sldMk cId="2829809620" sldId="260"/>
+            <ac:cxnSpMk id="19" creationId="{33E69925-DF4F-1591-F435-BBDDF6DC30FC}"/>
+          </ac:cxnSpMkLst>
+        </pc:cxnChg>
+        <pc:cxnChg chg="add mod">
+          <ac:chgData name="David CRAVO" userId="ba75d8fe6eadcc5e" providerId="LiveId" clId="{FC976D47-49AC-41B6-B5F5-80E15325E9E0}" dt="2023-07-19T20:27:40.863" v="208" actId="1076"/>
+          <ac:cxnSpMkLst>
+            <pc:docMk/>
+            <pc:sldMk cId="2829809620" sldId="260"/>
+            <ac:cxnSpMk id="20" creationId="{EA77C0D7-5D51-ED09-F7EF-C6C39D30844E}"/>
+          </ac:cxnSpMkLst>
+        </pc:cxnChg>
+        <pc:cxnChg chg="add mod">
+          <ac:chgData name="David CRAVO" userId="ba75d8fe6eadcc5e" providerId="LiveId" clId="{FC976D47-49AC-41B6-B5F5-80E15325E9E0}" dt="2023-07-19T20:26:51.545" v="201" actId="1582"/>
+          <ac:cxnSpMkLst>
+            <pc:docMk/>
+            <pc:sldMk cId="2829809620" sldId="260"/>
+            <ac:cxnSpMk id="22" creationId="{10E20EB0-4BDC-B93B-9704-5953B70DB856}"/>
+          </ac:cxnSpMkLst>
+        </pc:cxnChg>
+        <pc:cxnChg chg="add mod">
+          <ac:chgData name="David CRAVO" userId="ba75d8fe6eadcc5e" providerId="LiveId" clId="{FC976D47-49AC-41B6-B5F5-80E15325E9E0}" dt="2023-07-19T20:26:51.545" v="201" actId="1582"/>
+          <ac:cxnSpMkLst>
+            <pc:docMk/>
+            <pc:sldMk cId="2829809620" sldId="260"/>
+            <ac:cxnSpMk id="23" creationId="{FA5D82C4-E330-535A-4489-36C811090EA1}"/>
+          </ac:cxnSpMkLst>
+        </pc:cxnChg>
+        <pc:cxnChg chg="add mod">
+          <ac:chgData name="David CRAVO" userId="ba75d8fe6eadcc5e" providerId="LiveId" clId="{FC976D47-49AC-41B6-B5F5-80E15325E9E0}" dt="2023-07-19T20:26:51.545" v="201" actId="1582"/>
+          <ac:cxnSpMkLst>
+            <pc:docMk/>
+            <pc:sldMk cId="2829809620" sldId="260"/>
+            <ac:cxnSpMk id="24" creationId="{9AE41D17-4A65-772D-0680-0E7190FD3706}"/>
+          </ac:cxnSpMkLst>
+        </pc:cxnChg>
+        <pc:cxnChg chg="add mod">
+          <ac:chgData name="David CRAVO" userId="ba75d8fe6eadcc5e" providerId="LiveId" clId="{FC976D47-49AC-41B6-B5F5-80E15325E9E0}" dt="2023-07-19T20:28:20.856" v="210" actId="208"/>
+          <ac:cxnSpMkLst>
+            <pc:docMk/>
+            <pc:sldMk cId="2829809620" sldId="260"/>
+            <ac:cxnSpMk id="25" creationId="{D40282ED-3483-344E-6879-B8DF1387BFF2}"/>
+          </ac:cxnSpMkLst>
+        </pc:cxnChg>
+        <pc:cxnChg chg="add mod">
+          <ac:chgData name="David CRAVO" userId="ba75d8fe6eadcc5e" providerId="LiveId" clId="{FC976D47-49AC-41B6-B5F5-80E15325E9E0}" dt="2023-07-19T20:28:20.856" v="210" actId="208"/>
+          <ac:cxnSpMkLst>
+            <pc:docMk/>
+            <pc:sldMk cId="2829809620" sldId="260"/>
+            <ac:cxnSpMk id="26" creationId="{57C6046A-E1BB-7C97-ADC3-FB9AE52D4894}"/>
+          </ac:cxnSpMkLst>
+        </pc:cxnChg>
+        <pc:cxnChg chg="add mod">
+          <ac:chgData name="David CRAVO" userId="ba75d8fe6eadcc5e" providerId="LiveId" clId="{FC976D47-49AC-41B6-B5F5-80E15325E9E0}" dt="2023-07-19T20:28:20.856" v="210" actId="208"/>
+          <ac:cxnSpMkLst>
+            <pc:docMk/>
+            <pc:sldMk cId="2829809620" sldId="260"/>
+            <ac:cxnSpMk id="27" creationId="{2853392C-BE49-03BB-8532-DE8952DBACC5}"/>
+          </ac:cxnSpMkLst>
+        </pc:cxnChg>
+        <pc:cxnChg chg="add mod">
+          <ac:chgData name="David CRAVO" userId="ba75d8fe6eadcc5e" providerId="LiveId" clId="{FC976D47-49AC-41B6-B5F5-80E15325E9E0}" dt="2023-07-19T20:28:20.856" v="210" actId="208"/>
+          <ac:cxnSpMkLst>
+            <pc:docMk/>
+            <pc:sldMk cId="2829809620" sldId="260"/>
+            <ac:cxnSpMk id="28" creationId="{0AD262FD-8E6F-9B4B-CF7F-AA9B85456120}"/>
+          </ac:cxnSpMkLst>
+        </pc:cxnChg>
+        <pc:cxnChg chg="add mod">
+          <ac:chgData name="David CRAVO" userId="ba75d8fe6eadcc5e" providerId="LiveId" clId="{FC976D47-49AC-41B6-B5F5-80E15325E9E0}" dt="2023-07-19T20:28:20.856" v="210" actId="208"/>
+          <ac:cxnSpMkLst>
+            <pc:docMk/>
+            <pc:sldMk cId="2829809620" sldId="260"/>
+            <ac:cxnSpMk id="29" creationId="{8374D0E0-9450-3D94-D574-4DBA24A74B0A}"/>
+          </ac:cxnSpMkLst>
+        </pc:cxnChg>
+        <pc:cxnChg chg="add mod">
+          <ac:chgData name="David CRAVO" userId="ba75d8fe6eadcc5e" providerId="LiveId" clId="{FC976D47-49AC-41B6-B5F5-80E15325E9E0}" dt="2023-07-19T20:28:20.856" v="210" actId="208"/>
+          <ac:cxnSpMkLst>
+            <pc:docMk/>
+            <pc:sldMk cId="2829809620" sldId="260"/>
+            <ac:cxnSpMk id="30" creationId="{F5C21D5C-BE2E-7091-76E4-DC4780746CB8}"/>
+          </ac:cxnSpMkLst>
+        </pc:cxnChg>
+      </pc:sldChg>
+      <pc:sldChg chg="addSp delSp modSp new mod">
+        <pc:chgData name="David CRAVO" userId="ba75d8fe6eadcc5e" providerId="LiveId" clId="{FC976D47-49AC-41B6-B5F5-80E15325E9E0}" dt="2023-07-20T05:47:47.425" v="398" actId="1076"/>
+        <pc:sldMkLst>
+          <pc:docMk/>
+          <pc:sldMk cId="791280490" sldId="261"/>
+        </pc:sldMkLst>
+        <pc:spChg chg="add mod">
+          <ac:chgData name="David CRAVO" userId="ba75d8fe6eadcc5e" providerId="LiveId" clId="{FC976D47-49AC-41B6-B5F5-80E15325E9E0}" dt="2023-07-20T04:47:21.263" v="221" actId="1076"/>
+          <ac:spMkLst>
+            <pc:docMk/>
+            <pc:sldMk cId="791280490" sldId="261"/>
+            <ac:spMk id="2" creationId="{A102DA76-BEA8-F808-40C7-8BEEDFE67066}"/>
+          </ac:spMkLst>
+        </pc:spChg>
+        <pc:spChg chg="add mod">
+          <ac:chgData name="David CRAVO" userId="ba75d8fe6eadcc5e" providerId="LiveId" clId="{FC976D47-49AC-41B6-B5F5-80E15325E9E0}" dt="2023-07-20T05:47:47.425" v="398" actId="1076"/>
+          <ac:spMkLst>
+            <pc:docMk/>
+            <pc:sldMk cId="791280490" sldId="261"/>
+            <ac:spMk id="3" creationId="{EB9CC2DE-5AEF-A25E-94BC-674F4ECFB97B}"/>
+          </ac:spMkLst>
+        </pc:spChg>
+        <pc:spChg chg="add del mod">
+          <ac:chgData name="David CRAVO" userId="ba75d8fe6eadcc5e" providerId="LiveId" clId="{FC976D47-49AC-41B6-B5F5-80E15325E9E0}" dt="2023-07-20T04:46:32.472" v="216" actId="478"/>
+          <ac:spMkLst>
+            <pc:docMk/>
+            <pc:sldMk cId="791280490" sldId="261"/>
+            <ac:spMk id="4" creationId="{BE103DCC-59DB-CBEE-010D-856FA683F0C6}"/>
+          </ac:spMkLst>
+        </pc:spChg>
+        <pc:spChg chg="add del mod">
+          <ac:chgData name="David CRAVO" userId="ba75d8fe6eadcc5e" providerId="LiveId" clId="{FC976D47-49AC-41B6-B5F5-80E15325E9E0}" dt="2023-07-20T04:46:32.472" v="216" actId="478"/>
+          <ac:spMkLst>
+            <pc:docMk/>
+            <pc:sldMk cId="791280490" sldId="261"/>
+            <ac:spMk id="5" creationId="{2C7D0B9E-2CF1-EE2B-9FC0-4AE1F152376C}"/>
+          </ac:spMkLst>
+        </pc:spChg>
+        <pc:spChg chg="add del mod">
+          <ac:chgData name="David CRAVO" userId="ba75d8fe6eadcc5e" providerId="LiveId" clId="{FC976D47-49AC-41B6-B5F5-80E15325E9E0}" dt="2023-07-20T04:46:32.472" v="216" actId="478"/>
+          <ac:spMkLst>
+            <pc:docMk/>
+            <pc:sldMk cId="791280490" sldId="261"/>
+            <ac:spMk id="6" creationId="{C7FA8F0A-01B4-9AEB-7ECA-00427AD85B2F}"/>
+          </ac:spMkLst>
+        </pc:spChg>
+        <pc:spChg chg="add del mod">
+          <ac:chgData name="David CRAVO" userId="ba75d8fe6eadcc5e" providerId="LiveId" clId="{FC976D47-49AC-41B6-B5F5-80E15325E9E0}" dt="2023-07-20T04:46:32.472" v="216" actId="478"/>
+          <ac:spMkLst>
+            <pc:docMk/>
+            <pc:sldMk cId="791280490" sldId="261"/>
+            <ac:spMk id="7" creationId="{864DB145-26AA-166A-A644-52806D5A762D}"/>
+          </ac:spMkLst>
+        </pc:spChg>
+        <pc:spChg chg="add mod">
+          <ac:chgData name="David CRAVO" userId="ba75d8fe6eadcc5e" providerId="LiveId" clId="{FC976D47-49AC-41B6-B5F5-80E15325E9E0}" dt="2023-07-20T05:45:01.605" v="382" actId="14100"/>
+          <ac:spMkLst>
+            <pc:docMk/>
+            <pc:sldMk cId="791280490" sldId="261"/>
+            <ac:spMk id="8" creationId="{2C5DC5BA-D83C-41FC-C9BD-012B0AABC0DA}"/>
+          </ac:spMkLst>
+        </pc:spChg>
+        <pc:spChg chg="add mod">
+          <ac:chgData name="David CRAVO" userId="ba75d8fe6eadcc5e" providerId="LiveId" clId="{FC976D47-49AC-41B6-B5F5-80E15325E9E0}" dt="2023-07-20T05:45:10.443" v="383" actId="1076"/>
+          <ac:spMkLst>
+            <pc:docMk/>
+            <pc:sldMk cId="791280490" sldId="261"/>
+            <ac:spMk id="9" creationId="{638AF62A-25FF-5419-754E-C8B4A759C7AB}"/>
+          </ac:spMkLst>
+        </pc:spChg>
+        <pc:spChg chg="add del mod">
+          <ac:chgData name="David CRAVO" userId="ba75d8fe6eadcc5e" providerId="LiveId" clId="{FC976D47-49AC-41B6-B5F5-80E15325E9E0}" dt="2023-07-20T04:50:07.418" v="236" actId="478"/>
+          <ac:spMkLst>
+            <pc:docMk/>
+            <pc:sldMk cId="791280490" sldId="261"/>
+            <ac:spMk id="10" creationId="{40BFCF4A-7E15-3864-2FAD-950C6153A5C6}"/>
+          </ac:spMkLst>
+        </pc:spChg>
+        <pc:spChg chg="add del mod">
+          <ac:chgData name="David CRAVO" userId="ba75d8fe6eadcc5e" providerId="LiveId" clId="{FC976D47-49AC-41B6-B5F5-80E15325E9E0}" dt="2023-07-20T04:50:07.418" v="236" actId="478"/>
+          <ac:spMkLst>
+            <pc:docMk/>
+            <pc:sldMk cId="791280490" sldId="261"/>
+            <ac:spMk id="11" creationId="{9307E71F-5A22-57C2-C8A4-752BDAD5D0C2}"/>
+          </ac:spMkLst>
+        </pc:spChg>
+        <pc:spChg chg="add del mod">
+          <ac:chgData name="David CRAVO" userId="ba75d8fe6eadcc5e" providerId="LiveId" clId="{FC976D47-49AC-41B6-B5F5-80E15325E9E0}" dt="2023-07-20T04:50:07.418" v="236" actId="478"/>
+          <ac:spMkLst>
+            <pc:docMk/>
+            <pc:sldMk cId="791280490" sldId="261"/>
+            <ac:spMk id="12" creationId="{D1FC054B-EB4C-E1B1-4470-CA80A4ECCCDE}"/>
+          </ac:spMkLst>
+        </pc:spChg>
+        <pc:spChg chg="add del mod">
+          <ac:chgData name="David CRAVO" userId="ba75d8fe6eadcc5e" providerId="LiveId" clId="{FC976D47-49AC-41B6-B5F5-80E15325E9E0}" dt="2023-07-20T04:50:07.418" v="236" actId="478"/>
+          <ac:spMkLst>
+            <pc:docMk/>
+            <pc:sldMk cId="791280490" sldId="261"/>
+            <ac:spMk id="13" creationId="{A03B4BA1-92C7-9B17-8A7E-A7C1F1AABC6C}"/>
+          </ac:spMkLst>
+        </pc:spChg>
+        <pc:spChg chg="add del mod">
+          <ac:chgData name="David CRAVO" userId="ba75d8fe6eadcc5e" providerId="LiveId" clId="{FC976D47-49AC-41B6-B5F5-80E15325E9E0}" dt="2023-07-20T05:04:47.828" v="335" actId="1076"/>
+          <ac:spMkLst>
+            <pc:docMk/>
+            <pc:sldMk cId="791280490" sldId="261"/>
+            <ac:spMk id="14" creationId="{361A22E7-0E9B-063D-7415-8C50CA1C8F61}"/>
+          </ac:spMkLst>
+        </pc:spChg>
+        <pc:spChg chg="add mod">
+          <ac:chgData name="David CRAVO" userId="ba75d8fe6eadcc5e" providerId="LiveId" clId="{FC976D47-49AC-41B6-B5F5-80E15325E9E0}" dt="2023-07-20T05:43:44.588" v="378" actId="114"/>
+          <ac:spMkLst>
+            <pc:docMk/>
+            <pc:sldMk cId="791280490" sldId="261"/>
+            <ac:spMk id="15" creationId="{723E404B-8FE0-E116-00F2-F37A2D54E32E}"/>
+          </ac:spMkLst>
+        </pc:spChg>
+        <pc:spChg chg="add mod">
+          <ac:chgData name="David CRAVO" userId="ba75d8fe6eadcc5e" providerId="LiveId" clId="{FC976D47-49AC-41B6-B5F5-80E15325E9E0}" dt="2023-07-20T04:47:13.019" v="220" actId="1076"/>
+          <ac:spMkLst>
+            <pc:docMk/>
+            <pc:sldMk cId="791280490" sldId="261"/>
+            <ac:spMk id="28" creationId="{C496953A-FF81-E902-E3D3-297CC32E4024}"/>
+          </ac:spMkLst>
+        </pc:spChg>
+        <pc:spChg chg="add mod">
+          <ac:chgData name="David CRAVO" userId="ba75d8fe6eadcc5e" providerId="LiveId" clId="{FC976D47-49AC-41B6-B5F5-80E15325E9E0}" dt="2023-07-20T05:47:38.147" v="397" actId="1076"/>
+          <ac:spMkLst>
+            <pc:docMk/>
+            <pc:sldMk cId="791280490" sldId="261"/>
+            <ac:spMk id="29" creationId="{B2D9FA1A-50CA-1DC2-82CE-D0ABB1FE5A62}"/>
+          </ac:spMkLst>
+        </pc:spChg>
+        <pc:spChg chg="add mod">
+          <ac:chgData name="David CRAVO" userId="ba75d8fe6eadcc5e" providerId="LiveId" clId="{FC976D47-49AC-41B6-B5F5-80E15325E9E0}" dt="2023-07-20T05:47:24.775" v="395" actId="1076"/>
+          <ac:spMkLst>
+            <pc:docMk/>
+            <pc:sldMk cId="791280490" sldId="261"/>
+            <ac:spMk id="30" creationId="{093D1E1F-5E09-EBE8-09A6-77C7A9D1F7C3}"/>
+          </ac:spMkLst>
+        </pc:spChg>
+        <pc:spChg chg="add mod">
+          <ac:chgData name="David CRAVO" userId="ba75d8fe6eadcc5e" providerId="LiveId" clId="{FC976D47-49AC-41B6-B5F5-80E15325E9E0}" dt="2023-07-20T05:47:24.775" v="395" actId="1076"/>
+          <ac:spMkLst>
+            <pc:docMk/>
+            <pc:sldMk cId="791280490" sldId="261"/>
+            <ac:spMk id="31" creationId="{1070B2A8-5B19-1D45-6263-0F514CE919D4}"/>
+          </ac:spMkLst>
+        </pc:spChg>
+        <pc:spChg chg="add del mod">
+          <ac:chgData name="David CRAVO" userId="ba75d8fe6eadcc5e" providerId="LiveId" clId="{FC976D47-49AC-41B6-B5F5-80E15325E9E0}" dt="2023-07-20T05:45:28.412" v="385" actId="478"/>
+          <ac:spMkLst>
+            <pc:docMk/>
+            <pc:sldMk cId="791280490" sldId="261"/>
+            <ac:spMk id="33" creationId="{65B6742F-43CC-B336-629B-E1BCE1AD296D}"/>
+          </ac:spMkLst>
+        </pc:spChg>
+        <pc:spChg chg="add del mod">
+          <ac:chgData name="David CRAVO" userId="ba75d8fe6eadcc5e" providerId="LiveId" clId="{FC976D47-49AC-41B6-B5F5-80E15325E9E0}" dt="2023-07-20T05:45:28.412" v="385" actId="478"/>
+          <ac:spMkLst>
+            <pc:docMk/>
+            <pc:sldMk cId="791280490" sldId="261"/>
+            <ac:spMk id="34" creationId="{9D437F9B-E29B-0520-8535-E301EAF10AEE}"/>
+          </ac:spMkLst>
+        </pc:spChg>
+        <pc:spChg chg="add del mod">
+          <ac:chgData name="David CRAVO" userId="ba75d8fe6eadcc5e" providerId="LiveId" clId="{FC976D47-49AC-41B6-B5F5-80E15325E9E0}" dt="2023-07-20T05:45:30.842" v="386" actId="478"/>
+          <ac:spMkLst>
+            <pc:docMk/>
+            <pc:sldMk cId="791280490" sldId="261"/>
+            <ac:spMk id="35" creationId="{F32554E6-4A83-5E96-8D2F-B587805A24D7}"/>
+          </ac:spMkLst>
+        </pc:spChg>
+        <pc:spChg chg="add del mod">
+          <ac:chgData name="David CRAVO" userId="ba75d8fe6eadcc5e" providerId="LiveId" clId="{FC976D47-49AC-41B6-B5F5-80E15325E9E0}" dt="2023-07-20T05:45:30.842" v="386" actId="478"/>
+          <ac:spMkLst>
+            <pc:docMk/>
+            <pc:sldMk cId="791280490" sldId="261"/>
+            <ac:spMk id="36" creationId="{08D17236-A590-5448-7C26-3422943AA8F1}"/>
+          </ac:spMkLst>
+        </pc:spChg>
+        <pc:spChg chg="add mod">
+          <ac:chgData name="David CRAVO" userId="ba75d8fe6eadcc5e" providerId="LiveId" clId="{FC976D47-49AC-41B6-B5F5-80E15325E9E0}" dt="2023-07-20T04:54:58.751" v="315" actId="1076"/>
+          <ac:spMkLst>
+            <pc:docMk/>
+            <pc:sldMk cId="791280490" sldId="261"/>
+            <ac:spMk id="38" creationId="{5FF4698C-2C4E-86FE-A9CC-ABFD232C4932}"/>
+          </ac:spMkLst>
+        </pc:spChg>
+        <pc:spChg chg="add mod">
+          <ac:chgData name="David CRAVO" userId="ba75d8fe6eadcc5e" providerId="LiveId" clId="{FC976D47-49AC-41B6-B5F5-80E15325E9E0}" dt="2023-07-20T05:43:49.471" v="379" actId="114"/>
+          <ac:spMkLst>
+            <pc:docMk/>
+            <pc:sldMk cId="791280490" sldId="261"/>
+            <ac:spMk id="39" creationId="{79CC0248-A3AE-D40D-C7ED-7499004398AC}"/>
+          </ac:spMkLst>
+        </pc:spChg>
+        <pc:spChg chg="add mod">
+          <ac:chgData name="David CRAVO" userId="ba75d8fe6eadcc5e" providerId="LiveId" clId="{FC976D47-49AC-41B6-B5F5-80E15325E9E0}" dt="2023-07-20T05:45:46.665" v="387" actId="1076"/>
+          <ac:spMkLst>
+            <pc:docMk/>
+            <pc:sldMk cId="791280490" sldId="261"/>
+            <ac:spMk id="46" creationId="{1B2057F0-84BC-48BA-C2C2-10E99ADE2159}"/>
+          </ac:spMkLst>
+        </pc:spChg>
+        <pc:spChg chg="add mod">
+          <ac:chgData name="David CRAVO" userId="ba75d8fe6eadcc5e" providerId="LiveId" clId="{FC976D47-49AC-41B6-B5F5-80E15325E9E0}" dt="2023-07-20T05:45:56.068" v="388" actId="1076"/>
+          <ac:spMkLst>
+            <pc:docMk/>
+            <pc:sldMk cId="791280490" sldId="261"/>
+            <ac:spMk id="47" creationId="{6ED59749-63AE-5704-ADA9-5B72886705ED}"/>
+          </ac:spMkLst>
+        </pc:spChg>
+        <pc:spChg chg="add mod">
+          <ac:chgData name="David CRAVO" userId="ba75d8fe6eadcc5e" providerId="LiveId" clId="{FC976D47-49AC-41B6-B5F5-80E15325E9E0}" dt="2023-07-20T05:46:24.419" v="390" actId="1076"/>
+          <ac:spMkLst>
+            <pc:docMk/>
+            <pc:sldMk cId="791280490" sldId="261"/>
+            <ac:spMk id="48" creationId="{219F73A5-A538-407A-8575-DD26FEFFA7DF}"/>
+          </ac:spMkLst>
+        </pc:spChg>
+        <pc:spChg chg="add mod">
+          <ac:chgData name="David CRAVO" userId="ba75d8fe6eadcc5e" providerId="LiveId" clId="{FC976D47-49AC-41B6-B5F5-80E15325E9E0}" dt="2023-07-20T05:46:24.419" v="390" actId="1076"/>
+          <ac:spMkLst>
+            <pc:docMk/>
+            <pc:sldMk cId="791280490" sldId="261"/>
+            <ac:spMk id="49" creationId="{9EB88422-5EF0-0412-2BE9-3D97F9D99F2E}"/>
+          </ac:spMkLst>
+        </pc:spChg>
+        <pc:cxnChg chg="add mod">
+          <ac:chgData name="David CRAVO" userId="ba75d8fe6eadcc5e" providerId="LiveId" clId="{FC976D47-49AC-41B6-B5F5-80E15325E9E0}" dt="2023-07-20T04:48:30.923" v="226" actId="1076"/>
+          <ac:cxnSpMkLst>
+            <pc:docMk/>
+            <pc:sldMk cId="791280490" sldId="261"/>
+            <ac:cxnSpMk id="16" creationId="{ECBF7B11-D9CA-77F0-6419-305FD38FEFD9}"/>
+          </ac:cxnSpMkLst>
+        </pc:cxnChg>
+        <pc:cxnChg chg="add mod">
+          <ac:chgData name="David CRAVO" userId="ba75d8fe6eadcc5e" providerId="LiveId" clId="{FC976D47-49AC-41B6-B5F5-80E15325E9E0}" dt="2023-07-20T04:48:58.094" v="228" actId="1076"/>
+          <ac:cxnSpMkLst>
+            <pc:docMk/>
+            <pc:sldMk cId="791280490" sldId="261"/>
+            <ac:cxnSpMk id="17" creationId="{E42E2DE9-7E6E-2F1C-2C76-D5471729CAA5}"/>
+          </ac:cxnSpMkLst>
+        </pc:cxnChg>
+        <pc:cxnChg chg="add mod">
+          <ac:chgData name="David CRAVO" userId="ba75d8fe6eadcc5e" providerId="LiveId" clId="{FC976D47-49AC-41B6-B5F5-80E15325E9E0}" dt="2023-07-20T04:49:08.057" v="229" actId="1076"/>
+          <ac:cxnSpMkLst>
+            <pc:docMk/>
+            <pc:sldMk cId="791280490" sldId="261"/>
+            <ac:cxnSpMk id="18" creationId="{DD726777-51C8-A72F-D011-A8AB121FB2ED}"/>
+          </ac:cxnSpMkLst>
+        </pc:cxnChg>
+        <pc:cxnChg chg="add mod">
+          <ac:chgData name="David CRAVO" userId="ba75d8fe6eadcc5e" providerId="LiveId" clId="{FC976D47-49AC-41B6-B5F5-80E15325E9E0}" dt="2023-07-20T05:45:01.605" v="382" actId="14100"/>
+          <ac:cxnSpMkLst>
+            <pc:docMk/>
+            <pc:sldMk cId="791280490" sldId="261"/>
+            <ac:cxnSpMk id="19" creationId="{DAA46DFF-E93E-C986-310D-457A36313FA8}"/>
+          </ac:cxnSpMkLst>
+        </pc:cxnChg>
+        <pc:cxnChg chg="add mod">
+          <ac:chgData name="David CRAVO" userId="ba75d8fe6eadcc5e" providerId="LiveId" clId="{FC976D47-49AC-41B6-B5F5-80E15325E9E0}" dt="2023-07-20T04:51:04.115" v="243" actId="1076"/>
+          <ac:cxnSpMkLst>
+            <pc:docMk/>
+            <pc:sldMk cId="791280490" sldId="261"/>
+            <ac:cxnSpMk id="20" creationId="{7A4A5FA6-69DD-7E27-A117-99B9E285A7E9}"/>
+          </ac:cxnSpMkLst>
+        </pc:cxnChg>
+        <pc:cxnChg chg="add mod">
+          <ac:chgData name="David CRAVO" userId="ba75d8fe6eadcc5e" providerId="LiveId" clId="{FC976D47-49AC-41B6-B5F5-80E15325E9E0}" dt="2023-07-20T04:50:57.891" v="242" actId="1076"/>
+          <ac:cxnSpMkLst>
+            <pc:docMk/>
+            <pc:sldMk cId="791280490" sldId="261"/>
+            <ac:cxnSpMk id="21" creationId="{B898A5E8-CD25-8F17-D2C5-A01C612C4F6F}"/>
+          </ac:cxnSpMkLst>
+        </pc:cxnChg>
+        <pc:cxnChg chg="add mod">
+          <ac:chgData name="David CRAVO" userId="ba75d8fe6eadcc5e" providerId="LiveId" clId="{FC976D47-49AC-41B6-B5F5-80E15325E9E0}" dt="2023-07-20T04:56:36.974" v="322" actId="208"/>
+          <ac:cxnSpMkLst>
+            <pc:docMk/>
+            <pc:sldMk cId="791280490" sldId="261"/>
+            <ac:cxnSpMk id="22" creationId="{9723FBA4-FA45-DA24-6CF6-5F08681042FE}"/>
+          </ac:cxnSpMkLst>
+        </pc:cxnChg>
+        <pc:cxnChg chg="add mod">
+          <ac:chgData name="David CRAVO" userId="ba75d8fe6eadcc5e" providerId="LiveId" clId="{FC976D47-49AC-41B6-B5F5-80E15325E9E0}" dt="2023-07-20T04:56:36.974" v="322" actId="208"/>
+          <ac:cxnSpMkLst>
+            <pc:docMk/>
+            <pc:sldMk cId="791280490" sldId="261"/>
+            <ac:cxnSpMk id="23" creationId="{8991BCEA-9E6E-22F0-3A3A-486FB1072C6A}"/>
+          </ac:cxnSpMkLst>
+        </pc:cxnChg>
+        <pc:cxnChg chg="add mod">
+          <ac:chgData name="David CRAVO" userId="ba75d8fe6eadcc5e" providerId="LiveId" clId="{FC976D47-49AC-41B6-B5F5-80E15325E9E0}" dt="2023-07-20T04:56:22.851" v="321" actId="208"/>
+          <ac:cxnSpMkLst>
+            <pc:docMk/>
+            <pc:sldMk cId="791280490" sldId="261"/>
+            <ac:cxnSpMk id="24" creationId="{E58E7343-008E-BA0B-13B7-C2C77E015444}"/>
+          </ac:cxnSpMkLst>
+        </pc:cxnChg>
+        <pc:cxnChg chg="add mod">
+          <ac:chgData name="David CRAVO" userId="ba75d8fe6eadcc5e" providerId="LiveId" clId="{FC976D47-49AC-41B6-B5F5-80E15325E9E0}" dt="2023-07-20T04:57:13.984" v="323" actId="208"/>
+          <ac:cxnSpMkLst>
+            <pc:docMk/>
+            <pc:sldMk cId="791280490" sldId="261"/>
+            <ac:cxnSpMk id="25" creationId="{728F5C3E-8441-7DEB-8E2C-735498385B72}"/>
+          </ac:cxnSpMkLst>
+        </pc:cxnChg>
+        <pc:cxnChg chg="add mod">
+          <ac:chgData name="David CRAVO" userId="ba75d8fe6eadcc5e" providerId="LiveId" clId="{FC976D47-49AC-41B6-B5F5-80E15325E9E0}" dt="2023-07-20T04:57:13.984" v="323" actId="208"/>
+          <ac:cxnSpMkLst>
+            <pc:docMk/>
+            <pc:sldMk cId="791280490" sldId="261"/>
+            <ac:cxnSpMk id="26" creationId="{8DADFB82-F48F-501D-A060-6DB3FEBBC9A7}"/>
+          </ac:cxnSpMkLst>
+        </pc:cxnChg>
+        <pc:cxnChg chg="add mod">
+          <ac:chgData name="David CRAVO" userId="ba75d8fe6eadcc5e" providerId="LiveId" clId="{FC976D47-49AC-41B6-B5F5-80E15325E9E0}" dt="2023-07-20T04:57:13.984" v="323" actId="208"/>
+          <ac:cxnSpMkLst>
+            <pc:docMk/>
+            <pc:sldMk cId="791280490" sldId="261"/>
+            <ac:cxnSpMk id="27" creationId="{3A5015FC-812B-81E3-CA37-CC0CA7908E71}"/>
+          </ac:cxnSpMkLst>
+        </pc:cxnChg>
+        <pc:cxnChg chg="add mod">
+          <ac:chgData name="David CRAVO" userId="ba75d8fe6eadcc5e" providerId="LiveId" clId="{FC976D47-49AC-41B6-B5F5-80E15325E9E0}" dt="2023-07-20T04:58:57.484" v="329" actId="1076"/>
+          <ac:cxnSpMkLst>
+            <pc:docMk/>
+            <pc:sldMk cId="791280490" sldId="261"/>
+            <ac:cxnSpMk id="42" creationId="{E896A090-2C48-7134-EB5C-BD235C4C27D4}"/>
+          </ac:cxnSpMkLst>
+        </pc:cxnChg>
+        <pc:cxnChg chg="add mod">
+          <ac:chgData name="David CRAVO" userId="ba75d8fe6eadcc5e" providerId="LiveId" clId="{FC976D47-49AC-41B6-B5F5-80E15325E9E0}" dt="2023-07-20T04:59:08.332" v="331" actId="208"/>
+          <ac:cxnSpMkLst>
+            <pc:docMk/>
+            <pc:sldMk cId="791280490" sldId="261"/>
+            <ac:cxnSpMk id="44" creationId="{5BB0CDE2-730D-21B1-6196-BE456D5E258F}"/>
+          </ac:cxnSpMkLst>
+        </pc:cxnChg>
+      </pc:sldChg>
+    </pc:docChg>
+  </pc:docChgLst>
+</pc:chgInfo>
 </file>
 
 <file path=ppt/slideLayouts/slideLayout1.xml><?xml version="1.0" encoding="utf-8"?>
@@ -3463,8 +4217,8 @@
         </p:nvSpPr>
         <p:spPr>
           <a:xfrm>
-            <a:off x="8686800" y="2780298"/>
-            <a:ext cx="2410690" cy="923330"/>
+            <a:off x="8732657" y="2952430"/>
+            <a:ext cx="2410690" cy="646331"/>
           </a:xfrm>
           <a:prstGeom prst="rect">
             <a:avLst/>
@@ -3480,21 +4234,14 @@
             <a:pPr lvl="0" algn="ctr"/>
             <a:r>
               <a:rPr lang="fr-FR" dirty="0"/>
-              <a:t>Diffuseur </a:t>
+              <a:t> Objet sujet</a:t>
             </a:r>
           </a:p>
           <a:p>
             <a:pPr lvl="0" algn="ctr"/>
             <a:r>
               <a:rPr lang="fr-FR" dirty="0"/>
-              <a:t>Publisher</a:t>
-            </a:r>
-          </a:p>
-          <a:p>
-            <a:pPr lvl="0" algn="ctr"/>
-            <a:r>
-              <a:rPr lang="fr-FR" dirty="0"/>
-              <a:t>Objet sujet</a:t>
+              <a:t>(Diffuseur)</a:t>
             </a:r>
           </a:p>
         </p:txBody>
@@ -3513,7 +4260,7 @@
         </p:nvSpPr>
         <p:spPr>
           <a:xfrm>
-            <a:off x="955964" y="762000"/>
+            <a:off x="955964" y="699883"/>
             <a:ext cx="2687781" cy="1080655"/>
           </a:xfrm>
           <a:prstGeom prst="rect">
@@ -3562,8 +4309,8 @@
         </p:nvSpPr>
         <p:spPr>
           <a:xfrm>
-            <a:off x="1094509" y="840662"/>
-            <a:ext cx="2410690" cy="923330"/>
+            <a:off x="1094509" y="917045"/>
+            <a:ext cx="2410690" cy="646331"/>
           </a:xfrm>
           <a:prstGeom prst="rect">
             <a:avLst/>
@@ -3581,21 +4328,7 @@
             <a:pPr lvl="0" algn="ctr"/>
             <a:r>
               <a:rPr lang="fr-FR" dirty="0"/>
-              <a:t>Souscripteur</a:t>
-            </a:r>
-          </a:p>
-          <a:p>
-            <a:pPr lvl="0" algn="ctr"/>
-            <a:r>
-              <a:rPr lang="fr-FR" dirty="0"/>
-              <a:t>Subscriber</a:t>
-            </a:r>
-          </a:p>
-          <a:p>
-            <a:pPr lvl="0" algn="ctr"/>
-            <a:r>
-              <a:rPr lang="fr-FR" dirty="0"/>
-              <a:t>Objet observant</a:t>
+              <a:t>Objet Observateur (Souscripteur)</a:t>
             </a:r>
           </a:p>
         </p:txBody>
@@ -3651,58 +4384,6 @@
       </p:sp>
       <p:sp>
         <p:nvSpPr>
-          <p:cNvPr id="8" name="ZoneTexte 7">
-            <a:extLst>
-              <a:ext uri="{FF2B5EF4-FFF2-40B4-BE49-F238E27FC236}">
-                <a16:creationId xmlns:a16="http://schemas.microsoft.com/office/drawing/2014/main" id="{28D33C03-2237-F343-4122-6CF5FA42DBA7}"/>
-              </a:ext>
-            </a:extLst>
-          </p:cNvPr>
-          <p:cNvSpPr txBox="1"/>
-          <p:nvPr/>
-        </p:nvSpPr>
-        <p:spPr>
-          <a:xfrm>
-            <a:off x="1094509" y="2780298"/>
-            <a:ext cx="2410690" cy="923330"/>
-          </a:xfrm>
-          <a:prstGeom prst="rect">
-            <a:avLst/>
-          </a:prstGeom>
-          <a:solidFill>
-            <a:schemeClr val="accent2"/>
-          </a:solidFill>
-        </p:spPr>
-        <p:txBody>
-          <a:bodyPr wrap="square" rtlCol="0">
-            <a:spAutoFit/>
-          </a:bodyPr>
-          <a:lstStyle/>
-          <a:p>
-            <a:pPr lvl="0" algn="ctr"/>
-            <a:r>
-              <a:rPr lang="fr-FR" dirty="0"/>
-              <a:t>Souscripteur</a:t>
-            </a:r>
-          </a:p>
-          <a:p>
-            <a:pPr lvl="0" algn="ctr"/>
-            <a:r>
-              <a:rPr lang="fr-FR" dirty="0"/>
-              <a:t>Subscriber</a:t>
-            </a:r>
-          </a:p>
-          <a:p>
-            <a:pPr lvl="0" algn="ctr"/>
-            <a:r>
-              <a:rPr lang="fr-FR" dirty="0"/>
-              <a:t>Objet observant</a:t>
-            </a:r>
-          </a:p>
-        </p:txBody>
-      </p:sp>
-      <p:sp>
-        <p:nvSpPr>
           <p:cNvPr id="9" name="Rectangle 8">
             <a:extLst>
               <a:ext uri="{FF2B5EF4-FFF2-40B4-BE49-F238E27FC236}">
@@ -3750,58 +4431,6 @@
           </a:p>
         </p:txBody>
       </p:sp>
-      <p:sp>
-        <p:nvSpPr>
-          <p:cNvPr id="10" name="ZoneTexte 9">
-            <a:extLst>
-              <a:ext uri="{FF2B5EF4-FFF2-40B4-BE49-F238E27FC236}">
-                <a16:creationId xmlns:a16="http://schemas.microsoft.com/office/drawing/2014/main" id="{CBF0FE16-F605-EFD9-9042-3354A2E9FD30}"/>
-              </a:ext>
-            </a:extLst>
-          </p:cNvPr>
-          <p:cNvSpPr txBox="1"/>
-          <p:nvPr/>
-        </p:nvSpPr>
-        <p:spPr>
-          <a:xfrm>
-            <a:off x="1094509" y="4641272"/>
-            <a:ext cx="2410690" cy="923330"/>
-          </a:xfrm>
-          <a:prstGeom prst="rect">
-            <a:avLst/>
-          </a:prstGeom>
-          <a:solidFill>
-            <a:schemeClr val="accent2"/>
-          </a:solidFill>
-        </p:spPr>
-        <p:txBody>
-          <a:bodyPr wrap="square" rtlCol="0">
-            <a:spAutoFit/>
-          </a:bodyPr>
-          <a:lstStyle/>
-          <a:p>
-            <a:pPr lvl="0" algn="ctr"/>
-            <a:r>
-              <a:rPr lang="fr-FR" dirty="0"/>
-              <a:t>Souscripteur</a:t>
-            </a:r>
-          </a:p>
-          <a:p>
-            <a:pPr lvl="0" algn="ctr"/>
-            <a:r>
-              <a:rPr lang="fr-FR" dirty="0"/>
-              <a:t>Subscriber</a:t>
-            </a:r>
-          </a:p>
-          <a:p>
-            <a:pPr lvl="0" algn="ctr"/>
-            <a:r>
-              <a:rPr lang="fr-FR" dirty="0"/>
-              <a:t>Objet observant</a:t>
-            </a:r>
-          </a:p>
-        </p:txBody>
-      </p:sp>
       <p:cxnSp>
         <p:nvCxnSpPr>
           <p:cNvPr id="14" name="Connecteur droit avec flèche 13">
@@ -3819,13 +4448,16 @@
         </p:nvCxnSpPr>
         <p:spPr>
           <a:xfrm>
-            <a:off x="3643745" y="1302328"/>
+            <a:off x="3643745" y="1240211"/>
             <a:ext cx="4904509" cy="1759527"/>
           </a:xfrm>
           <a:prstGeom prst="straightConnector1">
             <a:avLst/>
           </a:prstGeom>
-          <a:ln>
+          <a:ln w="57150">
+            <a:solidFill>
+              <a:schemeClr val="accent2"/>
+            </a:solidFill>
             <a:tailEnd type="triangle"/>
           </a:ln>
         </p:spPr>
@@ -3867,7 +4499,10 @@
           <a:prstGeom prst="straightConnector1">
             <a:avLst/>
           </a:prstGeom>
-          <a:ln>
+          <a:ln w="57150">
+            <a:solidFill>
+              <a:schemeClr val="accent2"/>
+            </a:solidFill>
             <a:tailEnd type="triangle"/>
           </a:ln>
         </p:spPr>
@@ -3908,7 +4543,10 @@
           <a:prstGeom prst="straightConnector1">
             <a:avLst/>
           </a:prstGeom>
-          <a:ln>
+          <a:ln w="57150">
+            <a:solidFill>
+              <a:schemeClr val="accent2"/>
+            </a:solidFill>
             <a:tailEnd type="triangle"/>
           </a:ln>
         </p:spPr>
@@ -3941,8 +4579,8 @@
         </p:nvSpPr>
         <p:spPr>
           <a:xfrm>
-            <a:off x="5140035" y="979164"/>
-            <a:ext cx="1911928" cy="646331"/>
+            <a:off x="5140035" y="1378710"/>
+            <a:ext cx="1911928" cy="369332"/>
           </a:xfrm>
           <a:prstGeom prst="rect">
             <a:avLst/>
@@ -3956,13 +4594,11 @@
           <a:lstStyle/>
           <a:p>
             <a:r>
-              <a:rPr lang="fr-FR" dirty="0"/>
-              <a:t>Je m’abonne</a:t>
-            </a:r>
-          </a:p>
-          <a:p>
-            <a:r>
-              <a:rPr lang="fr-FR" dirty="0"/>
+              <a:rPr lang="fr-FR" dirty="0">
+                <a:solidFill>
+                  <a:schemeClr val="accent2"/>
+                </a:solidFill>
+              </a:rPr>
               <a:t>J’observe</a:t>
             </a:r>
           </a:p>
@@ -3982,8 +4618,8 @@
         </p:nvSpPr>
         <p:spPr>
           <a:xfrm>
-            <a:off x="5140035" y="2925724"/>
-            <a:ext cx="1911928" cy="646331"/>
+            <a:off x="5150572" y="2906264"/>
+            <a:ext cx="1911928" cy="369332"/>
           </a:xfrm>
           <a:prstGeom prst="rect">
             <a:avLst/>
@@ -3997,13 +4633,11 @@
           <a:lstStyle/>
           <a:p>
             <a:r>
-              <a:rPr lang="fr-FR" dirty="0"/>
-              <a:t>Je m’abonne</a:t>
-            </a:r>
-          </a:p>
-          <a:p>
-            <a:r>
-              <a:rPr lang="fr-FR" dirty="0"/>
+              <a:rPr lang="fr-FR" dirty="0">
+                <a:solidFill>
+                  <a:schemeClr val="accent2"/>
+                </a:solidFill>
+              </a:rPr>
               <a:t>J’observe</a:t>
             </a:r>
           </a:p>
@@ -4023,8 +4657,8 @@
         </p:nvSpPr>
         <p:spPr>
           <a:xfrm>
-            <a:off x="5216235" y="4779771"/>
-            <a:ext cx="1911928" cy="646331"/>
+            <a:off x="5150572" y="3973294"/>
+            <a:ext cx="1911928" cy="369332"/>
           </a:xfrm>
           <a:prstGeom prst="rect">
             <a:avLst/>
@@ -4038,14 +4672,324 @@
           <a:lstStyle/>
           <a:p>
             <a:r>
+              <a:rPr lang="fr-FR" dirty="0">
+                <a:solidFill>
+                  <a:schemeClr val="accent2"/>
+                </a:solidFill>
+              </a:rPr>
+              <a:t>J’observe</a:t>
+            </a:r>
+          </a:p>
+        </p:txBody>
+      </p:sp>
+      <p:sp>
+        <p:nvSpPr>
+          <p:cNvPr id="11" name="ZoneTexte 10">
+            <a:extLst>
+              <a:ext uri="{FF2B5EF4-FFF2-40B4-BE49-F238E27FC236}">
+                <a16:creationId xmlns:a16="http://schemas.microsoft.com/office/drawing/2014/main" id="{8D316B63-4121-DBCB-724A-D228723CCEBC}"/>
+              </a:ext>
+            </a:extLst>
+          </p:cNvPr>
+          <p:cNvSpPr txBox="1"/>
+          <p:nvPr/>
+        </p:nvSpPr>
+        <p:spPr>
+          <a:xfrm>
+            <a:off x="1094509" y="2925724"/>
+            <a:ext cx="2410690" cy="646331"/>
+          </a:xfrm>
+          <a:prstGeom prst="rect">
+            <a:avLst/>
+          </a:prstGeom>
+          <a:solidFill>
+            <a:schemeClr val="accent2"/>
+          </a:solidFill>
+        </p:spPr>
+        <p:txBody>
+          <a:bodyPr wrap="square" rtlCol="0">
+            <a:spAutoFit/>
+          </a:bodyPr>
+          <a:lstStyle/>
+          <a:p>
+            <a:pPr lvl="0" algn="ctr"/>
+            <a:r>
               <a:rPr lang="fr-FR" dirty="0"/>
-              <a:t>Je m’abonne</a:t>
-            </a:r>
-          </a:p>
-          <a:p>
+              <a:t>Objet Observateur (Souscripteur)</a:t>
+            </a:r>
+          </a:p>
+        </p:txBody>
+      </p:sp>
+      <p:sp>
+        <p:nvSpPr>
+          <p:cNvPr id="12" name="ZoneTexte 11">
+            <a:extLst>
+              <a:ext uri="{FF2B5EF4-FFF2-40B4-BE49-F238E27FC236}">
+                <a16:creationId xmlns:a16="http://schemas.microsoft.com/office/drawing/2014/main" id="{F88AC6B2-EBA0-0C0C-AC27-2F3A7AF70635}"/>
+              </a:ext>
+            </a:extLst>
+          </p:cNvPr>
+          <p:cNvSpPr txBox="1"/>
+          <p:nvPr/>
+        </p:nvSpPr>
+        <p:spPr>
+          <a:xfrm>
+            <a:off x="1094509" y="4779771"/>
+            <a:ext cx="2410690" cy="646331"/>
+          </a:xfrm>
+          <a:prstGeom prst="rect">
+            <a:avLst/>
+          </a:prstGeom>
+          <a:solidFill>
+            <a:schemeClr val="accent2"/>
+          </a:solidFill>
+        </p:spPr>
+        <p:txBody>
+          <a:bodyPr wrap="square" rtlCol="0">
+            <a:spAutoFit/>
+          </a:bodyPr>
+          <a:lstStyle/>
+          <a:p>
+            <a:pPr lvl="0" algn="ctr"/>
             <a:r>
               <a:rPr lang="fr-FR" dirty="0"/>
-              <a:t>J’observe</a:t>
+              <a:t>Objet Observateur (Souscripteur)</a:t>
+            </a:r>
+          </a:p>
+        </p:txBody>
+      </p:sp>
+      <p:cxnSp>
+        <p:nvCxnSpPr>
+          <p:cNvPr id="15" name="Connecteur droit avec flèche 14">
+            <a:extLst>
+              <a:ext uri="{FF2B5EF4-FFF2-40B4-BE49-F238E27FC236}">
+                <a16:creationId xmlns:a16="http://schemas.microsoft.com/office/drawing/2014/main" id="{74F64545-63E1-1593-E815-C41C6FE4539C}"/>
+              </a:ext>
+            </a:extLst>
+          </p:cNvPr>
+          <p:cNvCxnSpPr/>
+          <p:nvPr/>
+        </p:nvCxnSpPr>
+        <p:spPr>
+          <a:xfrm flipH="1" flipV="1">
+            <a:off x="3643745" y="1378710"/>
+            <a:ext cx="4904509" cy="1712220"/>
+          </a:xfrm>
+          <a:prstGeom prst="straightConnector1">
+            <a:avLst/>
+          </a:prstGeom>
+          <a:ln w="57150">
+            <a:tailEnd type="triangle"/>
+          </a:ln>
+        </p:spPr>
+        <p:style>
+          <a:lnRef idx="1">
+            <a:schemeClr val="accent1"/>
+          </a:lnRef>
+          <a:fillRef idx="0">
+            <a:schemeClr val="accent1"/>
+          </a:fillRef>
+          <a:effectRef idx="0">
+            <a:schemeClr val="accent1"/>
+          </a:effectRef>
+          <a:fontRef idx="minor">
+            <a:schemeClr val="tx1"/>
+          </a:fontRef>
+        </p:style>
+      </p:cxnSp>
+      <p:cxnSp>
+        <p:nvCxnSpPr>
+          <p:cNvPr id="19" name="Connecteur droit avec flèche 18">
+            <a:extLst>
+              <a:ext uri="{FF2B5EF4-FFF2-40B4-BE49-F238E27FC236}">
+                <a16:creationId xmlns:a16="http://schemas.microsoft.com/office/drawing/2014/main" id="{4B78E69C-7175-C43F-98EF-39CC67A8B861}"/>
+              </a:ext>
+            </a:extLst>
+          </p:cNvPr>
+          <p:cNvCxnSpPr>
+            <a:cxnSpLocks/>
+          </p:cNvCxnSpPr>
+          <p:nvPr/>
+        </p:nvCxnSpPr>
+        <p:spPr>
+          <a:xfrm flipH="1">
+            <a:off x="3643744" y="3362234"/>
+            <a:ext cx="4904510" cy="64396"/>
+          </a:xfrm>
+          <a:prstGeom prst="straightConnector1">
+            <a:avLst/>
+          </a:prstGeom>
+          <a:ln w="57150">
+            <a:tailEnd type="triangle"/>
+          </a:ln>
+        </p:spPr>
+        <p:style>
+          <a:lnRef idx="1">
+            <a:schemeClr val="accent1"/>
+          </a:lnRef>
+          <a:fillRef idx="0">
+            <a:schemeClr val="accent1"/>
+          </a:fillRef>
+          <a:effectRef idx="0">
+            <a:schemeClr val="accent1"/>
+          </a:effectRef>
+          <a:fontRef idx="minor">
+            <a:schemeClr val="tx1"/>
+          </a:fontRef>
+        </p:style>
+      </p:cxnSp>
+      <p:cxnSp>
+        <p:nvCxnSpPr>
+          <p:cNvPr id="25" name="Connecteur droit avec flèche 24">
+            <a:extLst>
+              <a:ext uri="{FF2B5EF4-FFF2-40B4-BE49-F238E27FC236}">
+                <a16:creationId xmlns:a16="http://schemas.microsoft.com/office/drawing/2014/main" id="{DA6A501C-1F70-BC7B-D916-8DBB11FFEB8F}"/>
+              </a:ext>
+            </a:extLst>
+          </p:cNvPr>
+          <p:cNvCxnSpPr/>
+          <p:nvPr/>
+        </p:nvCxnSpPr>
+        <p:spPr>
+          <a:xfrm flipH="1">
+            <a:off x="3643744" y="3572055"/>
+            <a:ext cx="4904510" cy="1669646"/>
+          </a:xfrm>
+          <a:prstGeom prst="straightConnector1">
+            <a:avLst/>
+          </a:prstGeom>
+          <a:ln w="57150">
+            <a:tailEnd type="triangle"/>
+          </a:ln>
+        </p:spPr>
+        <p:style>
+          <a:lnRef idx="1">
+            <a:schemeClr val="accent1"/>
+          </a:lnRef>
+          <a:fillRef idx="0">
+            <a:schemeClr val="accent1"/>
+          </a:fillRef>
+          <a:effectRef idx="0">
+            <a:schemeClr val="accent1"/>
+          </a:effectRef>
+          <a:fontRef idx="minor">
+            <a:schemeClr val="tx1"/>
+          </a:fontRef>
+        </p:style>
+      </p:cxnSp>
+      <p:sp>
+        <p:nvSpPr>
+          <p:cNvPr id="26" name="ZoneTexte 25">
+            <a:extLst>
+              <a:ext uri="{FF2B5EF4-FFF2-40B4-BE49-F238E27FC236}">
+                <a16:creationId xmlns:a16="http://schemas.microsoft.com/office/drawing/2014/main" id="{A1ED68B9-9B02-C6A6-795A-50D117556973}"/>
+              </a:ext>
+            </a:extLst>
+          </p:cNvPr>
+          <p:cNvSpPr txBox="1"/>
+          <p:nvPr/>
+        </p:nvSpPr>
+        <p:spPr>
+          <a:xfrm>
+            <a:off x="5140035" y="2234820"/>
+            <a:ext cx="1249251" cy="369332"/>
+          </a:xfrm>
+          <a:prstGeom prst="rect">
+            <a:avLst/>
+          </a:prstGeom>
+          <a:noFill/>
+        </p:spPr>
+        <p:txBody>
+          <a:bodyPr wrap="square" rtlCol="0">
+            <a:spAutoFit/>
+          </a:bodyPr>
+          <a:lstStyle/>
+          <a:p>
+            <a:r>
+              <a:rPr lang="fr-FR" dirty="0">
+                <a:solidFill>
+                  <a:schemeClr val="accent1"/>
+                </a:solidFill>
+              </a:rPr>
+              <a:t>J’informe</a:t>
+            </a:r>
+          </a:p>
+        </p:txBody>
+      </p:sp>
+      <p:sp>
+        <p:nvSpPr>
+          <p:cNvPr id="27" name="ZoneTexte 26">
+            <a:extLst>
+              <a:ext uri="{FF2B5EF4-FFF2-40B4-BE49-F238E27FC236}">
+                <a16:creationId xmlns:a16="http://schemas.microsoft.com/office/drawing/2014/main" id="{99555ED7-DC25-75ED-626F-72313E740E87}"/>
+              </a:ext>
+            </a:extLst>
+          </p:cNvPr>
+          <p:cNvSpPr txBox="1"/>
+          <p:nvPr/>
+        </p:nvSpPr>
+        <p:spPr>
+          <a:xfrm>
+            <a:off x="5150572" y="3392999"/>
+            <a:ext cx="1249251" cy="369332"/>
+          </a:xfrm>
+          <a:prstGeom prst="rect">
+            <a:avLst/>
+          </a:prstGeom>
+          <a:noFill/>
+        </p:spPr>
+        <p:txBody>
+          <a:bodyPr wrap="square" rtlCol="0">
+            <a:spAutoFit/>
+          </a:bodyPr>
+          <a:lstStyle/>
+          <a:p>
+            <a:r>
+              <a:rPr lang="fr-FR" dirty="0">
+                <a:solidFill>
+                  <a:schemeClr val="accent1"/>
+                </a:solidFill>
+              </a:rPr>
+              <a:t>J’informe</a:t>
+            </a:r>
+          </a:p>
+        </p:txBody>
+      </p:sp>
+      <p:sp>
+        <p:nvSpPr>
+          <p:cNvPr id="28" name="ZoneTexte 27">
+            <a:extLst>
+              <a:ext uri="{FF2B5EF4-FFF2-40B4-BE49-F238E27FC236}">
+                <a16:creationId xmlns:a16="http://schemas.microsoft.com/office/drawing/2014/main" id="{5EC815C0-DCE6-5F27-3F0B-30A4DDE28932}"/>
+              </a:ext>
+            </a:extLst>
+          </p:cNvPr>
+          <p:cNvSpPr txBox="1"/>
+          <p:nvPr/>
+        </p:nvSpPr>
+        <p:spPr>
+          <a:xfrm>
+            <a:off x="5150572" y="4730789"/>
+            <a:ext cx="1249251" cy="369332"/>
+          </a:xfrm>
+          <a:prstGeom prst="rect">
+            <a:avLst/>
+          </a:prstGeom>
+          <a:noFill/>
+        </p:spPr>
+        <p:txBody>
+          <a:bodyPr wrap="square" rtlCol="0">
+            <a:spAutoFit/>
+          </a:bodyPr>
+          <a:lstStyle/>
+          <a:p>
+            <a:r>
+              <a:rPr lang="fr-FR" dirty="0">
+                <a:solidFill>
+                  <a:schemeClr val="accent1"/>
+                </a:solidFill>
+              </a:rPr>
+              <a:t>J’informe</a:t>
             </a:r>
           </a:p>
         </p:txBody>
@@ -4064,6 +5008,2543 @@
 </file>
 
 <file path=ppt/slides/slide3.xml><?xml version="1.0" encoding="utf-8"?>
+<p:sld xmlns:a="http://schemas.openxmlformats.org/drawingml/2006/main" xmlns:r="http://schemas.openxmlformats.org/officeDocument/2006/relationships" xmlns:p="http://schemas.openxmlformats.org/presentationml/2006/main">
+  <p:cSld>
+    <p:spTree>
+      <p:nvGrpSpPr>
+        <p:cNvPr id="1" name=""/>
+        <p:cNvGrpSpPr/>
+        <p:nvPr/>
+      </p:nvGrpSpPr>
+      <p:grpSpPr>
+        <a:xfrm>
+          <a:off x="0" y="0"/>
+          <a:ext cx="0" cy="0"/>
+          <a:chOff x="0" y="0"/>
+          <a:chExt cx="0" cy="0"/>
+        </a:xfrm>
+      </p:grpSpPr>
+      <p:sp>
+        <p:nvSpPr>
+          <p:cNvPr id="2" name="Rectangle 1">
+            <a:extLst>
+              <a:ext uri="{FF2B5EF4-FFF2-40B4-BE49-F238E27FC236}">
+                <a16:creationId xmlns:a16="http://schemas.microsoft.com/office/drawing/2014/main" id="{ECA2B811-7811-2F67-357B-673176043A00}"/>
+              </a:ext>
+            </a:extLst>
+          </p:cNvPr>
+          <p:cNvSpPr/>
+          <p:nvPr/>
+        </p:nvSpPr>
+        <p:spPr>
+          <a:xfrm>
+            <a:off x="955964" y="699883"/>
+            <a:ext cx="2687781" cy="1080655"/>
+          </a:xfrm>
+          <a:prstGeom prst="rect">
+            <a:avLst/>
+          </a:prstGeom>
+          <a:solidFill>
+            <a:schemeClr val="accent2"/>
+          </a:solidFill>
+        </p:spPr>
+        <p:style>
+          <a:lnRef idx="2">
+            <a:schemeClr val="accent1">
+              <a:shade val="15000"/>
+            </a:schemeClr>
+          </a:lnRef>
+          <a:fillRef idx="1">
+            <a:schemeClr val="accent1"/>
+          </a:fillRef>
+          <a:effectRef idx="0">
+            <a:schemeClr val="accent1"/>
+          </a:effectRef>
+          <a:fontRef idx="minor">
+            <a:schemeClr val="lt1"/>
+          </a:fontRef>
+        </p:style>
+        <p:txBody>
+          <a:bodyPr rtlCol="0" anchor="ctr"/>
+          <a:lstStyle/>
+          <a:p>
+            <a:pPr algn="ctr"/>
+            <a:endParaRPr lang="fr-FR"/>
+          </a:p>
+        </p:txBody>
+      </p:sp>
+      <p:sp>
+        <p:nvSpPr>
+          <p:cNvPr id="3" name="ZoneTexte 2">
+            <a:extLst>
+              <a:ext uri="{FF2B5EF4-FFF2-40B4-BE49-F238E27FC236}">
+                <a16:creationId xmlns:a16="http://schemas.microsoft.com/office/drawing/2014/main" id="{07FA8C73-8B87-53DE-E9B9-A2872F22116D}"/>
+              </a:ext>
+            </a:extLst>
+          </p:cNvPr>
+          <p:cNvSpPr txBox="1"/>
+          <p:nvPr/>
+        </p:nvSpPr>
+        <p:spPr>
+          <a:xfrm>
+            <a:off x="1094509" y="917045"/>
+            <a:ext cx="2410690" cy="646331"/>
+          </a:xfrm>
+          <a:prstGeom prst="rect">
+            <a:avLst/>
+          </a:prstGeom>
+          <a:solidFill>
+            <a:schemeClr val="accent2"/>
+          </a:solidFill>
+        </p:spPr>
+        <p:txBody>
+          <a:bodyPr wrap="square" rtlCol="0">
+            <a:spAutoFit/>
+          </a:bodyPr>
+          <a:lstStyle/>
+          <a:p>
+            <a:pPr lvl="0" algn="ctr"/>
+            <a:r>
+              <a:rPr lang="fr-FR" dirty="0"/>
+              <a:t>Objet Observateur (Souscripteur)</a:t>
+            </a:r>
+          </a:p>
+        </p:txBody>
+      </p:sp>
+      <p:sp>
+        <p:nvSpPr>
+          <p:cNvPr id="4" name="Rectangle 3">
+            <a:extLst>
+              <a:ext uri="{FF2B5EF4-FFF2-40B4-BE49-F238E27FC236}">
+                <a16:creationId xmlns:a16="http://schemas.microsoft.com/office/drawing/2014/main" id="{F9003BE7-EB5B-BFB7-82F9-ECC25EFF90CA}"/>
+              </a:ext>
+            </a:extLst>
+          </p:cNvPr>
+          <p:cNvSpPr/>
+          <p:nvPr/>
+        </p:nvSpPr>
+        <p:spPr>
+          <a:xfrm>
+            <a:off x="955964" y="2701636"/>
+            <a:ext cx="2687781" cy="1080655"/>
+          </a:xfrm>
+          <a:prstGeom prst="rect">
+            <a:avLst/>
+          </a:prstGeom>
+          <a:solidFill>
+            <a:schemeClr val="accent2"/>
+          </a:solidFill>
+        </p:spPr>
+        <p:style>
+          <a:lnRef idx="2">
+            <a:schemeClr val="accent1">
+              <a:shade val="15000"/>
+            </a:schemeClr>
+          </a:lnRef>
+          <a:fillRef idx="1">
+            <a:schemeClr val="accent1"/>
+          </a:fillRef>
+          <a:effectRef idx="0">
+            <a:schemeClr val="accent1"/>
+          </a:effectRef>
+          <a:fontRef idx="minor">
+            <a:schemeClr val="lt1"/>
+          </a:fontRef>
+        </p:style>
+        <p:txBody>
+          <a:bodyPr rtlCol="0" anchor="ctr"/>
+          <a:lstStyle/>
+          <a:p>
+            <a:pPr algn="ctr"/>
+            <a:endParaRPr lang="fr-FR"/>
+          </a:p>
+        </p:txBody>
+      </p:sp>
+      <p:sp>
+        <p:nvSpPr>
+          <p:cNvPr id="5" name="Rectangle 4">
+            <a:extLst>
+              <a:ext uri="{FF2B5EF4-FFF2-40B4-BE49-F238E27FC236}">
+                <a16:creationId xmlns:a16="http://schemas.microsoft.com/office/drawing/2014/main" id="{9DFBD309-A93C-C0B7-2F87-C332AB5C980E}"/>
+              </a:ext>
+            </a:extLst>
+          </p:cNvPr>
+          <p:cNvSpPr/>
+          <p:nvPr/>
+        </p:nvSpPr>
+        <p:spPr>
+          <a:xfrm>
+            <a:off x="955964" y="4562610"/>
+            <a:ext cx="2687781" cy="1080655"/>
+          </a:xfrm>
+          <a:prstGeom prst="rect">
+            <a:avLst/>
+          </a:prstGeom>
+          <a:solidFill>
+            <a:schemeClr val="accent2"/>
+          </a:solidFill>
+        </p:spPr>
+        <p:style>
+          <a:lnRef idx="2">
+            <a:schemeClr val="accent1">
+              <a:shade val="15000"/>
+            </a:schemeClr>
+          </a:lnRef>
+          <a:fillRef idx="1">
+            <a:schemeClr val="accent1"/>
+          </a:fillRef>
+          <a:effectRef idx="0">
+            <a:schemeClr val="accent1"/>
+          </a:effectRef>
+          <a:fontRef idx="minor">
+            <a:schemeClr val="lt1"/>
+          </a:fontRef>
+        </p:style>
+        <p:txBody>
+          <a:bodyPr rtlCol="0" anchor="ctr"/>
+          <a:lstStyle/>
+          <a:p>
+            <a:pPr algn="ctr"/>
+            <a:endParaRPr lang="fr-FR"/>
+          </a:p>
+        </p:txBody>
+      </p:sp>
+      <p:sp>
+        <p:nvSpPr>
+          <p:cNvPr id="6" name="ZoneTexte 5">
+            <a:extLst>
+              <a:ext uri="{FF2B5EF4-FFF2-40B4-BE49-F238E27FC236}">
+                <a16:creationId xmlns:a16="http://schemas.microsoft.com/office/drawing/2014/main" id="{C4B53183-8D78-1C15-7E20-6C92F469EF37}"/>
+              </a:ext>
+            </a:extLst>
+          </p:cNvPr>
+          <p:cNvSpPr txBox="1"/>
+          <p:nvPr/>
+        </p:nvSpPr>
+        <p:spPr>
+          <a:xfrm>
+            <a:off x="1094509" y="2925724"/>
+            <a:ext cx="2410690" cy="646331"/>
+          </a:xfrm>
+          <a:prstGeom prst="rect">
+            <a:avLst/>
+          </a:prstGeom>
+          <a:solidFill>
+            <a:schemeClr val="accent2"/>
+          </a:solidFill>
+        </p:spPr>
+        <p:txBody>
+          <a:bodyPr wrap="square" rtlCol="0">
+            <a:spAutoFit/>
+          </a:bodyPr>
+          <a:lstStyle/>
+          <a:p>
+            <a:pPr lvl="0" algn="ctr"/>
+            <a:r>
+              <a:rPr lang="fr-FR" dirty="0"/>
+              <a:t>Objet Observateur (Souscripteur)</a:t>
+            </a:r>
+          </a:p>
+        </p:txBody>
+      </p:sp>
+      <p:sp>
+        <p:nvSpPr>
+          <p:cNvPr id="7" name="ZoneTexte 6">
+            <a:extLst>
+              <a:ext uri="{FF2B5EF4-FFF2-40B4-BE49-F238E27FC236}">
+                <a16:creationId xmlns:a16="http://schemas.microsoft.com/office/drawing/2014/main" id="{7935C112-5988-6357-B5E2-C03FC3B35C04}"/>
+              </a:ext>
+            </a:extLst>
+          </p:cNvPr>
+          <p:cNvSpPr txBox="1"/>
+          <p:nvPr/>
+        </p:nvSpPr>
+        <p:spPr>
+          <a:xfrm>
+            <a:off x="1094509" y="4779771"/>
+            <a:ext cx="2410690" cy="646331"/>
+          </a:xfrm>
+          <a:prstGeom prst="rect">
+            <a:avLst/>
+          </a:prstGeom>
+          <a:solidFill>
+            <a:schemeClr val="accent2"/>
+          </a:solidFill>
+        </p:spPr>
+        <p:txBody>
+          <a:bodyPr wrap="square" rtlCol="0">
+            <a:spAutoFit/>
+          </a:bodyPr>
+          <a:lstStyle/>
+          <a:p>
+            <a:pPr lvl="0" algn="ctr"/>
+            <a:r>
+              <a:rPr lang="fr-FR" dirty="0"/>
+              <a:t>Objet Observateur (Souscripteur)</a:t>
+            </a:r>
+          </a:p>
+        </p:txBody>
+      </p:sp>
+      <p:sp>
+        <p:nvSpPr>
+          <p:cNvPr id="8" name="Rectangle 7">
+            <a:extLst>
+              <a:ext uri="{FF2B5EF4-FFF2-40B4-BE49-F238E27FC236}">
+                <a16:creationId xmlns:a16="http://schemas.microsoft.com/office/drawing/2014/main" id="{07653A5A-CB82-77FD-B617-FDCD21625DE1}"/>
+              </a:ext>
+            </a:extLst>
+          </p:cNvPr>
+          <p:cNvSpPr/>
+          <p:nvPr/>
+        </p:nvSpPr>
+        <p:spPr>
+          <a:xfrm>
+            <a:off x="8548257" y="699883"/>
+            <a:ext cx="2687781" cy="1080655"/>
+          </a:xfrm>
+          <a:prstGeom prst="rect">
+            <a:avLst/>
+          </a:prstGeom>
+        </p:spPr>
+        <p:style>
+          <a:lnRef idx="2">
+            <a:schemeClr val="accent1">
+              <a:shade val="15000"/>
+            </a:schemeClr>
+          </a:lnRef>
+          <a:fillRef idx="1">
+            <a:schemeClr val="accent1"/>
+          </a:fillRef>
+          <a:effectRef idx="0">
+            <a:schemeClr val="accent1"/>
+          </a:effectRef>
+          <a:fontRef idx="minor">
+            <a:schemeClr val="lt1"/>
+          </a:fontRef>
+        </p:style>
+        <p:txBody>
+          <a:bodyPr rtlCol="0" anchor="ctr"/>
+          <a:lstStyle/>
+          <a:p>
+            <a:pPr algn="ctr"/>
+            <a:endParaRPr lang="fr-FR"/>
+          </a:p>
+        </p:txBody>
+      </p:sp>
+      <p:sp>
+        <p:nvSpPr>
+          <p:cNvPr id="9" name="ZoneTexte 8">
+            <a:extLst>
+              <a:ext uri="{FF2B5EF4-FFF2-40B4-BE49-F238E27FC236}">
+                <a16:creationId xmlns:a16="http://schemas.microsoft.com/office/drawing/2014/main" id="{9D43C214-A3E4-8B64-979A-94D954136777}"/>
+              </a:ext>
+            </a:extLst>
+          </p:cNvPr>
+          <p:cNvSpPr txBox="1"/>
+          <p:nvPr/>
+        </p:nvSpPr>
+        <p:spPr>
+          <a:xfrm>
+            <a:off x="8732659" y="950677"/>
+            <a:ext cx="2410690" cy="646331"/>
+          </a:xfrm>
+          <a:prstGeom prst="rect">
+            <a:avLst/>
+          </a:prstGeom>
+          <a:noFill/>
+        </p:spPr>
+        <p:txBody>
+          <a:bodyPr wrap="square" rtlCol="0">
+            <a:spAutoFit/>
+          </a:bodyPr>
+          <a:lstStyle/>
+          <a:p>
+            <a:pPr lvl="0" algn="ctr"/>
+            <a:r>
+              <a:rPr lang="fr-FR" dirty="0"/>
+              <a:t> Objet sujet</a:t>
+            </a:r>
+          </a:p>
+          <a:p>
+            <a:pPr lvl="0" algn="ctr"/>
+            <a:r>
+              <a:rPr lang="fr-FR" dirty="0"/>
+              <a:t>(Diffuseur)</a:t>
+            </a:r>
+          </a:p>
+        </p:txBody>
+      </p:sp>
+      <p:sp>
+        <p:nvSpPr>
+          <p:cNvPr id="10" name="Rectangle 9">
+            <a:extLst>
+              <a:ext uri="{FF2B5EF4-FFF2-40B4-BE49-F238E27FC236}">
+                <a16:creationId xmlns:a16="http://schemas.microsoft.com/office/drawing/2014/main" id="{ECDB9E3A-BF0F-DE57-9052-40691C3FC99C}"/>
+              </a:ext>
+            </a:extLst>
+          </p:cNvPr>
+          <p:cNvSpPr/>
+          <p:nvPr/>
+        </p:nvSpPr>
+        <p:spPr>
+          <a:xfrm>
+            <a:off x="8548255" y="4562608"/>
+            <a:ext cx="2687781" cy="1080655"/>
+          </a:xfrm>
+          <a:prstGeom prst="rect">
+            <a:avLst/>
+          </a:prstGeom>
+        </p:spPr>
+        <p:style>
+          <a:lnRef idx="2">
+            <a:schemeClr val="accent1">
+              <a:shade val="15000"/>
+            </a:schemeClr>
+          </a:lnRef>
+          <a:fillRef idx="1">
+            <a:schemeClr val="accent1"/>
+          </a:fillRef>
+          <a:effectRef idx="0">
+            <a:schemeClr val="accent1"/>
+          </a:effectRef>
+          <a:fontRef idx="minor">
+            <a:schemeClr val="lt1"/>
+          </a:fontRef>
+        </p:style>
+        <p:txBody>
+          <a:bodyPr rtlCol="0" anchor="ctr"/>
+          <a:lstStyle/>
+          <a:p>
+            <a:pPr algn="ctr"/>
+            <a:endParaRPr lang="fr-FR"/>
+          </a:p>
+        </p:txBody>
+      </p:sp>
+      <p:sp>
+        <p:nvSpPr>
+          <p:cNvPr id="11" name="ZoneTexte 10">
+            <a:extLst>
+              <a:ext uri="{FF2B5EF4-FFF2-40B4-BE49-F238E27FC236}">
+                <a16:creationId xmlns:a16="http://schemas.microsoft.com/office/drawing/2014/main" id="{74DD0BBA-1A3F-DA96-C0D1-62847BAA6AB0}"/>
+              </a:ext>
+            </a:extLst>
+          </p:cNvPr>
+          <p:cNvSpPr txBox="1"/>
+          <p:nvPr/>
+        </p:nvSpPr>
+        <p:spPr>
+          <a:xfrm>
+            <a:off x="8682315" y="4779769"/>
+            <a:ext cx="2410690" cy="646331"/>
+          </a:xfrm>
+          <a:prstGeom prst="rect">
+            <a:avLst/>
+          </a:prstGeom>
+          <a:noFill/>
+        </p:spPr>
+        <p:txBody>
+          <a:bodyPr wrap="square" rtlCol="0">
+            <a:spAutoFit/>
+          </a:bodyPr>
+          <a:lstStyle/>
+          <a:p>
+            <a:pPr lvl="0" algn="ctr"/>
+            <a:r>
+              <a:rPr lang="fr-FR" dirty="0"/>
+              <a:t> Objet sujet</a:t>
+            </a:r>
+          </a:p>
+          <a:p>
+            <a:pPr lvl="0" algn="ctr"/>
+            <a:r>
+              <a:rPr lang="fr-FR" dirty="0"/>
+              <a:t>(Diffuseur)</a:t>
+            </a:r>
+          </a:p>
+        </p:txBody>
+      </p:sp>
+      <p:sp>
+        <p:nvSpPr>
+          <p:cNvPr id="12" name="Rectangle 11">
+            <a:extLst>
+              <a:ext uri="{FF2B5EF4-FFF2-40B4-BE49-F238E27FC236}">
+                <a16:creationId xmlns:a16="http://schemas.microsoft.com/office/drawing/2014/main" id="{89CE6048-CEF2-104D-DD73-A02AC6CCDEE1}"/>
+              </a:ext>
+            </a:extLst>
+          </p:cNvPr>
+          <p:cNvSpPr/>
+          <p:nvPr/>
+        </p:nvSpPr>
+        <p:spPr>
+          <a:xfrm>
+            <a:off x="8548257" y="2701636"/>
+            <a:ext cx="2687781" cy="1080655"/>
+          </a:xfrm>
+          <a:prstGeom prst="rect">
+            <a:avLst/>
+          </a:prstGeom>
+        </p:spPr>
+        <p:style>
+          <a:lnRef idx="2">
+            <a:schemeClr val="accent1">
+              <a:shade val="15000"/>
+            </a:schemeClr>
+          </a:lnRef>
+          <a:fillRef idx="1">
+            <a:schemeClr val="accent1"/>
+          </a:fillRef>
+          <a:effectRef idx="0">
+            <a:schemeClr val="accent1"/>
+          </a:effectRef>
+          <a:fontRef idx="minor">
+            <a:schemeClr val="lt1"/>
+          </a:fontRef>
+        </p:style>
+        <p:txBody>
+          <a:bodyPr rtlCol="0" anchor="ctr"/>
+          <a:lstStyle/>
+          <a:p>
+            <a:pPr algn="ctr"/>
+            <a:endParaRPr lang="fr-FR"/>
+          </a:p>
+        </p:txBody>
+      </p:sp>
+      <p:sp>
+        <p:nvSpPr>
+          <p:cNvPr id="13" name="ZoneTexte 12">
+            <a:extLst>
+              <a:ext uri="{FF2B5EF4-FFF2-40B4-BE49-F238E27FC236}">
+                <a16:creationId xmlns:a16="http://schemas.microsoft.com/office/drawing/2014/main" id="{59CC8E33-F57A-5746-9EBB-14001950475E}"/>
+              </a:ext>
+            </a:extLst>
+          </p:cNvPr>
+          <p:cNvSpPr txBox="1"/>
+          <p:nvPr/>
+        </p:nvSpPr>
+        <p:spPr>
+          <a:xfrm>
+            <a:off x="8732659" y="2952430"/>
+            <a:ext cx="2410690" cy="646331"/>
+          </a:xfrm>
+          <a:prstGeom prst="rect">
+            <a:avLst/>
+          </a:prstGeom>
+          <a:noFill/>
+        </p:spPr>
+        <p:txBody>
+          <a:bodyPr wrap="square" rtlCol="0">
+            <a:spAutoFit/>
+          </a:bodyPr>
+          <a:lstStyle/>
+          <a:p>
+            <a:pPr lvl="0" algn="ctr"/>
+            <a:r>
+              <a:rPr lang="fr-FR" dirty="0"/>
+              <a:t> Objet sujet</a:t>
+            </a:r>
+          </a:p>
+          <a:p>
+            <a:pPr lvl="0" algn="ctr"/>
+            <a:r>
+              <a:rPr lang="fr-FR" dirty="0"/>
+              <a:t>(Diffuseur)</a:t>
+            </a:r>
+          </a:p>
+        </p:txBody>
+      </p:sp>
+      <p:sp>
+        <p:nvSpPr>
+          <p:cNvPr id="14" name="Rectangle 13">
+            <a:extLst>
+              <a:ext uri="{FF2B5EF4-FFF2-40B4-BE49-F238E27FC236}">
+                <a16:creationId xmlns:a16="http://schemas.microsoft.com/office/drawing/2014/main" id="{50CE4EEB-D4C7-A62C-CEF9-D4C52B9C2B85}"/>
+              </a:ext>
+            </a:extLst>
+          </p:cNvPr>
+          <p:cNvSpPr/>
+          <p:nvPr/>
+        </p:nvSpPr>
+        <p:spPr>
+          <a:xfrm>
+            <a:off x="5125792" y="699883"/>
+            <a:ext cx="1970467" cy="4943380"/>
+          </a:xfrm>
+          <a:prstGeom prst="rect">
+            <a:avLst/>
+          </a:prstGeom>
+          <a:solidFill>
+            <a:schemeClr val="accent6"/>
+          </a:solidFill>
+        </p:spPr>
+        <p:style>
+          <a:lnRef idx="2">
+            <a:schemeClr val="accent1">
+              <a:shade val="15000"/>
+            </a:schemeClr>
+          </a:lnRef>
+          <a:fillRef idx="1">
+            <a:schemeClr val="accent1"/>
+          </a:fillRef>
+          <a:effectRef idx="0">
+            <a:schemeClr val="accent1"/>
+          </a:effectRef>
+          <a:fontRef idx="minor">
+            <a:schemeClr val="lt1"/>
+          </a:fontRef>
+        </p:style>
+        <p:txBody>
+          <a:bodyPr rtlCol="0" anchor="ctr"/>
+          <a:lstStyle/>
+          <a:p>
+            <a:pPr algn="ctr"/>
+            <a:endParaRPr lang="fr-FR"/>
+          </a:p>
+        </p:txBody>
+      </p:sp>
+      <p:sp>
+        <p:nvSpPr>
+          <p:cNvPr id="15" name="ZoneTexte 14">
+            <a:extLst>
+              <a:ext uri="{FF2B5EF4-FFF2-40B4-BE49-F238E27FC236}">
+                <a16:creationId xmlns:a16="http://schemas.microsoft.com/office/drawing/2014/main" id="{7D2A617B-9997-E2A2-9548-F9792986F843}"/>
+              </a:ext>
+            </a:extLst>
+          </p:cNvPr>
+          <p:cNvSpPr txBox="1"/>
+          <p:nvPr/>
+        </p:nvSpPr>
+        <p:spPr>
+          <a:xfrm>
+            <a:off x="5434885" y="3090929"/>
+            <a:ext cx="1365160" cy="369332"/>
+          </a:xfrm>
+          <a:prstGeom prst="rect">
+            <a:avLst/>
+          </a:prstGeom>
+          <a:noFill/>
+        </p:spPr>
+        <p:txBody>
+          <a:bodyPr wrap="square" rtlCol="0">
+            <a:spAutoFit/>
+          </a:bodyPr>
+          <a:lstStyle/>
+          <a:p>
+            <a:pPr algn="ctr"/>
+            <a:r>
+              <a:rPr lang="fr-FR" dirty="0"/>
+              <a:t>Interface</a:t>
+            </a:r>
+          </a:p>
+        </p:txBody>
+      </p:sp>
+      <p:cxnSp>
+        <p:nvCxnSpPr>
+          <p:cNvPr id="17" name="Connecteur droit avec flèche 16">
+            <a:extLst>
+              <a:ext uri="{FF2B5EF4-FFF2-40B4-BE49-F238E27FC236}">
+                <a16:creationId xmlns:a16="http://schemas.microsoft.com/office/drawing/2014/main" id="{E7F5791B-D9CA-1C4F-6A67-CFBDDDD5B78B}"/>
+              </a:ext>
+            </a:extLst>
+          </p:cNvPr>
+          <p:cNvCxnSpPr>
+            <a:cxnSpLocks/>
+          </p:cNvCxnSpPr>
+          <p:nvPr/>
+        </p:nvCxnSpPr>
+        <p:spPr>
+          <a:xfrm>
+            <a:off x="3657112" y="1392611"/>
+            <a:ext cx="1482047" cy="0"/>
+          </a:xfrm>
+          <a:prstGeom prst="straightConnector1">
+            <a:avLst/>
+          </a:prstGeom>
+          <a:ln w="57150">
+            <a:solidFill>
+              <a:schemeClr val="accent2"/>
+            </a:solidFill>
+            <a:tailEnd type="triangle"/>
+          </a:ln>
+        </p:spPr>
+        <p:style>
+          <a:lnRef idx="1">
+            <a:schemeClr val="accent1"/>
+          </a:lnRef>
+          <a:fillRef idx="0">
+            <a:schemeClr val="accent1"/>
+          </a:fillRef>
+          <a:effectRef idx="0">
+            <a:schemeClr val="accent1"/>
+          </a:effectRef>
+          <a:fontRef idx="minor">
+            <a:schemeClr val="tx1"/>
+          </a:fontRef>
+        </p:style>
+      </p:cxnSp>
+      <p:cxnSp>
+        <p:nvCxnSpPr>
+          <p:cNvPr id="19" name="Connecteur droit avec flèche 18">
+            <a:extLst>
+              <a:ext uri="{FF2B5EF4-FFF2-40B4-BE49-F238E27FC236}">
+                <a16:creationId xmlns:a16="http://schemas.microsoft.com/office/drawing/2014/main" id="{33E69925-DF4F-1591-F435-BBDDF6DC30FC}"/>
+              </a:ext>
+            </a:extLst>
+          </p:cNvPr>
+          <p:cNvCxnSpPr>
+            <a:cxnSpLocks/>
+          </p:cNvCxnSpPr>
+          <p:nvPr/>
+        </p:nvCxnSpPr>
+        <p:spPr>
+          <a:xfrm>
+            <a:off x="3657112" y="3472686"/>
+            <a:ext cx="1482047" cy="0"/>
+          </a:xfrm>
+          <a:prstGeom prst="straightConnector1">
+            <a:avLst/>
+          </a:prstGeom>
+          <a:ln w="57150">
+            <a:solidFill>
+              <a:schemeClr val="accent2"/>
+            </a:solidFill>
+            <a:tailEnd type="triangle"/>
+          </a:ln>
+        </p:spPr>
+        <p:style>
+          <a:lnRef idx="1">
+            <a:schemeClr val="accent1"/>
+          </a:lnRef>
+          <a:fillRef idx="0">
+            <a:schemeClr val="accent1"/>
+          </a:fillRef>
+          <a:effectRef idx="0">
+            <a:schemeClr val="accent1"/>
+          </a:effectRef>
+          <a:fontRef idx="minor">
+            <a:schemeClr val="tx1"/>
+          </a:fontRef>
+        </p:style>
+      </p:cxnSp>
+      <p:cxnSp>
+        <p:nvCxnSpPr>
+          <p:cNvPr id="20" name="Connecteur droit avec flèche 19">
+            <a:extLst>
+              <a:ext uri="{FF2B5EF4-FFF2-40B4-BE49-F238E27FC236}">
+                <a16:creationId xmlns:a16="http://schemas.microsoft.com/office/drawing/2014/main" id="{EA77C0D7-5D51-ED09-F7EF-C6C39D30844E}"/>
+              </a:ext>
+            </a:extLst>
+          </p:cNvPr>
+          <p:cNvCxnSpPr>
+            <a:cxnSpLocks/>
+          </p:cNvCxnSpPr>
+          <p:nvPr/>
+        </p:nvCxnSpPr>
+        <p:spPr>
+          <a:xfrm>
+            <a:off x="3643745" y="5294455"/>
+            <a:ext cx="1482047" cy="0"/>
+          </a:xfrm>
+          <a:prstGeom prst="straightConnector1">
+            <a:avLst/>
+          </a:prstGeom>
+          <a:ln w="57150">
+            <a:solidFill>
+              <a:schemeClr val="accent2"/>
+            </a:solidFill>
+            <a:tailEnd type="triangle"/>
+          </a:ln>
+        </p:spPr>
+        <p:style>
+          <a:lnRef idx="1">
+            <a:schemeClr val="accent1"/>
+          </a:lnRef>
+          <a:fillRef idx="0">
+            <a:schemeClr val="accent1"/>
+          </a:fillRef>
+          <a:effectRef idx="0">
+            <a:schemeClr val="accent1"/>
+          </a:effectRef>
+          <a:fontRef idx="minor">
+            <a:schemeClr val="tx1"/>
+          </a:fontRef>
+        </p:style>
+      </p:cxnSp>
+      <p:cxnSp>
+        <p:nvCxnSpPr>
+          <p:cNvPr id="22" name="Connecteur droit avec flèche 21">
+            <a:extLst>
+              <a:ext uri="{FF2B5EF4-FFF2-40B4-BE49-F238E27FC236}">
+                <a16:creationId xmlns:a16="http://schemas.microsoft.com/office/drawing/2014/main" id="{10E20EB0-4BDC-B93B-9704-5953B70DB856}"/>
+              </a:ext>
+            </a:extLst>
+          </p:cNvPr>
+          <p:cNvCxnSpPr>
+            <a:stCxn id="8" idx="1"/>
+          </p:cNvCxnSpPr>
+          <p:nvPr/>
+        </p:nvCxnSpPr>
+        <p:spPr>
+          <a:xfrm flipH="1">
+            <a:off x="7096259" y="1240211"/>
+            <a:ext cx="1451998" cy="0"/>
+          </a:xfrm>
+          <a:prstGeom prst="straightConnector1">
+            <a:avLst/>
+          </a:prstGeom>
+          <a:ln w="57150">
+            <a:tailEnd type="triangle"/>
+          </a:ln>
+        </p:spPr>
+        <p:style>
+          <a:lnRef idx="1">
+            <a:schemeClr val="accent1"/>
+          </a:lnRef>
+          <a:fillRef idx="0">
+            <a:schemeClr val="accent1"/>
+          </a:fillRef>
+          <a:effectRef idx="0">
+            <a:schemeClr val="accent1"/>
+          </a:effectRef>
+          <a:fontRef idx="minor">
+            <a:schemeClr val="tx1"/>
+          </a:fontRef>
+        </p:style>
+      </p:cxnSp>
+      <p:cxnSp>
+        <p:nvCxnSpPr>
+          <p:cNvPr id="23" name="Connecteur droit avec flèche 22">
+            <a:extLst>
+              <a:ext uri="{FF2B5EF4-FFF2-40B4-BE49-F238E27FC236}">
+                <a16:creationId xmlns:a16="http://schemas.microsoft.com/office/drawing/2014/main" id="{FA5D82C4-E330-535A-4489-36C811090EA1}"/>
+              </a:ext>
+            </a:extLst>
+          </p:cNvPr>
+          <p:cNvCxnSpPr/>
+          <p:nvPr/>
+        </p:nvCxnSpPr>
+        <p:spPr>
+          <a:xfrm flipH="1">
+            <a:off x="7096259" y="5138216"/>
+            <a:ext cx="1451998" cy="0"/>
+          </a:xfrm>
+          <a:prstGeom prst="straightConnector1">
+            <a:avLst/>
+          </a:prstGeom>
+          <a:ln w="57150">
+            <a:tailEnd type="triangle"/>
+          </a:ln>
+        </p:spPr>
+        <p:style>
+          <a:lnRef idx="1">
+            <a:schemeClr val="accent1"/>
+          </a:lnRef>
+          <a:fillRef idx="0">
+            <a:schemeClr val="accent1"/>
+          </a:fillRef>
+          <a:effectRef idx="0">
+            <a:schemeClr val="accent1"/>
+          </a:effectRef>
+          <a:fontRef idx="minor">
+            <a:schemeClr val="tx1"/>
+          </a:fontRef>
+        </p:style>
+      </p:cxnSp>
+      <p:cxnSp>
+        <p:nvCxnSpPr>
+          <p:cNvPr id="24" name="Connecteur droit avec flèche 23">
+            <a:extLst>
+              <a:ext uri="{FF2B5EF4-FFF2-40B4-BE49-F238E27FC236}">
+                <a16:creationId xmlns:a16="http://schemas.microsoft.com/office/drawing/2014/main" id="{9AE41D17-4A65-772D-0680-0E7190FD3706}"/>
+              </a:ext>
+            </a:extLst>
+          </p:cNvPr>
+          <p:cNvCxnSpPr/>
+          <p:nvPr/>
+        </p:nvCxnSpPr>
+        <p:spPr>
+          <a:xfrm flipH="1">
+            <a:off x="7096259" y="3324442"/>
+            <a:ext cx="1451998" cy="0"/>
+          </a:xfrm>
+          <a:prstGeom prst="straightConnector1">
+            <a:avLst/>
+          </a:prstGeom>
+          <a:ln w="57150">
+            <a:tailEnd type="triangle"/>
+          </a:ln>
+        </p:spPr>
+        <p:style>
+          <a:lnRef idx="1">
+            <a:schemeClr val="accent1"/>
+          </a:lnRef>
+          <a:fillRef idx="0">
+            <a:schemeClr val="accent1"/>
+          </a:fillRef>
+          <a:effectRef idx="0">
+            <a:schemeClr val="accent1"/>
+          </a:effectRef>
+          <a:fontRef idx="minor">
+            <a:schemeClr val="tx1"/>
+          </a:fontRef>
+        </p:style>
+      </p:cxnSp>
+      <p:cxnSp>
+        <p:nvCxnSpPr>
+          <p:cNvPr id="25" name="Connecteur droit avec flèche 24">
+            <a:extLst>
+              <a:ext uri="{FF2B5EF4-FFF2-40B4-BE49-F238E27FC236}">
+                <a16:creationId xmlns:a16="http://schemas.microsoft.com/office/drawing/2014/main" id="{D40282ED-3483-344E-6879-B8DF1387BFF2}"/>
+              </a:ext>
+            </a:extLst>
+          </p:cNvPr>
+          <p:cNvCxnSpPr>
+            <a:cxnSpLocks/>
+          </p:cNvCxnSpPr>
+          <p:nvPr/>
+        </p:nvCxnSpPr>
+        <p:spPr>
+          <a:xfrm flipH="1">
+            <a:off x="3643745" y="5102934"/>
+            <a:ext cx="1482047" cy="0"/>
+          </a:xfrm>
+          <a:prstGeom prst="straightConnector1">
+            <a:avLst/>
+          </a:prstGeom>
+          <a:ln w="57150">
+            <a:solidFill>
+              <a:schemeClr val="accent6"/>
+            </a:solidFill>
+            <a:tailEnd type="triangle"/>
+          </a:ln>
+        </p:spPr>
+        <p:style>
+          <a:lnRef idx="1">
+            <a:schemeClr val="accent1"/>
+          </a:lnRef>
+          <a:fillRef idx="0">
+            <a:schemeClr val="accent1"/>
+          </a:fillRef>
+          <a:effectRef idx="0">
+            <a:schemeClr val="accent1"/>
+          </a:effectRef>
+          <a:fontRef idx="minor">
+            <a:schemeClr val="tx1"/>
+          </a:fontRef>
+        </p:style>
+      </p:cxnSp>
+      <p:cxnSp>
+        <p:nvCxnSpPr>
+          <p:cNvPr id="26" name="Connecteur droit avec flèche 25">
+            <a:extLst>
+              <a:ext uri="{FF2B5EF4-FFF2-40B4-BE49-F238E27FC236}">
+                <a16:creationId xmlns:a16="http://schemas.microsoft.com/office/drawing/2014/main" id="{57C6046A-E1BB-7C97-ADC3-FB9AE52D4894}"/>
+              </a:ext>
+            </a:extLst>
+          </p:cNvPr>
+          <p:cNvCxnSpPr>
+            <a:cxnSpLocks/>
+          </p:cNvCxnSpPr>
+          <p:nvPr/>
+        </p:nvCxnSpPr>
+        <p:spPr>
+          <a:xfrm flipH="1">
+            <a:off x="3657112" y="3324442"/>
+            <a:ext cx="1468680" cy="12425"/>
+          </a:xfrm>
+          <a:prstGeom prst="straightConnector1">
+            <a:avLst/>
+          </a:prstGeom>
+          <a:ln w="57150">
+            <a:solidFill>
+              <a:schemeClr val="accent6"/>
+            </a:solidFill>
+            <a:tailEnd type="triangle"/>
+          </a:ln>
+        </p:spPr>
+        <p:style>
+          <a:lnRef idx="1">
+            <a:schemeClr val="accent1"/>
+          </a:lnRef>
+          <a:fillRef idx="0">
+            <a:schemeClr val="accent1"/>
+          </a:fillRef>
+          <a:effectRef idx="0">
+            <a:schemeClr val="accent1"/>
+          </a:effectRef>
+          <a:fontRef idx="minor">
+            <a:schemeClr val="tx1"/>
+          </a:fontRef>
+        </p:style>
+      </p:cxnSp>
+      <p:cxnSp>
+        <p:nvCxnSpPr>
+          <p:cNvPr id="27" name="Connecteur droit avec flèche 26">
+            <a:extLst>
+              <a:ext uri="{FF2B5EF4-FFF2-40B4-BE49-F238E27FC236}">
+                <a16:creationId xmlns:a16="http://schemas.microsoft.com/office/drawing/2014/main" id="{2853392C-BE49-03BB-8532-DE8952DBACC5}"/>
+              </a:ext>
+            </a:extLst>
+          </p:cNvPr>
+          <p:cNvCxnSpPr>
+            <a:cxnSpLocks/>
+          </p:cNvCxnSpPr>
+          <p:nvPr/>
+        </p:nvCxnSpPr>
+        <p:spPr>
+          <a:xfrm flipH="1">
+            <a:off x="3657112" y="1241904"/>
+            <a:ext cx="1482047" cy="0"/>
+          </a:xfrm>
+          <a:prstGeom prst="straightConnector1">
+            <a:avLst/>
+          </a:prstGeom>
+          <a:ln w="57150">
+            <a:solidFill>
+              <a:schemeClr val="accent6"/>
+            </a:solidFill>
+            <a:tailEnd type="triangle"/>
+          </a:ln>
+        </p:spPr>
+        <p:style>
+          <a:lnRef idx="1">
+            <a:schemeClr val="accent1"/>
+          </a:lnRef>
+          <a:fillRef idx="0">
+            <a:schemeClr val="accent1"/>
+          </a:fillRef>
+          <a:effectRef idx="0">
+            <a:schemeClr val="accent1"/>
+          </a:effectRef>
+          <a:fontRef idx="minor">
+            <a:schemeClr val="tx1"/>
+          </a:fontRef>
+        </p:style>
+      </p:cxnSp>
+      <p:cxnSp>
+        <p:nvCxnSpPr>
+          <p:cNvPr id="28" name="Connecteur droit avec flèche 27">
+            <a:extLst>
+              <a:ext uri="{FF2B5EF4-FFF2-40B4-BE49-F238E27FC236}">
+                <a16:creationId xmlns:a16="http://schemas.microsoft.com/office/drawing/2014/main" id="{0AD262FD-8E6F-9B4B-CF7F-AA9B85456120}"/>
+              </a:ext>
+            </a:extLst>
+          </p:cNvPr>
+          <p:cNvCxnSpPr>
+            <a:cxnSpLocks/>
+          </p:cNvCxnSpPr>
+          <p:nvPr/>
+        </p:nvCxnSpPr>
+        <p:spPr>
+          <a:xfrm>
+            <a:off x="7096259" y="5269152"/>
+            <a:ext cx="1451996" cy="0"/>
+          </a:xfrm>
+          <a:prstGeom prst="straightConnector1">
+            <a:avLst/>
+          </a:prstGeom>
+          <a:ln w="57150">
+            <a:solidFill>
+              <a:schemeClr val="accent6"/>
+            </a:solidFill>
+            <a:tailEnd type="triangle"/>
+          </a:ln>
+        </p:spPr>
+        <p:style>
+          <a:lnRef idx="1">
+            <a:schemeClr val="accent1"/>
+          </a:lnRef>
+          <a:fillRef idx="0">
+            <a:schemeClr val="accent1"/>
+          </a:fillRef>
+          <a:effectRef idx="0">
+            <a:schemeClr val="accent1"/>
+          </a:effectRef>
+          <a:fontRef idx="minor">
+            <a:schemeClr val="tx1"/>
+          </a:fontRef>
+        </p:style>
+      </p:cxnSp>
+      <p:cxnSp>
+        <p:nvCxnSpPr>
+          <p:cNvPr id="29" name="Connecteur droit avec flèche 28">
+            <a:extLst>
+              <a:ext uri="{FF2B5EF4-FFF2-40B4-BE49-F238E27FC236}">
+                <a16:creationId xmlns:a16="http://schemas.microsoft.com/office/drawing/2014/main" id="{8374D0E0-9450-3D94-D574-4DBA24A74B0A}"/>
+              </a:ext>
+            </a:extLst>
+          </p:cNvPr>
+          <p:cNvCxnSpPr>
+            <a:cxnSpLocks/>
+          </p:cNvCxnSpPr>
+          <p:nvPr/>
+        </p:nvCxnSpPr>
+        <p:spPr>
+          <a:xfrm flipV="1">
+            <a:off x="7096259" y="3460261"/>
+            <a:ext cx="1451996" cy="12425"/>
+          </a:xfrm>
+          <a:prstGeom prst="straightConnector1">
+            <a:avLst/>
+          </a:prstGeom>
+          <a:ln w="57150">
+            <a:solidFill>
+              <a:schemeClr val="accent6"/>
+            </a:solidFill>
+            <a:tailEnd type="triangle"/>
+          </a:ln>
+        </p:spPr>
+        <p:style>
+          <a:lnRef idx="1">
+            <a:schemeClr val="accent1"/>
+          </a:lnRef>
+          <a:fillRef idx="0">
+            <a:schemeClr val="accent1"/>
+          </a:fillRef>
+          <a:effectRef idx="0">
+            <a:schemeClr val="accent1"/>
+          </a:effectRef>
+          <a:fontRef idx="minor">
+            <a:schemeClr val="tx1"/>
+          </a:fontRef>
+        </p:style>
+      </p:cxnSp>
+      <p:cxnSp>
+        <p:nvCxnSpPr>
+          <p:cNvPr id="30" name="Connecteur droit avec flèche 29">
+            <a:extLst>
+              <a:ext uri="{FF2B5EF4-FFF2-40B4-BE49-F238E27FC236}">
+                <a16:creationId xmlns:a16="http://schemas.microsoft.com/office/drawing/2014/main" id="{F5C21D5C-BE2E-7091-76E4-DC4780746CB8}"/>
+              </a:ext>
+            </a:extLst>
+          </p:cNvPr>
+          <p:cNvCxnSpPr>
+            <a:cxnSpLocks/>
+          </p:cNvCxnSpPr>
+          <p:nvPr/>
+        </p:nvCxnSpPr>
+        <p:spPr>
+          <a:xfrm>
+            <a:off x="7096259" y="1392611"/>
+            <a:ext cx="1451996" cy="0"/>
+          </a:xfrm>
+          <a:prstGeom prst="straightConnector1">
+            <a:avLst/>
+          </a:prstGeom>
+          <a:ln w="57150">
+            <a:solidFill>
+              <a:schemeClr val="accent6"/>
+            </a:solidFill>
+            <a:tailEnd type="triangle"/>
+          </a:ln>
+        </p:spPr>
+        <p:style>
+          <a:lnRef idx="1">
+            <a:schemeClr val="accent1"/>
+          </a:lnRef>
+          <a:fillRef idx="0">
+            <a:schemeClr val="accent1"/>
+          </a:fillRef>
+          <a:effectRef idx="0">
+            <a:schemeClr val="accent1"/>
+          </a:effectRef>
+          <a:fontRef idx="minor">
+            <a:schemeClr val="tx1"/>
+          </a:fontRef>
+        </p:style>
+      </p:cxnSp>
+    </p:spTree>
+    <p:extLst>
+      <p:ext uri="{BB962C8B-B14F-4D97-AF65-F5344CB8AC3E}">
+        <p14:creationId xmlns:p14="http://schemas.microsoft.com/office/powerpoint/2010/main" val="2829809620"/>
+      </p:ext>
+    </p:extLst>
+  </p:cSld>
+  <p:clrMapOvr>
+    <a:masterClrMapping/>
+  </p:clrMapOvr>
+</p:sld>
+</file>
+
+<file path=ppt/slides/slide4.xml><?xml version="1.0" encoding="utf-8"?>
+<p:sld xmlns:a="http://schemas.openxmlformats.org/drawingml/2006/main" xmlns:r="http://schemas.openxmlformats.org/officeDocument/2006/relationships" xmlns:p="http://schemas.openxmlformats.org/presentationml/2006/main">
+  <p:cSld>
+    <p:spTree>
+      <p:nvGrpSpPr>
+        <p:cNvPr id="1" name=""/>
+        <p:cNvGrpSpPr/>
+        <p:nvPr/>
+      </p:nvGrpSpPr>
+      <p:grpSpPr>
+        <a:xfrm>
+          <a:off x="0" y="0"/>
+          <a:ext cx="0" cy="0"/>
+          <a:chOff x="0" y="0"/>
+          <a:chExt cx="0" cy="0"/>
+        </a:xfrm>
+      </p:grpSpPr>
+      <p:sp>
+        <p:nvSpPr>
+          <p:cNvPr id="2" name="Rectangle 1">
+            <a:extLst>
+              <a:ext uri="{FF2B5EF4-FFF2-40B4-BE49-F238E27FC236}">
+                <a16:creationId xmlns:a16="http://schemas.microsoft.com/office/drawing/2014/main" id="{A102DA76-BEA8-F808-40C7-8BEEDFE67066}"/>
+              </a:ext>
+            </a:extLst>
+          </p:cNvPr>
+          <p:cNvSpPr/>
+          <p:nvPr/>
+        </p:nvSpPr>
+        <p:spPr>
+          <a:xfrm>
+            <a:off x="527350" y="742618"/>
+            <a:ext cx="2199360" cy="1080655"/>
+          </a:xfrm>
+          <a:prstGeom prst="rect">
+            <a:avLst/>
+          </a:prstGeom>
+          <a:solidFill>
+            <a:schemeClr val="accent2"/>
+          </a:solidFill>
+        </p:spPr>
+        <p:style>
+          <a:lnRef idx="2">
+            <a:schemeClr val="accent1">
+              <a:shade val="15000"/>
+            </a:schemeClr>
+          </a:lnRef>
+          <a:fillRef idx="1">
+            <a:schemeClr val="accent1"/>
+          </a:fillRef>
+          <a:effectRef idx="0">
+            <a:schemeClr val="accent1"/>
+          </a:effectRef>
+          <a:fontRef idx="minor">
+            <a:schemeClr val="lt1"/>
+          </a:fontRef>
+        </p:style>
+        <p:txBody>
+          <a:bodyPr rtlCol="0" anchor="ctr"/>
+          <a:lstStyle/>
+          <a:p>
+            <a:pPr algn="ctr"/>
+            <a:endParaRPr lang="fr-FR"/>
+          </a:p>
+        </p:txBody>
+      </p:sp>
+      <p:sp>
+        <p:nvSpPr>
+          <p:cNvPr id="3" name="ZoneTexte 2">
+            <a:extLst>
+              <a:ext uri="{FF2B5EF4-FFF2-40B4-BE49-F238E27FC236}">
+                <a16:creationId xmlns:a16="http://schemas.microsoft.com/office/drawing/2014/main" id="{EB9CC2DE-5AEF-A25E-94BC-674F4ECFB97B}"/>
+              </a:ext>
+            </a:extLst>
+          </p:cNvPr>
+          <p:cNvSpPr txBox="1"/>
+          <p:nvPr/>
+        </p:nvSpPr>
+        <p:spPr>
+          <a:xfrm>
+            <a:off x="640926" y="845793"/>
+            <a:ext cx="1960125" cy="923330"/>
+          </a:xfrm>
+          <a:prstGeom prst="rect">
+            <a:avLst/>
+          </a:prstGeom>
+          <a:solidFill>
+            <a:schemeClr val="accent2"/>
+          </a:solidFill>
+        </p:spPr>
+        <p:txBody>
+          <a:bodyPr wrap="square" rtlCol="0">
+            <a:spAutoFit/>
+          </a:bodyPr>
+          <a:lstStyle/>
+          <a:p>
+            <a:pPr lvl="0" algn="ctr"/>
+            <a:r>
+              <a:rPr lang="fr-FR" dirty="0"/>
+              <a:t>Classe concrète</a:t>
+            </a:r>
+          </a:p>
+          <a:p>
+            <a:pPr lvl="0" algn="ctr"/>
+            <a:r>
+              <a:rPr lang="fr-FR" sz="1200" dirty="0"/>
+              <a:t> </a:t>
+            </a:r>
+            <a:r>
+              <a:rPr lang="fr-FR" dirty="0"/>
+              <a:t>Objet Observateur (Souscripteur)</a:t>
+            </a:r>
+          </a:p>
+        </p:txBody>
+      </p:sp>
+      <p:sp>
+        <p:nvSpPr>
+          <p:cNvPr id="8" name="Rectangle 7">
+            <a:extLst>
+              <a:ext uri="{FF2B5EF4-FFF2-40B4-BE49-F238E27FC236}">
+                <a16:creationId xmlns:a16="http://schemas.microsoft.com/office/drawing/2014/main" id="{2C5DC5BA-D83C-41FC-C9BD-012B0AABC0DA}"/>
+              </a:ext>
+            </a:extLst>
+          </p:cNvPr>
+          <p:cNvSpPr/>
+          <p:nvPr/>
+        </p:nvSpPr>
+        <p:spPr>
+          <a:xfrm>
+            <a:off x="9691351" y="742617"/>
+            <a:ext cx="1885193" cy="1080655"/>
+          </a:xfrm>
+          <a:prstGeom prst="rect">
+            <a:avLst/>
+          </a:prstGeom>
+        </p:spPr>
+        <p:style>
+          <a:lnRef idx="2">
+            <a:schemeClr val="accent1">
+              <a:shade val="15000"/>
+            </a:schemeClr>
+          </a:lnRef>
+          <a:fillRef idx="1">
+            <a:schemeClr val="accent1"/>
+          </a:fillRef>
+          <a:effectRef idx="0">
+            <a:schemeClr val="accent1"/>
+          </a:effectRef>
+          <a:fontRef idx="minor">
+            <a:schemeClr val="lt1"/>
+          </a:fontRef>
+        </p:style>
+        <p:txBody>
+          <a:bodyPr rtlCol="0" anchor="ctr"/>
+          <a:lstStyle/>
+          <a:p>
+            <a:pPr algn="ctr"/>
+            <a:endParaRPr lang="fr-FR"/>
+          </a:p>
+        </p:txBody>
+      </p:sp>
+      <p:sp>
+        <p:nvSpPr>
+          <p:cNvPr id="9" name="ZoneTexte 8">
+            <a:extLst>
+              <a:ext uri="{FF2B5EF4-FFF2-40B4-BE49-F238E27FC236}">
+                <a16:creationId xmlns:a16="http://schemas.microsoft.com/office/drawing/2014/main" id="{638AF62A-25FF-5419-754E-C8B4A759C7AB}"/>
+              </a:ext>
+            </a:extLst>
+          </p:cNvPr>
+          <p:cNvSpPr txBox="1"/>
+          <p:nvPr/>
+        </p:nvSpPr>
+        <p:spPr>
+          <a:xfrm>
+            <a:off x="9742573" y="872722"/>
+            <a:ext cx="1780939" cy="923330"/>
+          </a:xfrm>
+          <a:prstGeom prst="rect">
+            <a:avLst/>
+          </a:prstGeom>
+          <a:noFill/>
+        </p:spPr>
+        <p:txBody>
+          <a:bodyPr wrap="square" rtlCol="0">
+            <a:spAutoFit/>
+          </a:bodyPr>
+          <a:lstStyle/>
+          <a:p>
+            <a:pPr lvl="0" algn="ctr"/>
+            <a:r>
+              <a:rPr lang="fr-FR" dirty="0"/>
+              <a:t> Classe concrète Objet sujet</a:t>
+            </a:r>
+          </a:p>
+          <a:p>
+            <a:pPr lvl="0" algn="ctr"/>
+            <a:r>
+              <a:rPr lang="fr-FR" dirty="0"/>
+              <a:t>(Diffuseur)</a:t>
+            </a:r>
+          </a:p>
+        </p:txBody>
+      </p:sp>
+      <p:sp>
+        <p:nvSpPr>
+          <p:cNvPr id="14" name="Rectangle 13">
+            <a:extLst>
+              <a:ext uri="{FF2B5EF4-FFF2-40B4-BE49-F238E27FC236}">
+                <a16:creationId xmlns:a16="http://schemas.microsoft.com/office/drawing/2014/main" id="{361A22E7-0E9B-063D-7415-8C50CA1C8F61}"/>
+              </a:ext>
+            </a:extLst>
+          </p:cNvPr>
+          <p:cNvSpPr/>
+          <p:nvPr/>
+        </p:nvSpPr>
+        <p:spPr>
+          <a:xfrm>
+            <a:off x="4165095" y="742616"/>
+            <a:ext cx="1451996" cy="4900778"/>
+          </a:xfrm>
+          <a:prstGeom prst="rect">
+            <a:avLst/>
+          </a:prstGeom>
+          <a:solidFill>
+            <a:schemeClr val="accent2"/>
+          </a:solidFill>
+        </p:spPr>
+        <p:style>
+          <a:lnRef idx="2">
+            <a:schemeClr val="accent1">
+              <a:shade val="15000"/>
+            </a:schemeClr>
+          </a:lnRef>
+          <a:fillRef idx="1">
+            <a:schemeClr val="accent1"/>
+          </a:fillRef>
+          <a:effectRef idx="0">
+            <a:schemeClr val="accent1"/>
+          </a:effectRef>
+          <a:fontRef idx="minor">
+            <a:schemeClr val="lt1"/>
+          </a:fontRef>
+        </p:style>
+        <p:txBody>
+          <a:bodyPr rtlCol="0" anchor="ctr"/>
+          <a:lstStyle/>
+          <a:p>
+            <a:pPr algn="ctr"/>
+            <a:endParaRPr lang="fr-FR"/>
+          </a:p>
+        </p:txBody>
+      </p:sp>
+      <p:sp>
+        <p:nvSpPr>
+          <p:cNvPr id="15" name="ZoneTexte 14">
+            <a:extLst>
+              <a:ext uri="{FF2B5EF4-FFF2-40B4-BE49-F238E27FC236}">
+                <a16:creationId xmlns:a16="http://schemas.microsoft.com/office/drawing/2014/main" id="{723E404B-8FE0-E116-00F2-F37A2D54E32E}"/>
+              </a:ext>
+            </a:extLst>
+          </p:cNvPr>
+          <p:cNvSpPr txBox="1"/>
+          <p:nvPr/>
+        </p:nvSpPr>
+        <p:spPr>
+          <a:xfrm>
+            <a:off x="4168119" y="2725127"/>
+            <a:ext cx="1506828" cy="923330"/>
+          </a:xfrm>
+          <a:prstGeom prst="rect">
+            <a:avLst/>
+          </a:prstGeom>
+          <a:noFill/>
+        </p:spPr>
+        <p:txBody>
+          <a:bodyPr wrap="square" rtlCol="0">
+            <a:spAutoFit/>
+          </a:bodyPr>
+          <a:lstStyle/>
+          <a:p>
+            <a:pPr algn="ctr"/>
+            <a:r>
+              <a:rPr lang="fr-FR" i="1" dirty="0"/>
+              <a:t>Interface</a:t>
+            </a:r>
+          </a:p>
+          <a:p>
+            <a:pPr algn="ctr"/>
+            <a:r>
+              <a:rPr lang="fr-FR" dirty="0"/>
+              <a:t>Observateur</a:t>
+            </a:r>
+          </a:p>
+          <a:p>
+            <a:pPr algn="ctr"/>
+            <a:r>
+              <a:rPr lang="fr-FR" dirty="0"/>
+              <a:t>(Souscripteur)</a:t>
+            </a:r>
+          </a:p>
+        </p:txBody>
+      </p:sp>
+      <p:cxnSp>
+        <p:nvCxnSpPr>
+          <p:cNvPr id="16" name="Connecteur droit avec flèche 15">
+            <a:extLst>
+              <a:ext uri="{FF2B5EF4-FFF2-40B4-BE49-F238E27FC236}">
+                <a16:creationId xmlns:a16="http://schemas.microsoft.com/office/drawing/2014/main" id="{ECBF7B11-D9CA-77F0-6419-305FD38FEFD9}"/>
+              </a:ext>
+            </a:extLst>
+          </p:cNvPr>
+          <p:cNvCxnSpPr>
+            <a:cxnSpLocks/>
+          </p:cNvCxnSpPr>
+          <p:nvPr/>
+        </p:nvCxnSpPr>
+        <p:spPr>
+          <a:xfrm>
+            <a:off x="2734712" y="1433652"/>
+            <a:ext cx="1482047" cy="0"/>
+          </a:xfrm>
+          <a:prstGeom prst="straightConnector1">
+            <a:avLst/>
+          </a:prstGeom>
+          <a:ln w="57150">
+            <a:solidFill>
+              <a:schemeClr val="accent2"/>
+            </a:solidFill>
+            <a:tailEnd type="triangle"/>
+          </a:ln>
+        </p:spPr>
+        <p:style>
+          <a:lnRef idx="1">
+            <a:schemeClr val="accent1"/>
+          </a:lnRef>
+          <a:fillRef idx="0">
+            <a:schemeClr val="accent1"/>
+          </a:fillRef>
+          <a:effectRef idx="0">
+            <a:schemeClr val="accent1"/>
+          </a:effectRef>
+          <a:fontRef idx="minor">
+            <a:schemeClr val="tx1"/>
+          </a:fontRef>
+        </p:style>
+      </p:cxnSp>
+      <p:cxnSp>
+        <p:nvCxnSpPr>
+          <p:cNvPr id="17" name="Connecteur droit avec flèche 16">
+            <a:extLst>
+              <a:ext uri="{FF2B5EF4-FFF2-40B4-BE49-F238E27FC236}">
+                <a16:creationId xmlns:a16="http://schemas.microsoft.com/office/drawing/2014/main" id="{E42E2DE9-7E6E-2F1C-2C76-D5471729CAA5}"/>
+              </a:ext>
+            </a:extLst>
+          </p:cNvPr>
+          <p:cNvCxnSpPr>
+            <a:cxnSpLocks/>
+          </p:cNvCxnSpPr>
+          <p:nvPr/>
+        </p:nvCxnSpPr>
+        <p:spPr>
+          <a:xfrm>
+            <a:off x="2718368" y="3397900"/>
+            <a:ext cx="1482047" cy="0"/>
+          </a:xfrm>
+          <a:prstGeom prst="straightConnector1">
+            <a:avLst/>
+          </a:prstGeom>
+          <a:ln w="57150">
+            <a:solidFill>
+              <a:schemeClr val="accent2"/>
+            </a:solidFill>
+            <a:tailEnd type="triangle"/>
+          </a:ln>
+        </p:spPr>
+        <p:style>
+          <a:lnRef idx="1">
+            <a:schemeClr val="accent1"/>
+          </a:lnRef>
+          <a:fillRef idx="0">
+            <a:schemeClr val="accent1"/>
+          </a:fillRef>
+          <a:effectRef idx="0">
+            <a:schemeClr val="accent1"/>
+          </a:effectRef>
+          <a:fontRef idx="minor">
+            <a:schemeClr val="tx1"/>
+          </a:fontRef>
+        </p:style>
+      </p:cxnSp>
+      <p:cxnSp>
+        <p:nvCxnSpPr>
+          <p:cNvPr id="18" name="Connecteur droit avec flèche 17">
+            <a:extLst>
+              <a:ext uri="{FF2B5EF4-FFF2-40B4-BE49-F238E27FC236}">
+                <a16:creationId xmlns:a16="http://schemas.microsoft.com/office/drawing/2014/main" id="{DD726777-51C8-A72F-D011-A8AB121FB2ED}"/>
+              </a:ext>
+            </a:extLst>
+          </p:cNvPr>
+          <p:cNvCxnSpPr>
+            <a:cxnSpLocks/>
+          </p:cNvCxnSpPr>
+          <p:nvPr/>
+        </p:nvCxnSpPr>
+        <p:spPr>
+          <a:xfrm>
+            <a:off x="2705001" y="5217181"/>
+            <a:ext cx="1482047" cy="0"/>
+          </a:xfrm>
+          <a:prstGeom prst="straightConnector1">
+            <a:avLst/>
+          </a:prstGeom>
+          <a:ln w="57150">
+            <a:solidFill>
+              <a:schemeClr val="accent2"/>
+            </a:solidFill>
+            <a:tailEnd type="triangle"/>
+          </a:ln>
+        </p:spPr>
+        <p:style>
+          <a:lnRef idx="1">
+            <a:schemeClr val="accent1"/>
+          </a:lnRef>
+          <a:fillRef idx="0">
+            <a:schemeClr val="accent1"/>
+          </a:fillRef>
+          <a:effectRef idx="0">
+            <a:schemeClr val="accent1"/>
+          </a:effectRef>
+          <a:fontRef idx="minor">
+            <a:schemeClr val="tx1"/>
+          </a:fontRef>
+        </p:style>
+      </p:cxnSp>
+      <p:cxnSp>
+        <p:nvCxnSpPr>
+          <p:cNvPr id="19" name="Connecteur droit avec flèche 18">
+            <a:extLst>
+              <a:ext uri="{FF2B5EF4-FFF2-40B4-BE49-F238E27FC236}">
+                <a16:creationId xmlns:a16="http://schemas.microsoft.com/office/drawing/2014/main" id="{DAA46DFF-E93E-C986-310D-457A36313FA8}"/>
+              </a:ext>
+            </a:extLst>
+          </p:cNvPr>
+          <p:cNvCxnSpPr>
+            <a:cxnSpLocks/>
+            <a:stCxn id="8" idx="1"/>
+          </p:cNvCxnSpPr>
+          <p:nvPr/>
+        </p:nvCxnSpPr>
+        <p:spPr>
+          <a:xfrm flipH="1">
+            <a:off x="8239353" y="1282945"/>
+            <a:ext cx="1451998" cy="0"/>
+          </a:xfrm>
+          <a:prstGeom prst="straightConnector1">
+            <a:avLst/>
+          </a:prstGeom>
+          <a:ln w="57150">
+            <a:tailEnd type="triangle"/>
+          </a:ln>
+        </p:spPr>
+        <p:style>
+          <a:lnRef idx="1">
+            <a:schemeClr val="accent1"/>
+          </a:lnRef>
+          <a:fillRef idx="0">
+            <a:schemeClr val="accent1"/>
+          </a:fillRef>
+          <a:effectRef idx="0">
+            <a:schemeClr val="accent1"/>
+          </a:effectRef>
+          <a:fontRef idx="minor">
+            <a:schemeClr val="tx1"/>
+          </a:fontRef>
+        </p:style>
+      </p:cxnSp>
+      <p:cxnSp>
+        <p:nvCxnSpPr>
+          <p:cNvPr id="20" name="Connecteur droit avec flèche 19">
+            <a:extLst>
+              <a:ext uri="{FF2B5EF4-FFF2-40B4-BE49-F238E27FC236}">
+                <a16:creationId xmlns:a16="http://schemas.microsoft.com/office/drawing/2014/main" id="{7A4A5FA6-69DD-7E27-A117-99B9E285A7E9}"/>
+              </a:ext>
+            </a:extLst>
+          </p:cNvPr>
+          <p:cNvCxnSpPr/>
+          <p:nvPr/>
+        </p:nvCxnSpPr>
+        <p:spPr>
+          <a:xfrm flipH="1">
+            <a:off x="8239353" y="5076721"/>
+            <a:ext cx="1451998" cy="0"/>
+          </a:xfrm>
+          <a:prstGeom prst="straightConnector1">
+            <a:avLst/>
+          </a:prstGeom>
+          <a:ln w="57150">
+            <a:tailEnd type="triangle"/>
+          </a:ln>
+        </p:spPr>
+        <p:style>
+          <a:lnRef idx="1">
+            <a:schemeClr val="accent1"/>
+          </a:lnRef>
+          <a:fillRef idx="0">
+            <a:schemeClr val="accent1"/>
+          </a:fillRef>
+          <a:effectRef idx="0">
+            <a:schemeClr val="accent1"/>
+          </a:effectRef>
+          <a:fontRef idx="minor">
+            <a:schemeClr val="tx1"/>
+          </a:fontRef>
+        </p:style>
+      </p:cxnSp>
+      <p:cxnSp>
+        <p:nvCxnSpPr>
+          <p:cNvPr id="21" name="Connecteur droit avec flèche 20">
+            <a:extLst>
+              <a:ext uri="{FF2B5EF4-FFF2-40B4-BE49-F238E27FC236}">
+                <a16:creationId xmlns:a16="http://schemas.microsoft.com/office/drawing/2014/main" id="{B898A5E8-CD25-8F17-D2C5-A01C612C4F6F}"/>
+              </a:ext>
+            </a:extLst>
+          </p:cNvPr>
+          <p:cNvCxnSpPr/>
+          <p:nvPr/>
+        </p:nvCxnSpPr>
+        <p:spPr>
+          <a:xfrm flipH="1">
+            <a:off x="8224424" y="3312017"/>
+            <a:ext cx="1451998" cy="0"/>
+          </a:xfrm>
+          <a:prstGeom prst="straightConnector1">
+            <a:avLst/>
+          </a:prstGeom>
+          <a:ln w="57150">
+            <a:tailEnd type="triangle"/>
+          </a:ln>
+        </p:spPr>
+        <p:style>
+          <a:lnRef idx="1">
+            <a:schemeClr val="accent1"/>
+          </a:lnRef>
+          <a:fillRef idx="0">
+            <a:schemeClr val="accent1"/>
+          </a:fillRef>
+          <a:effectRef idx="0">
+            <a:schemeClr val="accent1"/>
+          </a:effectRef>
+          <a:fontRef idx="minor">
+            <a:schemeClr val="tx1"/>
+          </a:fontRef>
+        </p:style>
+      </p:cxnSp>
+      <p:cxnSp>
+        <p:nvCxnSpPr>
+          <p:cNvPr id="22" name="Connecteur droit avec flèche 21">
+            <a:extLst>
+              <a:ext uri="{FF2B5EF4-FFF2-40B4-BE49-F238E27FC236}">
+                <a16:creationId xmlns:a16="http://schemas.microsoft.com/office/drawing/2014/main" id="{9723FBA4-FA45-DA24-6CF6-5F08681042FE}"/>
+              </a:ext>
+            </a:extLst>
+          </p:cNvPr>
+          <p:cNvCxnSpPr>
+            <a:cxnSpLocks/>
+          </p:cNvCxnSpPr>
+          <p:nvPr/>
+        </p:nvCxnSpPr>
+        <p:spPr>
+          <a:xfrm flipH="1">
+            <a:off x="2705001" y="5025660"/>
+            <a:ext cx="1482047" cy="0"/>
+          </a:xfrm>
+          <a:prstGeom prst="straightConnector1">
+            <a:avLst/>
+          </a:prstGeom>
+          <a:ln w="57150">
+            <a:solidFill>
+              <a:schemeClr val="accent1"/>
+            </a:solidFill>
+            <a:tailEnd type="triangle"/>
+          </a:ln>
+        </p:spPr>
+        <p:style>
+          <a:lnRef idx="1">
+            <a:schemeClr val="accent1"/>
+          </a:lnRef>
+          <a:fillRef idx="0">
+            <a:schemeClr val="accent1"/>
+          </a:fillRef>
+          <a:effectRef idx="0">
+            <a:schemeClr val="accent1"/>
+          </a:effectRef>
+          <a:fontRef idx="minor">
+            <a:schemeClr val="tx1"/>
+          </a:fontRef>
+        </p:style>
+      </p:cxnSp>
+      <p:cxnSp>
+        <p:nvCxnSpPr>
+          <p:cNvPr id="23" name="Connecteur droit avec flèche 22">
+            <a:extLst>
+              <a:ext uri="{FF2B5EF4-FFF2-40B4-BE49-F238E27FC236}">
+                <a16:creationId xmlns:a16="http://schemas.microsoft.com/office/drawing/2014/main" id="{8991BCEA-9E6E-22F0-3A3A-486FB1072C6A}"/>
+              </a:ext>
+            </a:extLst>
+          </p:cNvPr>
+          <p:cNvCxnSpPr>
+            <a:cxnSpLocks/>
+          </p:cNvCxnSpPr>
+          <p:nvPr/>
+        </p:nvCxnSpPr>
+        <p:spPr>
+          <a:xfrm flipH="1">
+            <a:off x="2718368" y="3249656"/>
+            <a:ext cx="1468680" cy="12425"/>
+          </a:xfrm>
+          <a:prstGeom prst="straightConnector1">
+            <a:avLst/>
+          </a:prstGeom>
+          <a:ln w="57150">
+            <a:solidFill>
+              <a:schemeClr val="accent1"/>
+            </a:solidFill>
+            <a:tailEnd type="triangle"/>
+          </a:ln>
+        </p:spPr>
+        <p:style>
+          <a:lnRef idx="1">
+            <a:schemeClr val="accent1"/>
+          </a:lnRef>
+          <a:fillRef idx="0">
+            <a:schemeClr val="accent1"/>
+          </a:fillRef>
+          <a:effectRef idx="0">
+            <a:schemeClr val="accent1"/>
+          </a:effectRef>
+          <a:fontRef idx="minor">
+            <a:schemeClr val="tx1"/>
+          </a:fontRef>
+        </p:style>
+      </p:cxnSp>
+      <p:cxnSp>
+        <p:nvCxnSpPr>
+          <p:cNvPr id="24" name="Connecteur droit avec flèche 23">
+            <a:extLst>
+              <a:ext uri="{FF2B5EF4-FFF2-40B4-BE49-F238E27FC236}">
+                <a16:creationId xmlns:a16="http://schemas.microsoft.com/office/drawing/2014/main" id="{E58E7343-008E-BA0B-13B7-C2C77E015444}"/>
+              </a:ext>
+            </a:extLst>
+          </p:cNvPr>
+          <p:cNvCxnSpPr>
+            <a:cxnSpLocks/>
+          </p:cNvCxnSpPr>
+          <p:nvPr/>
+        </p:nvCxnSpPr>
+        <p:spPr>
+          <a:xfrm flipH="1">
+            <a:off x="2734712" y="1282945"/>
+            <a:ext cx="1433407" cy="0"/>
+          </a:xfrm>
+          <a:prstGeom prst="straightConnector1">
+            <a:avLst/>
+          </a:prstGeom>
+          <a:ln w="57150">
+            <a:solidFill>
+              <a:schemeClr val="accent1"/>
+            </a:solidFill>
+            <a:tailEnd type="triangle"/>
+          </a:ln>
+        </p:spPr>
+        <p:style>
+          <a:lnRef idx="1">
+            <a:schemeClr val="accent1"/>
+          </a:lnRef>
+          <a:fillRef idx="0">
+            <a:schemeClr val="accent1"/>
+          </a:fillRef>
+          <a:effectRef idx="0">
+            <a:schemeClr val="accent1"/>
+          </a:effectRef>
+          <a:fontRef idx="minor">
+            <a:schemeClr val="tx1"/>
+          </a:fontRef>
+        </p:style>
+      </p:cxnSp>
+      <p:cxnSp>
+        <p:nvCxnSpPr>
+          <p:cNvPr id="25" name="Connecteur droit avec flèche 24">
+            <a:extLst>
+              <a:ext uri="{FF2B5EF4-FFF2-40B4-BE49-F238E27FC236}">
+                <a16:creationId xmlns:a16="http://schemas.microsoft.com/office/drawing/2014/main" id="{728F5C3E-8441-7DEB-8E2C-735498385B72}"/>
+              </a:ext>
+            </a:extLst>
+          </p:cNvPr>
+          <p:cNvCxnSpPr>
+            <a:cxnSpLocks/>
+          </p:cNvCxnSpPr>
+          <p:nvPr/>
+        </p:nvCxnSpPr>
+        <p:spPr>
+          <a:xfrm>
+            <a:off x="8239353" y="5207657"/>
+            <a:ext cx="1451996" cy="0"/>
+          </a:xfrm>
+          <a:prstGeom prst="straightConnector1">
+            <a:avLst/>
+          </a:prstGeom>
+          <a:ln w="57150">
+            <a:solidFill>
+              <a:schemeClr val="accent2"/>
+            </a:solidFill>
+            <a:tailEnd type="triangle"/>
+          </a:ln>
+        </p:spPr>
+        <p:style>
+          <a:lnRef idx="1">
+            <a:schemeClr val="accent1"/>
+          </a:lnRef>
+          <a:fillRef idx="0">
+            <a:schemeClr val="accent1"/>
+          </a:fillRef>
+          <a:effectRef idx="0">
+            <a:schemeClr val="accent1"/>
+          </a:effectRef>
+          <a:fontRef idx="minor">
+            <a:schemeClr val="tx1"/>
+          </a:fontRef>
+        </p:style>
+      </p:cxnSp>
+      <p:cxnSp>
+        <p:nvCxnSpPr>
+          <p:cNvPr id="26" name="Connecteur droit avec flèche 25">
+            <a:extLst>
+              <a:ext uri="{FF2B5EF4-FFF2-40B4-BE49-F238E27FC236}">
+                <a16:creationId xmlns:a16="http://schemas.microsoft.com/office/drawing/2014/main" id="{8DADFB82-F48F-501D-A060-6DB3FEBBC9A7}"/>
+              </a:ext>
+            </a:extLst>
+          </p:cNvPr>
+          <p:cNvCxnSpPr>
+            <a:cxnSpLocks/>
+          </p:cNvCxnSpPr>
+          <p:nvPr/>
+        </p:nvCxnSpPr>
+        <p:spPr>
+          <a:xfrm flipV="1">
+            <a:off x="8224424" y="3447836"/>
+            <a:ext cx="1451996" cy="12425"/>
+          </a:xfrm>
+          <a:prstGeom prst="straightConnector1">
+            <a:avLst/>
+          </a:prstGeom>
+          <a:ln w="57150">
+            <a:solidFill>
+              <a:schemeClr val="accent2"/>
+            </a:solidFill>
+            <a:tailEnd type="triangle"/>
+          </a:ln>
+        </p:spPr>
+        <p:style>
+          <a:lnRef idx="1">
+            <a:schemeClr val="accent1"/>
+          </a:lnRef>
+          <a:fillRef idx="0">
+            <a:schemeClr val="accent1"/>
+          </a:fillRef>
+          <a:effectRef idx="0">
+            <a:schemeClr val="accent1"/>
+          </a:effectRef>
+          <a:fontRef idx="minor">
+            <a:schemeClr val="tx1"/>
+          </a:fontRef>
+        </p:style>
+      </p:cxnSp>
+      <p:cxnSp>
+        <p:nvCxnSpPr>
+          <p:cNvPr id="27" name="Connecteur droit avec flèche 26">
+            <a:extLst>
+              <a:ext uri="{FF2B5EF4-FFF2-40B4-BE49-F238E27FC236}">
+                <a16:creationId xmlns:a16="http://schemas.microsoft.com/office/drawing/2014/main" id="{3A5015FC-812B-81E3-CA37-CC0CA7908E71}"/>
+              </a:ext>
+            </a:extLst>
+          </p:cNvPr>
+          <p:cNvCxnSpPr>
+            <a:cxnSpLocks/>
+          </p:cNvCxnSpPr>
+          <p:nvPr/>
+        </p:nvCxnSpPr>
+        <p:spPr>
+          <a:xfrm>
+            <a:off x="8290577" y="1433652"/>
+            <a:ext cx="1451996" cy="0"/>
+          </a:xfrm>
+          <a:prstGeom prst="straightConnector1">
+            <a:avLst/>
+          </a:prstGeom>
+          <a:ln w="57150">
+            <a:solidFill>
+              <a:schemeClr val="accent2"/>
+            </a:solidFill>
+            <a:tailEnd type="triangle"/>
+          </a:ln>
+        </p:spPr>
+        <p:style>
+          <a:lnRef idx="1">
+            <a:schemeClr val="accent1"/>
+          </a:lnRef>
+          <a:fillRef idx="0">
+            <a:schemeClr val="accent1"/>
+          </a:fillRef>
+          <a:effectRef idx="0">
+            <a:schemeClr val="accent1"/>
+          </a:effectRef>
+          <a:fontRef idx="minor">
+            <a:schemeClr val="tx1"/>
+          </a:fontRef>
+        </p:style>
+      </p:cxnSp>
+      <p:sp>
+        <p:nvSpPr>
+          <p:cNvPr id="28" name="Rectangle 27">
+            <a:extLst>
+              <a:ext uri="{FF2B5EF4-FFF2-40B4-BE49-F238E27FC236}">
+                <a16:creationId xmlns:a16="http://schemas.microsoft.com/office/drawing/2014/main" id="{C496953A-FF81-E902-E3D3-297CC32E4024}"/>
+              </a:ext>
+            </a:extLst>
+          </p:cNvPr>
+          <p:cNvSpPr/>
+          <p:nvPr/>
+        </p:nvSpPr>
+        <p:spPr>
+          <a:xfrm>
+            <a:off x="527350" y="2701636"/>
+            <a:ext cx="2199360" cy="1080655"/>
+          </a:xfrm>
+          <a:prstGeom prst="rect">
+            <a:avLst/>
+          </a:prstGeom>
+          <a:solidFill>
+            <a:schemeClr val="accent2"/>
+          </a:solidFill>
+        </p:spPr>
+        <p:style>
+          <a:lnRef idx="2">
+            <a:schemeClr val="accent1">
+              <a:shade val="15000"/>
+            </a:schemeClr>
+          </a:lnRef>
+          <a:fillRef idx="1">
+            <a:schemeClr val="accent1"/>
+          </a:fillRef>
+          <a:effectRef idx="0">
+            <a:schemeClr val="accent1"/>
+          </a:effectRef>
+          <a:fontRef idx="minor">
+            <a:schemeClr val="lt1"/>
+          </a:fontRef>
+        </p:style>
+        <p:txBody>
+          <a:bodyPr rtlCol="0" anchor="ctr"/>
+          <a:lstStyle/>
+          <a:p>
+            <a:pPr algn="ctr"/>
+            <a:endParaRPr lang="fr-FR"/>
+          </a:p>
+        </p:txBody>
+      </p:sp>
+      <p:sp>
+        <p:nvSpPr>
+          <p:cNvPr id="29" name="ZoneTexte 28">
+            <a:extLst>
+              <a:ext uri="{FF2B5EF4-FFF2-40B4-BE49-F238E27FC236}">
+                <a16:creationId xmlns:a16="http://schemas.microsoft.com/office/drawing/2014/main" id="{B2D9FA1A-50CA-1DC2-82CE-D0ABB1FE5A62}"/>
+              </a:ext>
+            </a:extLst>
+          </p:cNvPr>
+          <p:cNvSpPr txBox="1"/>
+          <p:nvPr/>
+        </p:nvSpPr>
+        <p:spPr>
+          <a:xfrm>
+            <a:off x="703105" y="2780298"/>
+            <a:ext cx="1906268" cy="923330"/>
+          </a:xfrm>
+          <a:prstGeom prst="rect">
+            <a:avLst/>
+          </a:prstGeom>
+          <a:solidFill>
+            <a:schemeClr val="accent2"/>
+          </a:solidFill>
+        </p:spPr>
+        <p:txBody>
+          <a:bodyPr wrap="square" rtlCol="0">
+            <a:spAutoFit/>
+          </a:bodyPr>
+          <a:lstStyle/>
+          <a:p>
+            <a:pPr lvl="0" algn="ctr"/>
+            <a:r>
+              <a:rPr lang="fr-FR" dirty="0"/>
+              <a:t>Classe concrète</a:t>
+            </a:r>
+            <a:r>
+              <a:rPr lang="fr-FR" sz="1200" dirty="0"/>
+              <a:t> </a:t>
+            </a:r>
+          </a:p>
+          <a:p>
+            <a:pPr lvl="0" algn="ctr"/>
+            <a:r>
+              <a:rPr lang="fr-FR" dirty="0"/>
+              <a:t>Objet Observateur (Souscripteur)</a:t>
+            </a:r>
+          </a:p>
+        </p:txBody>
+      </p:sp>
+      <p:sp>
+        <p:nvSpPr>
+          <p:cNvPr id="30" name="Rectangle 29">
+            <a:extLst>
+              <a:ext uri="{FF2B5EF4-FFF2-40B4-BE49-F238E27FC236}">
+                <a16:creationId xmlns:a16="http://schemas.microsoft.com/office/drawing/2014/main" id="{093D1E1F-5E09-EBE8-09A6-77C7A9D1F7C3}"/>
+              </a:ext>
+            </a:extLst>
+          </p:cNvPr>
+          <p:cNvSpPr/>
+          <p:nvPr/>
+        </p:nvSpPr>
+        <p:spPr>
+          <a:xfrm>
+            <a:off x="523720" y="4597321"/>
+            <a:ext cx="2199360" cy="1080655"/>
+          </a:xfrm>
+          <a:prstGeom prst="rect">
+            <a:avLst/>
+          </a:prstGeom>
+          <a:solidFill>
+            <a:schemeClr val="accent2"/>
+          </a:solidFill>
+        </p:spPr>
+        <p:style>
+          <a:lnRef idx="2">
+            <a:schemeClr val="accent1">
+              <a:shade val="15000"/>
+            </a:schemeClr>
+          </a:lnRef>
+          <a:fillRef idx="1">
+            <a:schemeClr val="accent1"/>
+          </a:fillRef>
+          <a:effectRef idx="0">
+            <a:schemeClr val="accent1"/>
+          </a:effectRef>
+          <a:fontRef idx="minor">
+            <a:schemeClr val="lt1"/>
+          </a:fontRef>
+        </p:style>
+        <p:txBody>
+          <a:bodyPr rtlCol="0" anchor="ctr"/>
+          <a:lstStyle/>
+          <a:p>
+            <a:pPr algn="ctr"/>
+            <a:endParaRPr lang="fr-FR"/>
+          </a:p>
+        </p:txBody>
+      </p:sp>
+      <p:sp>
+        <p:nvSpPr>
+          <p:cNvPr id="31" name="ZoneTexte 30">
+            <a:extLst>
+              <a:ext uri="{FF2B5EF4-FFF2-40B4-BE49-F238E27FC236}">
+                <a16:creationId xmlns:a16="http://schemas.microsoft.com/office/drawing/2014/main" id="{1070B2A8-5B19-1D45-6263-0F514CE919D4}"/>
+              </a:ext>
+            </a:extLst>
+          </p:cNvPr>
+          <p:cNvSpPr txBox="1"/>
+          <p:nvPr/>
+        </p:nvSpPr>
+        <p:spPr>
+          <a:xfrm>
+            <a:off x="634041" y="4675983"/>
+            <a:ext cx="1906268" cy="923330"/>
+          </a:xfrm>
+          <a:prstGeom prst="rect">
+            <a:avLst/>
+          </a:prstGeom>
+          <a:solidFill>
+            <a:schemeClr val="accent2"/>
+          </a:solidFill>
+        </p:spPr>
+        <p:txBody>
+          <a:bodyPr wrap="square" rtlCol="0">
+            <a:spAutoFit/>
+          </a:bodyPr>
+          <a:lstStyle/>
+          <a:p>
+            <a:pPr lvl="0" algn="ctr"/>
+            <a:r>
+              <a:rPr lang="fr-FR" dirty="0"/>
+              <a:t>Classe concrète</a:t>
+            </a:r>
+          </a:p>
+          <a:p>
+            <a:pPr lvl="0" algn="ctr"/>
+            <a:r>
+              <a:rPr lang="fr-FR" dirty="0"/>
+              <a:t>Objet Observateur (Souscripteur)</a:t>
+            </a:r>
+          </a:p>
+        </p:txBody>
+      </p:sp>
+      <p:sp>
+        <p:nvSpPr>
+          <p:cNvPr id="38" name="Rectangle 37">
+            <a:extLst>
+              <a:ext uri="{FF2B5EF4-FFF2-40B4-BE49-F238E27FC236}">
+                <a16:creationId xmlns:a16="http://schemas.microsoft.com/office/drawing/2014/main" id="{5FF4698C-2C4E-86FE-A9CC-ABFD232C4932}"/>
+              </a:ext>
+            </a:extLst>
+          </p:cNvPr>
+          <p:cNvSpPr/>
+          <p:nvPr/>
+        </p:nvSpPr>
+        <p:spPr>
+          <a:xfrm>
+            <a:off x="6797945" y="742617"/>
+            <a:ext cx="1439599" cy="4888351"/>
+          </a:xfrm>
+          <a:prstGeom prst="rect">
+            <a:avLst/>
+          </a:prstGeom>
+        </p:spPr>
+        <p:style>
+          <a:lnRef idx="2">
+            <a:schemeClr val="accent1">
+              <a:shade val="15000"/>
+            </a:schemeClr>
+          </a:lnRef>
+          <a:fillRef idx="1">
+            <a:schemeClr val="accent1"/>
+          </a:fillRef>
+          <a:effectRef idx="0">
+            <a:schemeClr val="accent1"/>
+          </a:effectRef>
+          <a:fontRef idx="minor">
+            <a:schemeClr val="lt1"/>
+          </a:fontRef>
+        </p:style>
+        <p:txBody>
+          <a:bodyPr rtlCol="0" anchor="ctr"/>
+          <a:lstStyle/>
+          <a:p>
+            <a:pPr algn="ctr"/>
+            <a:endParaRPr lang="fr-FR"/>
+          </a:p>
+        </p:txBody>
+      </p:sp>
+      <p:sp>
+        <p:nvSpPr>
+          <p:cNvPr id="39" name="ZoneTexte 38">
+            <a:extLst>
+              <a:ext uri="{FF2B5EF4-FFF2-40B4-BE49-F238E27FC236}">
+                <a16:creationId xmlns:a16="http://schemas.microsoft.com/office/drawing/2014/main" id="{79CC0248-A3AE-D40D-C7ED-7499004398AC}"/>
+              </a:ext>
+            </a:extLst>
+          </p:cNvPr>
+          <p:cNvSpPr txBox="1"/>
+          <p:nvPr/>
+        </p:nvSpPr>
+        <p:spPr>
+          <a:xfrm>
+            <a:off x="6824461" y="2787991"/>
+            <a:ext cx="1439599" cy="923330"/>
+          </a:xfrm>
+          <a:prstGeom prst="rect">
+            <a:avLst/>
+          </a:prstGeom>
+          <a:noFill/>
+        </p:spPr>
+        <p:txBody>
+          <a:bodyPr wrap="square" rtlCol="0">
+            <a:spAutoFit/>
+          </a:bodyPr>
+          <a:lstStyle/>
+          <a:p>
+            <a:pPr algn="ctr"/>
+            <a:r>
+              <a:rPr lang="fr-FR" i="1" dirty="0"/>
+              <a:t>Interface</a:t>
+            </a:r>
+          </a:p>
+          <a:p>
+            <a:pPr algn="ctr"/>
+            <a:r>
+              <a:rPr lang="fr-FR" dirty="0"/>
+              <a:t>Sujet</a:t>
+            </a:r>
+          </a:p>
+          <a:p>
+            <a:pPr algn="ctr"/>
+            <a:r>
+              <a:rPr lang="fr-FR" dirty="0"/>
+              <a:t>(Diffuseur)</a:t>
+            </a:r>
+          </a:p>
+        </p:txBody>
+      </p:sp>
+      <p:cxnSp>
+        <p:nvCxnSpPr>
+          <p:cNvPr id="42" name="Connecteur droit avec flèche 41">
+            <a:extLst>
+              <a:ext uri="{FF2B5EF4-FFF2-40B4-BE49-F238E27FC236}">
+                <a16:creationId xmlns:a16="http://schemas.microsoft.com/office/drawing/2014/main" id="{E896A090-2C48-7134-EB5C-BD235C4C27D4}"/>
+              </a:ext>
+            </a:extLst>
+          </p:cNvPr>
+          <p:cNvCxnSpPr/>
+          <p:nvPr/>
+        </p:nvCxnSpPr>
+        <p:spPr>
+          <a:xfrm flipH="1">
+            <a:off x="5628118" y="2925349"/>
+            <a:ext cx="1169827" cy="0"/>
+          </a:xfrm>
+          <a:prstGeom prst="straightConnector1">
+            <a:avLst/>
+          </a:prstGeom>
+          <a:ln w="57150">
+            <a:tailEnd type="triangle"/>
+          </a:ln>
+        </p:spPr>
+        <p:style>
+          <a:lnRef idx="1">
+            <a:schemeClr val="accent1"/>
+          </a:lnRef>
+          <a:fillRef idx="0">
+            <a:schemeClr val="accent1"/>
+          </a:fillRef>
+          <a:effectRef idx="0">
+            <a:schemeClr val="accent1"/>
+          </a:effectRef>
+          <a:fontRef idx="minor">
+            <a:schemeClr val="tx1"/>
+          </a:fontRef>
+        </p:style>
+      </p:cxnSp>
+      <p:cxnSp>
+        <p:nvCxnSpPr>
+          <p:cNvPr id="44" name="Connecteur droit avec flèche 43">
+            <a:extLst>
+              <a:ext uri="{FF2B5EF4-FFF2-40B4-BE49-F238E27FC236}">
+                <a16:creationId xmlns:a16="http://schemas.microsoft.com/office/drawing/2014/main" id="{5BB0CDE2-730D-21B1-6196-BE456D5E258F}"/>
+              </a:ext>
+            </a:extLst>
+          </p:cNvPr>
+          <p:cNvCxnSpPr/>
+          <p:nvPr/>
+        </p:nvCxnSpPr>
+        <p:spPr>
+          <a:xfrm>
+            <a:off x="5628118" y="3804810"/>
+            <a:ext cx="1169827" cy="0"/>
+          </a:xfrm>
+          <a:prstGeom prst="straightConnector1">
+            <a:avLst/>
+          </a:prstGeom>
+          <a:ln w="57150">
+            <a:solidFill>
+              <a:schemeClr val="accent2"/>
+            </a:solidFill>
+            <a:tailEnd type="triangle"/>
+          </a:ln>
+        </p:spPr>
+        <p:style>
+          <a:lnRef idx="1">
+            <a:schemeClr val="accent1"/>
+          </a:lnRef>
+          <a:fillRef idx="0">
+            <a:schemeClr val="accent1"/>
+          </a:fillRef>
+          <a:effectRef idx="0">
+            <a:schemeClr val="accent1"/>
+          </a:effectRef>
+          <a:fontRef idx="minor">
+            <a:schemeClr val="tx1"/>
+          </a:fontRef>
+        </p:style>
+      </p:cxnSp>
+      <p:sp>
+        <p:nvSpPr>
+          <p:cNvPr id="46" name="Rectangle 45">
+            <a:extLst>
+              <a:ext uri="{FF2B5EF4-FFF2-40B4-BE49-F238E27FC236}">
+                <a16:creationId xmlns:a16="http://schemas.microsoft.com/office/drawing/2014/main" id="{1B2057F0-84BC-48BA-C2C2-10E99ADE2159}"/>
+              </a:ext>
+            </a:extLst>
+          </p:cNvPr>
+          <p:cNvSpPr/>
+          <p:nvPr/>
+        </p:nvSpPr>
+        <p:spPr>
+          <a:xfrm>
+            <a:off x="9690445" y="2847198"/>
+            <a:ext cx="1885193" cy="1080655"/>
+          </a:xfrm>
+          <a:prstGeom prst="rect">
+            <a:avLst/>
+          </a:prstGeom>
+        </p:spPr>
+        <p:style>
+          <a:lnRef idx="2">
+            <a:schemeClr val="accent1">
+              <a:shade val="15000"/>
+            </a:schemeClr>
+          </a:lnRef>
+          <a:fillRef idx="1">
+            <a:schemeClr val="accent1"/>
+          </a:fillRef>
+          <a:effectRef idx="0">
+            <a:schemeClr val="accent1"/>
+          </a:effectRef>
+          <a:fontRef idx="minor">
+            <a:schemeClr val="lt1"/>
+          </a:fontRef>
+        </p:style>
+        <p:txBody>
+          <a:bodyPr rtlCol="0" anchor="ctr"/>
+          <a:lstStyle/>
+          <a:p>
+            <a:pPr algn="ctr"/>
+            <a:endParaRPr lang="fr-FR"/>
+          </a:p>
+        </p:txBody>
+      </p:sp>
+      <p:sp>
+        <p:nvSpPr>
+          <p:cNvPr id="47" name="ZoneTexte 46">
+            <a:extLst>
+              <a:ext uri="{FF2B5EF4-FFF2-40B4-BE49-F238E27FC236}">
+                <a16:creationId xmlns:a16="http://schemas.microsoft.com/office/drawing/2014/main" id="{6ED59749-63AE-5704-ADA9-5B72886705ED}"/>
+              </a:ext>
+            </a:extLst>
+          </p:cNvPr>
+          <p:cNvSpPr txBox="1"/>
+          <p:nvPr/>
+        </p:nvSpPr>
+        <p:spPr>
+          <a:xfrm>
+            <a:off x="9736294" y="2925349"/>
+            <a:ext cx="1780939" cy="923330"/>
+          </a:xfrm>
+          <a:prstGeom prst="rect">
+            <a:avLst/>
+          </a:prstGeom>
+          <a:noFill/>
+        </p:spPr>
+        <p:txBody>
+          <a:bodyPr wrap="square" rtlCol="0">
+            <a:spAutoFit/>
+          </a:bodyPr>
+          <a:lstStyle/>
+          <a:p>
+            <a:pPr lvl="0" algn="ctr"/>
+            <a:r>
+              <a:rPr lang="fr-FR" dirty="0"/>
+              <a:t> Classe concrète Objet sujet</a:t>
+            </a:r>
+          </a:p>
+          <a:p>
+            <a:pPr lvl="0" algn="ctr"/>
+            <a:r>
+              <a:rPr lang="fr-FR" dirty="0"/>
+              <a:t>(Diffuseur)</a:t>
+            </a:r>
+          </a:p>
+        </p:txBody>
+      </p:sp>
+      <p:sp>
+        <p:nvSpPr>
+          <p:cNvPr id="48" name="Rectangle 47">
+            <a:extLst>
+              <a:ext uri="{FF2B5EF4-FFF2-40B4-BE49-F238E27FC236}">
+                <a16:creationId xmlns:a16="http://schemas.microsoft.com/office/drawing/2014/main" id="{219F73A5-A538-407A-8575-DD26FEFFA7DF}"/>
+              </a:ext>
+            </a:extLst>
+          </p:cNvPr>
+          <p:cNvSpPr/>
+          <p:nvPr/>
+        </p:nvSpPr>
+        <p:spPr>
+          <a:xfrm>
+            <a:off x="9676420" y="4617589"/>
+            <a:ext cx="1885193" cy="1080655"/>
+          </a:xfrm>
+          <a:prstGeom prst="rect">
+            <a:avLst/>
+          </a:prstGeom>
+        </p:spPr>
+        <p:style>
+          <a:lnRef idx="2">
+            <a:schemeClr val="accent1">
+              <a:shade val="15000"/>
+            </a:schemeClr>
+          </a:lnRef>
+          <a:fillRef idx="1">
+            <a:schemeClr val="accent1"/>
+          </a:fillRef>
+          <a:effectRef idx="0">
+            <a:schemeClr val="accent1"/>
+          </a:effectRef>
+          <a:fontRef idx="minor">
+            <a:schemeClr val="lt1"/>
+          </a:fontRef>
+        </p:style>
+        <p:txBody>
+          <a:bodyPr rtlCol="0" anchor="ctr"/>
+          <a:lstStyle/>
+          <a:p>
+            <a:pPr algn="ctr"/>
+            <a:endParaRPr lang="fr-FR"/>
+          </a:p>
+        </p:txBody>
+      </p:sp>
+      <p:sp>
+        <p:nvSpPr>
+          <p:cNvPr id="49" name="ZoneTexte 48">
+            <a:extLst>
+              <a:ext uri="{FF2B5EF4-FFF2-40B4-BE49-F238E27FC236}">
+                <a16:creationId xmlns:a16="http://schemas.microsoft.com/office/drawing/2014/main" id="{9EB88422-5EF0-0412-2BE9-3D97F9D99F2E}"/>
+              </a:ext>
+            </a:extLst>
+          </p:cNvPr>
+          <p:cNvSpPr txBox="1"/>
+          <p:nvPr/>
+        </p:nvSpPr>
+        <p:spPr>
+          <a:xfrm>
+            <a:off x="9727642" y="4747694"/>
+            <a:ext cx="1780939" cy="923330"/>
+          </a:xfrm>
+          <a:prstGeom prst="rect">
+            <a:avLst/>
+          </a:prstGeom>
+          <a:noFill/>
+        </p:spPr>
+        <p:txBody>
+          <a:bodyPr wrap="square" rtlCol="0">
+            <a:spAutoFit/>
+          </a:bodyPr>
+          <a:lstStyle/>
+          <a:p>
+            <a:pPr lvl="0" algn="ctr"/>
+            <a:r>
+              <a:rPr lang="fr-FR" dirty="0"/>
+              <a:t> Classe concrète Objet sujet</a:t>
+            </a:r>
+          </a:p>
+          <a:p>
+            <a:pPr lvl="0" algn="ctr"/>
+            <a:r>
+              <a:rPr lang="fr-FR" dirty="0"/>
+              <a:t>(Diffuseur)</a:t>
+            </a:r>
+          </a:p>
+        </p:txBody>
+      </p:sp>
+    </p:spTree>
+    <p:extLst>
+      <p:ext uri="{BB962C8B-B14F-4D97-AF65-F5344CB8AC3E}">
+        <p14:creationId xmlns:p14="http://schemas.microsoft.com/office/powerpoint/2010/main" val="791280490"/>
+      </p:ext>
+    </p:extLst>
+  </p:cSld>
+  <p:clrMapOvr>
+    <a:masterClrMapping/>
+  </p:clrMapOvr>
+</p:sld>
+</file>
+
+<file path=ppt/slides/slide5.xml><?xml version="1.0" encoding="utf-8"?>
 <p:sld xmlns:a="http://schemas.openxmlformats.org/drawingml/2006/main" xmlns:r="http://schemas.openxmlformats.org/officeDocument/2006/relationships" xmlns:p="http://schemas.openxmlformats.org/presentationml/2006/main">
   <p:cSld>
     <p:spTree>

</xml_diff>

<commit_message>
Sauvegarde de fin de matinée
</commit_message>
<xml_diff>
--- a/106_DesignPattern/Cours/Observateur/Observateur.pptx
+++ b/106_DesignPattern/Cours/Observateur/Observateur.pptx
@@ -6,8 +6,14 @@
   </p:sldMasterIdLst>
   <p:sldIdLst>
     <p:sldId id="256" r:id="rId2"/>
-    <p:sldId id="258" r:id="rId3"/>
-    <p:sldId id="259" r:id="rId4"/>
+    <p:sldId id="260" r:id="rId3"/>
+    <p:sldId id="261" r:id="rId4"/>
+    <p:sldId id="262" r:id="rId5"/>
+    <p:sldId id="263" r:id="rId6"/>
+    <p:sldId id="264" r:id="rId7"/>
+    <p:sldId id="265" r:id="rId8"/>
+    <p:sldId id="258" r:id="rId9"/>
+    <p:sldId id="259" r:id="rId10"/>
   </p:sldIdLst>
   <p:sldSz cx="12192000" cy="6858000"/>
   <p:notesSz cx="6858000" cy="9144000"/>
@@ -106,6 +112,11 @@
       </a:defRPr>
     </a:lvl9pPr>
   </p:defaultTextStyle>
+  <p:extLst>
+    <p:ext uri="{EFAFB233-063F-42B5-8137-9DF3F51BA10A}">
+      <p15:sldGuideLst xmlns:p15="http://schemas.microsoft.com/office/powerpoint/2012/main"/>
+    </p:ext>
+  </p:extLst>
 </p:presentation>
 </file>
 
@@ -256,7 +267,7 @@
           <a:p>
             <a:fld id="{2B3FF9E3-101C-4204-8B81-4202CCD32645}" type="datetimeFigureOut">
               <a:rPr lang="fr-FR" smtClean="0"/>
-              <a:t>19/07/2023</a:t>
+              <a:t>21/07/2023</a:t>
             </a:fld>
             <a:endParaRPr lang="fr-FR"/>
           </a:p>
@@ -454,7 +465,7 @@
           <a:p>
             <a:fld id="{2B3FF9E3-101C-4204-8B81-4202CCD32645}" type="datetimeFigureOut">
               <a:rPr lang="fr-FR" smtClean="0"/>
-              <a:t>19/07/2023</a:t>
+              <a:t>21/07/2023</a:t>
             </a:fld>
             <a:endParaRPr lang="fr-FR"/>
           </a:p>
@@ -662,7 +673,7 @@
           <a:p>
             <a:fld id="{2B3FF9E3-101C-4204-8B81-4202CCD32645}" type="datetimeFigureOut">
               <a:rPr lang="fr-FR" smtClean="0"/>
-              <a:t>19/07/2023</a:t>
+              <a:t>21/07/2023</a:t>
             </a:fld>
             <a:endParaRPr lang="fr-FR"/>
           </a:p>
@@ -860,7 +871,7 @@
           <a:p>
             <a:fld id="{2B3FF9E3-101C-4204-8B81-4202CCD32645}" type="datetimeFigureOut">
               <a:rPr lang="fr-FR" smtClean="0"/>
-              <a:t>19/07/2023</a:t>
+              <a:t>21/07/2023</a:t>
             </a:fld>
             <a:endParaRPr lang="fr-FR"/>
           </a:p>
@@ -1135,7 +1146,7 @@
           <a:p>
             <a:fld id="{2B3FF9E3-101C-4204-8B81-4202CCD32645}" type="datetimeFigureOut">
               <a:rPr lang="fr-FR" smtClean="0"/>
-              <a:t>19/07/2023</a:t>
+              <a:t>21/07/2023</a:t>
             </a:fld>
             <a:endParaRPr lang="fr-FR"/>
           </a:p>
@@ -1400,7 +1411,7 @@
           <a:p>
             <a:fld id="{2B3FF9E3-101C-4204-8B81-4202CCD32645}" type="datetimeFigureOut">
               <a:rPr lang="fr-FR" smtClean="0"/>
-              <a:t>19/07/2023</a:t>
+              <a:t>21/07/2023</a:t>
             </a:fld>
             <a:endParaRPr lang="fr-FR"/>
           </a:p>
@@ -1812,7 +1823,7 @@
           <a:p>
             <a:fld id="{2B3FF9E3-101C-4204-8B81-4202CCD32645}" type="datetimeFigureOut">
               <a:rPr lang="fr-FR" smtClean="0"/>
-              <a:t>19/07/2023</a:t>
+              <a:t>21/07/2023</a:t>
             </a:fld>
             <a:endParaRPr lang="fr-FR"/>
           </a:p>
@@ -1953,7 +1964,7 @@
           <a:p>
             <a:fld id="{2B3FF9E3-101C-4204-8B81-4202CCD32645}" type="datetimeFigureOut">
               <a:rPr lang="fr-FR" smtClean="0"/>
-              <a:t>19/07/2023</a:t>
+              <a:t>21/07/2023</a:t>
             </a:fld>
             <a:endParaRPr lang="fr-FR"/>
           </a:p>
@@ -2066,7 +2077,7 @@
           <a:p>
             <a:fld id="{2B3FF9E3-101C-4204-8B81-4202CCD32645}" type="datetimeFigureOut">
               <a:rPr lang="fr-FR" smtClean="0"/>
-              <a:t>19/07/2023</a:t>
+              <a:t>21/07/2023</a:t>
             </a:fld>
             <a:endParaRPr lang="fr-FR"/>
           </a:p>
@@ -2377,7 +2388,7 @@
           <a:p>
             <a:fld id="{2B3FF9E3-101C-4204-8B81-4202CCD32645}" type="datetimeFigureOut">
               <a:rPr lang="fr-FR" smtClean="0"/>
-              <a:t>19/07/2023</a:t>
+              <a:t>21/07/2023</a:t>
             </a:fld>
             <a:endParaRPr lang="fr-FR"/>
           </a:p>
@@ -2665,7 +2676,7 @@
           <a:p>
             <a:fld id="{2B3FF9E3-101C-4204-8B81-4202CCD32645}" type="datetimeFigureOut">
               <a:rPr lang="fr-FR" smtClean="0"/>
-              <a:t>19/07/2023</a:t>
+              <a:t>21/07/2023</a:t>
             </a:fld>
             <a:endParaRPr lang="fr-FR"/>
           </a:p>
@@ -2906,7 +2917,7 @@
           <a:p>
             <a:fld id="{2B3FF9E3-101C-4204-8B81-4202CCD32645}" type="datetimeFigureOut">
               <a:rPr lang="fr-FR" smtClean="0"/>
-              <a:t>19/07/2023</a:t>
+              <a:t>21/07/2023</a:t>
             </a:fld>
             <a:endParaRPr lang="fr-FR"/>
           </a:p>
@@ -3344,32 +3355,14 @@
           <a:bodyPr/>
           <a:lstStyle/>
           <a:p>
-            <a:endParaRPr lang="fr-FR"/>
-          </a:p>
-        </p:txBody>
-      </p:sp>
-      <p:sp>
-        <p:nvSpPr>
-          <p:cNvPr id="3" name="Sous-titre 2">
-            <a:extLst>
-              <a:ext uri="{FF2B5EF4-FFF2-40B4-BE49-F238E27FC236}">
-                <a16:creationId xmlns:a16="http://schemas.microsoft.com/office/drawing/2014/main" id="{333A3BC7-19E1-48B7-9886-B215976EDC06}"/>
-              </a:ext>
-            </a:extLst>
-          </p:cNvPr>
-          <p:cNvSpPr>
-            <a:spLocks noGrp="1"/>
-          </p:cNvSpPr>
-          <p:nvPr>
-            <p:ph type="subTitle" idx="1"/>
-          </p:nvPr>
-        </p:nvSpPr>
-        <p:spPr/>
-        <p:txBody>
-          <a:bodyPr/>
-          <a:lstStyle/>
-          <a:p>
-            <a:endParaRPr lang="fr-FR"/>
+            <a:r>
+              <a:rPr lang="fr-FR" dirty="0" err="1"/>
+              <a:t>DesignPattern</a:t>
+            </a:r>
+            <a:r>
+              <a:rPr lang="fr-FR" dirty="0"/>
+              <a:t> Observateur</a:t>
+            </a:r>
           </a:p>
         </p:txBody>
       </p:sp>
@@ -3387,6 +3380,1296 @@
 </file>
 
 <file path=ppt/slides/slide2.xml><?xml version="1.0" encoding="utf-8"?>
+<p:sld xmlns:a="http://schemas.openxmlformats.org/drawingml/2006/main" xmlns:r="http://schemas.openxmlformats.org/officeDocument/2006/relationships" xmlns:p="http://schemas.openxmlformats.org/presentationml/2006/main">
+  <p:cSld>
+    <p:spTree>
+      <p:nvGrpSpPr>
+        <p:cNvPr id="1" name=""/>
+        <p:cNvGrpSpPr/>
+        <p:nvPr/>
+      </p:nvGrpSpPr>
+      <p:grpSpPr>
+        <a:xfrm>
+          <a:off x="0" y="0"/>
+          <a:ext cx="0" cy="0"/>
+          <a:chOff x="0" y="0"/>
+          <a:chExt cx="0" cy="0"/>
+        </a:xfrm>
+      </p:grpSpPr>
+      <p:sp>
+        <p:nvSpPr>
+          <p:cNvPr id="2" name="Titre 1">
+            <a:extLst>
+              <a:ext uri="{FF2B5EF4-FFF2-40B4-BE49-F238E27FC236}">
+                <a16:creationId xmlns:a16="http://schemas.microsoft.com/office/drawing/2014/main" id="{D6DDE4C8-E9A7-0C44-6B5F-18B4AF80950C}"/>
+              </a:ext>
+            </a:extLst>
+          </p:cNvPr>
+          <p:cNvSpPr>
+            <a:spLocks noGrp="1"/>
+          </p:cNvSpPr>
+          <p:nvPr>
+            <p:ph type="title"/>
+          </p:nvPr>
+        </p:nvSpPr>
+        <p:spPr/>
+        <p:txBody>
+          <a:bodyPr/>
+          <a:lstStyle/>
+          <a:p>
+            <a:r>
+              <a:rPr lang="fr-FR" dirty="0"/>
+              <a:t>Sommaire</a:t>
+            </a:r>
+          </a:p>
+        </p:txBody>
+      </p:sp>
+      <p:sp>
+        <p:nvSpPr>
+          <p:cNvPr id="3" name="Espace réservé du contenu 2">
+            <a:extLst>
+              <a:ext uri="{FF2B5EF4-FFF2-40B4-BE49-F238E27FC236}">
+                <a16:creationId xmlns:a16="http://schemas.microsoft.com/office/drawing/2014/main" id="{E85224BB-51EF-F956-051C-FAF9487563FA}"/>
+              </a:ext>
+            </a:extLst>
+          </p:cNvPr>
+          <p:cNvSpPr>
+            <a:spLocks noGrp="1"/>
+          </p:cNvSpPr>
+          <p:nvPr>
+            <p:ph idx="1"/>
+          </p:nvPr>
+        </p:nvSpPr>
+        <p:spPr/>
+        <p:txBody>
+          <a:bodyPr/>
+          <a:lstStyle/>
+          <a:p>
+            <a:pPr marL="514350" indent="-514350">
+              <a:buFont typeface="+mj-lt"/>
+              <a:buAutoNum type="arabicPeriod"/>
+            </a:pPr>
+            <a:r>
+              <a:rPr lang="fr-FR" dirty="0"/>
+              <a:t>Présentation</a:t>
+            </a:r>
+          </a:p>
+          <a:p>
+            <a:pPr marL="514350" indent="-514350">
+              <a:buFont typeface="+mj-lt"/>
+              <a:buAutoNum type="arabicPeriod"/>
+            </a:pPr>
+            <a:r>
+              <a:rPr lang="fr-FR" dirty="0"/>
+              <a:t>Composants, fonctionnement et structure</a:t>
+            </a:r>
+          </a:p>
+          <a:p>
+            <a:pPr marL="514350" indent="-514350">
+              <a:buFont typeface="+mj-lt"/>
+              <a:buAutoNum type="arabicPeriod"/>
+            </a:pPr>
+            <a:r>
+              <a:rPr lang="fr-FR" dirty="0"/>
+              <a:t>Mise en œuvre</a:t>
+            </a:r>
+          </a:p>
+          <a:p>
+            <a:pPr marL="514350" indent="-514350">
+              <a:buFont typeface="+mj-lt"/>
+              <a:buAutoNum type="arabicPeriod"/>
+            </a:pPr>
+            <a:r>
+              <a:rPr lang="fr-FR" dirty="0"/>
+              <a:t>Avantages, inconvénients</a:t>
+            </a:r>
+          </a:p>
+          <a:p>
+            <a:pPr marL="514350" indent="-514350">
+              <a:buFont typeface="+mj-lt"/>
+              <a:buAutoNum type="arabicPeriod"/>
+            </a:pPr>
+            <a:r>
+              <a:rPr lang="fr-FR" dirty="0"/>
+              <a:t>Exemple d’utilisation</a:t>
+            </a:r>
+          </a:p>
+        </p:txBody>
+      </p:sp>
+    </p:spTree>
+    <p:extLst>
+      <p:ext uri="{BB962C8B-B14F-4D97-AF65-F5344CB8AC3E}">
+        <p14:creationId xmlns:p14="http://schemas.microsoft.com/office/powerpoint/2010/main" val="3389184911"/>
+      </p:ext>
+    </p:extLst>
+  </p:cSld>
+  <p:clrMapOvr>
+    <a:masterClrMapping/>
+  </p:clrMapOvr>
+</p:sld>
+</file>
+
+<file path=ppt/slides/slide3.xml><?xml version="1.0" encoding="utf-8"?>
+<p:sld xmlns:a="http://schemas.openxmlformats.org/drawingml/2006/main" xmlns:r="http://schemas.openxmlformats.org/officeDocument/2006/relationships" xmlns:p="http://schemas.openxmlformats.org/presentationml/2006/main">
+  <p:cSld>
+    <p:spTree>
+      <p:nvGrpSpPr>
+        <p:cNvPr id="1" name=""/>
+        <p:cNvGrpSpPr/>
+        <p:nvPr/>
+      </p:nvGrpSpPr>
+      <p:grpSpPr>
+        <a:xfrm>
+          <a:off x="0" y="0"/>
+          <a:ext cx="0" cy="0"/>
+          <a:chOff x="0" y="0"/>
+          <a:chExt cx="0" cy="0"/>
+        </a:xfrm>
+      </p:grpSpPr>
+      <p:sp>
+        <p:nvSpPr>
+          <p:cNvPr id="2" name="Titre 1">
+            <a:extLst>
+              <a:ext uri="{FF2B5EF4-FFF2-40B4-BE49-F238E27FC236}">
+                <a16:creationId xmlns:a16="http://schemas.microsoft.com/office/drawing/2014/main" id="{71707A73-FA52-BA3F-6FCB-0E20863DB1F7}"/>
+              </a:ext>
+            </a:extLst>
+          </p:cNvPr>
+          <p:cNvSpPr>
+            <a:spLocks noGrp="1"/>
+          </p:cNvSpPr>
+          <p:nvPr>
+            <p:ph type="title"/>
+          </p:nvPr>
+        </p:nvSpPr>
+        <p:spPr/>
+        <p:txBody>
+          <a:bodyPr/>
+          <a:lstStyle/>
+          <a:p>
+            <a:r>
+              <a:rPr lang="fr-FR" dirty="0"/>
+              <a:t>1 Présentation</a:t>
+            </a:r>
+          </a:p>
+        </p:txBody>
+      </p:sp>
+      <p:sp>
+        <p:nvSpPr>
+          <p:cNvPr id="3" name="Espace réservé du contenu 2">
+            <a:extLst>
+              <a:ext uri="{FF2B5EF4-FFF2-40B4-BE49-F238E27FC236}">
+                <a16:creationId xmlns:a16="http://schemas.microsoft.com/office/drawing/2014/main" id="{9FC1FFCD-E346-CDFF-6DEA-900C8E4DA4A9}"/>
+              </a:ext>
+            </a:extLst>
+          </p:cNvPr>
+          <p:cNvSpPr>
+            <a:spLocks noGrp="1"/>
+          </p:cNvSpPr>
+          <p:nvPr>
+            <p:ph idx="1"/>
+          </p:nvPr>
+        </p:nvSpPr>
+        <p:spPr/>
+        <p:txBody>
+          <a:bodyPr/>
+          <a:lstStyle/>
+          <a:p>
+            <a:pPr marL="0" indent="0">
+              <a:buNone/>
+            </a:pPr>
+            <a:r>
+              <a:rPr lang="fr-FR" dirty="0"/>
+              <a:t>1.1 Introduction</a:t>
+            </a:r>
+          </a:p>
+          <a:p>
+            <a:pPr marL="0" indent="0">
+              <a:buNone/>
+            </a:pPr>
+            <a:r>
+              <a:rPr lang="fr-FR" dirty="0"/>
+              <a:t>Dans  la POO existe la difficulté de communiquer de manière efficace et flexible, d’où l’intervention du Design Pattern Observateur </a:t>
+            </a:r>
+          </a:p>
+        </p:txBody>
+      </p:sp>
+    </p:spTree>
+    <p:extLst>
+      <p:ext uri="{BB962C8B-B14F-4D97-AF65-F5344CB8AC3E}">
+        <p14:creationId xmlns:p14="http://schemas.microsoft.com/office/powerpoint/2010/main" val="3001935333"/>
+      </p:ext>
+    </p:extLst>
+  </p:cSld>
+  <p:clrMapOvr>
+    <a:masterClrMapping/>
+  </p:clrMapOvr>
+</p:sld>
+</file>
+
+<file path=ppt/slides/slide4.xml><?xml version="1.0" encoding="utf-8"?>
+<p:sld xmlns:a="http://schemas.openxmlformats.org/drawingml/2006/main" xmlns:r="http://schemas.openxmlformats.org/officeDocument/2006/relationships" xmlns:p="http://schemas.openxmlformats.org/presentationml/2006/main">
+  <p:cSld>
+    <p:spTree>
+      <p:nvGrpSpPr>
+        <p:cNvPr id="1" name=""/>
+        <p:cNvGrpSpPr/>
+        <p:nvPr/>
+      </p:nvGrpSpPr>
+      <p:grpSpPr>
+        <a:xfrm>
+          <a:off x="0" y="0"/>
+          <a:ext cx="0" cy="0"/>
+          <a:chOff x="0" y="0"/>
+          <a:chExt cx="0" cy="0"/>
+        </a:xfrm>
+      </p:grpSpPr>
+      <p:sp>
+        <p:nvSpPr>
+          <p:cNvPr id="2" name="Titre 1">
+            <a:extLst>
+              <a:ext uri="{FF2B5EF4-FFF2-40B4-BE49-F238E27FC236}">
+                <a16:creationId xmlns:a16="http://schemas.microsoft.com/office/drawing/2014/main" id="{10AFE74A-A016-6FF2-0ABC-27D13B8E3CFB}"/>
+              </a:ext>
+            </a:extLst>
+          </p:cNvPr>
+          <p:cNvSpPr>
+            <a:spLocks noGrp="1"/>
+          </p:cNvSpPr>
+          <p:nvPr>
+            <p:ph type="title"/>
+          </p:nvPr>
+        </p:nvSpPr>
+        <p:spPr/>
+        <p:txBody>
+          <a:bodyPr/>
+          <a:lstStyle/>
+          <a:p>
+            <a:r>
+              <a:rPr lang="fr-FR" dirty="0"/>
+              <a:t>1 Présentation</a:t>
+            </a:r>
+          </a:p>
+        </p:txBody>
+      </p:sp>
+      <p:sp>
+        <p:nvSpPr>
+          <p:cNvPr id="3" name="Espace réservé du contenu 2">
+            <a:extLst>
+              <a:ext uri="{FF2B5EF4-FFF2-40B4-BE49-F238E27FC236}">
+                <a16:creationId xmlns:a16="http://schemas.microsoft.com/office/drawing/2014/main" id="{C46A41EB-CC40-DF08-E7D0-FDE1CF96B0F8}"/>
+              </a:ext>
+            </a:extLst>
+          </p:cNvPr>
+          <p:cNvSpPr>
+            <a:spLocks noGrp="1"/>
+          </p:cNvSpPr>
+          <p:nvPr>
+            <p:ph idx="1"/>
+          </p:nvPr>
+        </p:nvSpPr>
+        <p:spPr/>
+        <p:txBody>
+          <a:bodyPr/>
+          <a:lstStyle/>
+          <a:p>
+            <a:pPr marL="0" indent="0">
+              <a:buNone/>
+            </a:pPr>
+            <a:r>
+              <a:rPr lang="fr-FR" dirty="0"/>
+              <a:t>1.2 Définition</a:t>
+            </a:r>
+          </a:p>
+          <a:p>
+            <a:pPr marL="0" indent="0">
+              <a:buNone/>
+            </a:pPr>
+            <a:r>
+              <a:rPr lang="fr-FR" dirty="0"/>
+              <a:t>Il permet d’envoyer des notifications à plusieurs objets qui l’observent.</a:t>
+            </a:r>
+          </a:p>
+          <a:p>
+            <a:pPr marL="0" indent="0">
+              <a:buNone/>
+            </a:pPr>
+            <a:r>
+              <a:rPr lang="fr-FR" dirty="0"/>
+              <a:t>Design Pattern comportemental</a:t>
+            </a:r>
+          </a:p>
+          <a:p>
+            <a:pPr marL="0" indent="0">
+              <a:buNone/>
+            </a:pPr>
+            <a:endParaRPr lang="fr-FR" dirty="0"/>
+          </a:p>
+        </p:txBody>
+      </p:sp>
+    </p:spTree>
+    <p:extLst>
+      <p:ext uri="{BB962C8B-B14F-4D97-AF65-F5344CB8AC3E}">
+        <p14:creationId xmlns:p14="http://schemas.microsoft.com/office/powerpoint/2010/main" val="1326518591"/>
+      </p:ext>
+    </p:extLst>
+  </p:cSld>
+  <p:clrMapOvr>
+    <a:masterClrMapping/>
+  </p:clrMapOvr>
+</p:sld>
+</file>
+
+<file path=ppt/slides/slide5.xml><?xml version="1.0" encoding="utf-8"?>
+<p:sld xmlns:a="http://schemas.openxmlformats.org/drawingml/2006/main" xmlns:r="http://schemas.openxmlformats.org/officeDocument/2006/relationships" xmlns:p="http://schemas.openxmlformats.org/presentationml/2006/main">
+  <p:cSld>
+    <p:spTree>
+      <p:nvGrpSpPr>
+        <p:cNvPr id="1" name=""/>
+        <p:cNvGrpSpPr/>
+        <p:nvPr/>
+      </p:nvGrpSpPr>
+      <p:grpSpPr>
+        <a:xfrm>
+          <a:off x="0" y="0"/>
+          <a:ext cx="0" cy="0"/>
+          <a:chOff x="0" y="0"/>
+          <a:chExt cx="0" cy="0"/>
+        </a:xfrm>
+      </p:grpSpPr>
+      <p:sp>
+        <p:nvSpPr>
+          <p:cNvPr id="2" name="Titre 1">
+            <a:extLst>
+              <a:ext uri="{FF2B5EF4-FFF2-40B4-BE49-F238E27FC236}">
+                <a16:creationId xmlns:a16="http://schemas.microsoft.com/office/drawing/2014/main" id="{225750EF-20A1-EDFE-9156-DE5A4170FE85}"/>
+              </a:ext>
+            </a:extLst>
+          </p:cNvPr>
+          <p:cNvSpPr>
+            <a:spLocks noGrp="1"/>
+          </p:cNvSpPr>
+          <p:nvPr>
+            <p:ph type="title"/>
+          </p:nvPr>
+        </p:nvSpPr>
+        <p:spPr/>
+        <p:txBody>
+          <a:bodyPr/>
+          <a:lstStyle/>
+          <a:p>
+            <a:r>
+              <a:rPr lang="fr-FR" dirty="0"/>
+              <a:t>1 Présentation</a:t>
+            </a:r>
+          </a:p>
+        </p:txBody>
+      </p:sp>
+      <p:pic>
+        <p:nvPicPr>
+          <p:cNvPr id="5" name="Image 4" descr="Une image contenant capture d’écran, texte, graphisme, Graphique&#10;&#10;Description générée automatiquement">
+            <a:extLst>
+              <a:ext uri="{FF2B5EF4-FFF2-40B4-BE49-F238E27FC236}">
+                <a16:creationId xmlns:a16="http://schemas.microsoft.com/office/drawing/2014/main" id="{547A34D6-B83E-A9FA-6673-E8829867CAA7}"/>
+              </a:ext>
+            </a:extLst>
+          </p:cNvPr>
+          <p:cNvPicPr>
+            <a:picLocks noChangeAspect="1"/>
+          </p:cNvPicPr>
+          <p:nvPr/>
+        </p:nvPicPr>
+        <p:blipFill>
+          <a:blip r:embed="rId2">
+            <a:extLst>
+              <a:ext uri="{28A0092B-C50C-407E-A947-70E740481C1C}">
+                <a14:useLocalDpi xmlns:a14="http://schemas.microsoft.com/office/drawing/2010/main" val="0"/>
+              </a:ext>
+            </a:extLst>
+          </a:blip>
+          <a:stretch>
+            <a:fillRect/>
+          </a:stretch>
+        </p:blipFill>
+        <p:spPr>
+          <a:xfrm>
+            <a:off x="1393371" y="2155372"/>
+            <a:ext cx="9231086" cy="4615543"/>
+          </a:xfrm>
+          <a:prstGeom prst="rect">
+            <a:avLst/>
+          </a:prstGeom>
+        </p:spPr>
+      </p:pic>
+      <p:sp>
+        <p:nvSpPr>
+          <p:cNvPr id="7" name="Espace réservé du contenu 6">
+            <a:extLst>
+              <a:ext uri="{FF2B5EF4-FFF2-40B4-BE49-F238E27FC236}">
+                <a16:creationId xmlns:a16="http://schemas.microsoft.com/office/drawing/2014/main" id="{943D0F6B-3F95-BA98-C1BF-754E30699647}"/>
+              </a:ext>
+            </a:extLst>
+          </p:cNvPr>
+          <p:cNvSpPr>
+            <a:spLocks noGrp="1"/>
+          </p:cNvSpPr>
+          <p:nvPr>
+            <p:ph idx="1"/>
+          </p:nvPr>
+        </p:nvSpPr>
+        <p:spPr>
+          <a:xfrm>
+            <a:off x="838200" y="1744663"/>
+            <a:ext cx="10515600" cy="541337"/>
+          </a:xfrm>
+        </p:spPr>
+        <p:txBody>
+          <a:bodyPr/>
+          <a:lstStyle/>
+          <a:p>
+            <a:pPr marL="0" indent="0">
+              <a:buNone/>
+            </a:pPr>
+            <a:r>
+              <a:rPr lang="fr-FR" dirty="0"/>
+              <a:t>1.3 Problème</a:t>
+            </a:r>
+          </a:p>
+        </p:txBody>
+      </p:sp>
+    </p:spTree>
+    <p:extLst>
+      <p:ext uri="{BB962C8B-B14F-4D97-AF65-F5344CB8AC3E}">
+        <p14:creationId xmlns:p14="http://schemas.microsoft.com/office/powerpoint/2010/main" val="3239956060"/>
+      </p:ext>
+    </p:extLst>
+  </p:cSld>
+  <p:clrMapOvr>
+    <a:masterClrMapping/>
+  </p:clrMapOvr>
+</p:sld>
+</file>
+
+<file path=ppt/slides/slide6.xml><?xml version="1.0" encoding="utf-8"?>
+<p:sld xmlns:a="http://schemas.openxmlformats.org/drawingml/2006/main" xmlns:r="http://schemas.openxmlformats.org/officeDocument/2006/relationships" xmlns:p="http://schemas.openxmlformats.org/presentationml/2006/main">
+  <p:cSld>
+    <p:spTree>
+      <p:nvGrpSpPr>
+        <p:cNvPr id="1" name=""/>
+        <p:cNvGrpSpPr/>
+        <p:nvPr/>
+      </p:nvGrpSpPr>
+      <p:grpSpPr>
+        <a:xfrm>
+          <a:off x="0" y="0"/>
+          <a:ext cx="0" cy="0"/>
+          <a:chOff x="0" y="0"/>
+          <a:chExt cx="0" cy="0"/>
+        </a:xfrm>
+      </p:grpSpPr>
+      <p:sp>
+        <p:nvSpPr>
+          <p:cNvPr id="2" name="Titre 1">
+            <a:extLst>
+              <a:ext uri="{FF2B5EF4-FFF2-40B4-BE49-F238E27FC236}">
+                <a16:creationId xmlns:a16="http://schemas.microsoft.com/office/drawing/2014/main" id="{E5B2B91B-B3BF-9566-55D8-188D4DEC5F56}"/>
+              </a:ext>
+            </a:extLst>
+          </p:cNvPr>
+          <p:cNvSpPr>
+            <a:spLocks noGrp="1"/>
+          </p:cNvSpPr>
+          <p:nvPr>
+            <p:ph type="title"/>
+          </p:nvPr>
+        </p:nvSpPr>
+        <p:spPr/>
+        <p:txBody>
+          <a:bodyPr/>
+          <a:lstStyle/>
+          <a:p>
+            <a:r>
+              <a:rPr lang="fr-FR" dirty="0"/>
+              <a:t>2 Composants, fonctionnement et structure</a:t>
+            </a:r>
+          </a:p>
+        </p:txBody>
+      </p:sp>
+      <p:sp>
+        <p:nvSpPr>
+          <p:cNvPr id="3" name="Espace réservé du contenu 2">
+            <a:extLst>
+              <a:ext uri="{FF2B5EF4-FFF2-40B4-BE49-F238E27FC236}">
+                <a16:creationId xmlns:a16="http://schemas.microsoft.com/office/drawing/2014/main" id="{8ECC45BD-49D5-BF74-99A4-0595377CA344}"/>
+              </a:ext>
+            </a:extLst>
+          </p:cNvPr>
+          <p:cNvSpPr>
+            <a:spLocks noGrp="1"/>
+          </p:cNvSpPr>
+          <p:nvPr>
+            <p:ph idx="1"/>
+          </p:nvPr>
+        </p:nvSpPr>
+        <p:spPr/>
+        <p:txBody>
+          <a:bodyPr/>
+          <a:lstStyle/>
+          <a:p>
+            <a:pPr marL="0" indent="0">
+              <a:buNone/>
+            </a:pPr>
+            <a:r>
+              <a:rPr lang="fr-FR" dirty="0"/>
+              <a:t>2.1 Composants</a:t>
+            </a:r>
+          </a:p>
+          <a:p>
+            <a:r>
+              <a:rPr lang="fr-FR" dirty="0"/>
+              <a:t>Le sujet (diffuseur)</a:t>
+            </a:r>
+          </a:p>
+          <a:p>
+            <a:r>
+              <a:rPr lang="fr-FR" dirty="0"/>
+              <a:t>L’observateur (souscripteur)</a:t>
+            </a:r>
+          </a:p>
+          <a:p>
+            <a:r>
+              <a:rPr lang="fr-FR" dirty="0"/>
+              <a:t>La souscription</a:t>
+            </a:r>
+          </a:p>
+          <a:p>
+            <a:r>
+              <a:rPr lang="fr-FR" dirty="0"/>
+              <a:t>La notification</a:t>
+            </a:r>
+          </a:p>
+        </p:txBody>
+      </p:sp>
+    </p:spTree>
+    <p:extLst>
+      <p:ext uri="{BB962C8B-B14F-4D97-AF65-F5344CB8AC3E}">
+        <p14:creationId xmlns:p14="http://schemas.microsoft.com/office/powerpoint/2010/main" val="2284254303"/>
+      </p:ext>
+    </p:extLst>
+  </p:cSld>
+  <p:clrMapOvr>
+    <a:masterClrMapping/>
+  </p:clrMapOvr>
+</p:sld>
+</file>
+
+<file path=ppt/slides/slide7.xml><?xml version="1.0" encoding="utf-8"?>
+<p:sld xmlns:a="http://schemas.openxmlformats.org/drawingml/2006/main" xmlns:r="http://schemas.openxmlformats.org/officeDocument/2006/relationships" xmlns:p="http://schemas.openxmlformats.org/presentationml/2006/main">
+  <p:cSld>
+    <p:spTree>
+      <p:nvGrpSpPr>
+        <p:cNvPr id="1" name=""/>
+        <p:cNvGrpSpPr/>
+        <p:nvPr/>
+      </p:nvGrpSpPr>
+      <p:grpSpPr>
+        <a:xfrm>
+          <a:off x="0" y="0"/>
+          <a:ext cx="0" cy="0"/>
+          <a:chOff x="0" y="0"/>
+          <a:chExt cx="0" cy="0"/>
+        </a:xfrm>
+      </p:grpSpPr>
+      <p:sp>
+        <p:nvSpPr>
+          <p:cNvPr id="2" name="Titre 1">
+            <a:extLst>
+              <a:ext uri="{FF2B5EF4-FFF2-40B4-BE49-F238E27FC236}">
+                <a16:creationId xmlns:a16="http://schemas.microsoft.com/office/drawing/2014/main" id="{A324724A-85DD-159C-DFED-1BE9781CA34B}"/>
+              </a:ext>
+            </a:extLst>
+          </p:cNvPr>
+          <p:cNvSpPr>
+            <a:spLocks noGrp="1"/>
+          </p:cNvSpPr>
+          <p:nvPr>
+            <p:ph type="title"/>
+          </p:nvPr>
+        </p:nvSpPr>
+        <p:spPr/>
+        <p:txBody>
+          <a:bodyPr/>
+          <a:lstStyle/>
+          <a:p>
+            <a:r>
+              <a:rPr lang="fr-FR" dirty="0"/>
+              <a:t>2 Composants, fonctionnement et structure</a:t>
+            </a:r>
+          </a:p>
+        </p:txBody>
+      </p:sp>
+      <p:sp>
+        <p:nvSpPr>
+          <p:cNvPr id="4" name="Rectangle 3">
+            <a:extLst>
+              <a:ext uri="{FF2B5EF4-FFF2-40B4-BE49-F238E27FC236}">
+                <a16:creationId xmlns:a16="http://schemas.microsoft.com/office/drawing/2014/main" id="{BA9806FB-5701-1430-C390-DF569A9BA8B2}"/>
+              </a:ext>
+            </a:extLst>
+          </p:cNvPr>
+          <p:cNvSpPr/>
+          <p:nvPr/>
+        </p:nvSpPr>
+        <p:spPr>
+          <a:xfrm>
+            <a:off x="8666017" y="3585631"/>
+            <a:ext cx="2687781" cy="1080655"/>
+          </a:xfrm>
+          <a:prstGeom prst="rect">
+            <a:avLst/>
+          </a:prstGeom>
+        </p:spPr>
+        <p:style>
+          <a:lnRef idx="2">
+            <a:schemeClr val="accent1">
+              <a:shade val="15000"/>
+            </a:schemeClr>
+          </a:lnRef>
+          <a:fillRef idx="1">
+            <a:schemeClr val="accent1"/>
+          </a:fillRef>
+          <a:effectRef idx="0">
+            <a:schemeClr val="accent1"/>
+          </a:effectRef>
+          <a:fontRef idx="minor">
+            <a:schemeClr val="lt1"/>
+          </a:fontRef>
+        </p:style>
+        <p:txBody>
+          <a:bodyPr rtlCol="0" anchor="ctr"/>
+          <a:lstStyle/>
+          <a:p>
+            <a:pPr algn="ctr"/>
+            <a:endParaRPr lang="fr-FR"/>
+          </a:p>
+        </p:txBody>
+      </p:sp>
+      <p:sp>
+        <p:nvSpPr>
+          <p:cNvPr id="5" name="ZoneTexte 4">
+            <a:extLst>
+              <a:ext uri="{FF2B5EF4-FFF2-40B4-BE49-F238E27FC236}">
+                <a16:creationId xmlns:a16="http://schemas.microsoft.com/office/drawing/2014/main" id="{C0F82D48-0B34-73F0-2F80-349E899078BF}"/>
+              </a:ext>
+            </a:extLst>
+          </p:cNvPr>
+          <p:cNvSpPr txBox="1"/>
+          <p:nvPr/>
+        </p:nvSpPr>
+        <p:spPr>
+          <a:xfrm>
+            <a:off x="8804562" y="3664293"/>
+            <a:ext cx="2410690" cy="923330"/>
+          </a:xfrm>
+          <a:prstGeom prst="rect">
+            <a:avLst/>
+          </a:prstGeom>
+          <a:noFill/>
+        </p:spPr>
+        <p:txBody>
+          <a:bodyPr wrap="square" rtlCol="0">
+            <a:spAutoFit/>
+          </a:bodyPr>
+          <a:lstStyle/>
+          <a:p>
+            <a:pPr lvl="0" algn="ctr"/>
+            <a:r>
+              <a:rPr lang="fr-FR" dirty="0"/>
+              <a:t>Diffuseur </a:t>
+            </a:r>
+          </a:p>
+          <a:p>
+            <a:pPr lvl="0" algn="ctr"/>
+            <a:r>
+              <a:rPr lang="fr-FR" dirty="0"/>
+              <a:t>Publisher</a:t>
+            </a:r>
+          </a:p>
+          <a:p>
+            <a:pPr lvl="0" algn="ctr"/>
+            <a:r>
+              <a:rPr lang="fr-FR" dirty="0"/>
+              <a:t>Objet sujet</a:t>
+            </a:r>
+          </a:p>
+        </p:txBody>
+      </p:sp>
+      <p:sp>
+        <p:nvSpPr>
+          <p:cNvPr id="6" name="Rectangle 5">
+            <a:extLst>
+              <a:ext uri="{FF2B5EF4-FFF2-40B4-BE49-F238E27FC236}">
+                <a16:creationId xmlns:a16="http://schemas.microsoft.com/office/drawing/2014/main" id="{F0C393B2-9159-A96E-7521-4B0307273C91}"/>
+              </a:ext>
+            </a:extLst>
+          </p:cNvPr>
+          <p:cNvSpPr/>
+          <p:nvPr/>
+        </p:nvSpPr>
+        <p:spPr>
+          <a:xfrm>
+            <a:off x="1073728" y="2041727"/>
+            <a:ext cx="2687781" cy="1080655"/>
+          </a:xfrm>
+          <a:prstGeom prst="rect">
+            <a:avLst/>
+          </a:prstGeom>
+          <a:solidFill>
+            <a:schemeClr val="accent2"/>
+          </a:solidFill>
+        </p:spPr>
+        <p:style>
+          <a:lnRef idx="2">
+            <a:schemeClr val="accent1">
+              <a:shade val="15000"/>
+            </a:schemeClr>
+          </a:lnRef>
+          <a:fillRef idx="1">
+            <a:schemeClr val="accent1"/>
+          </a:fillRef>
+          <a:effectRef idx="0">
+            <a:schemeClr val="accent1"/>
+          </a:effectRef>
+          <a:fontRef idx="minor">
+            <a:schemeClr val="lt1"/>
+          </a:fontRef>
+        </p:style>
+        <p:txBody>
+          <a:bodyPr rtlCol="0" anchor="ctr"/>
+          <a:lstStyle/>
+          <a:p>
+            <a:pPr algn="ctr"/>
+            <a:endParaRPr lang="fr-FR"/>
+          </a:p>
+        </p:txBody>
+      </p:sp>
+      <p:sp>
+        <p:nvSpPr>
+          <p:cNvPr id="7" name="ZoneTexte 6">
+            <a:extLst>
+              <a:ext uri="{FF2B5EF4-FFF2-40B4-BE49-F238E27FC236}">
+                <a16:creationId xmlns:a16="http://schemas.microsoft.com/office/drawing/2014/main" id="{8347AFAF-7411-F890-1B53-FC824CA2D88D}"/>
+              </a:ext>
+            </a:extLst>
+          </p:cNvPr>
+          <p:cNvSpPr txBox="1"/>
+          <p:nvPr/>
+        </p:nvSpPr>
+        <p:spPr>
+          <a:xfrm>
+            <a:off x="1212273" y="2120389"/>
+            <a:ext cx="2410690" cy="923330"/>
+          </a:xfrm>
+          <a:prstGeom prst="rect">
+            <a:avLst/>
+          </a:prstGeom>
+          <a:solidFill>
+            <a:schemeClr val="accent2"/>
+          </a:solidFill>
+        </p:spPr>
+        <p:txBody>
+          <a:bodyPr wrap="square" rtlCol="0">
+            <a:spAutoFit/>
+          </a:bodyPr>
+          <a:lstStyle/>
+          <a:p>
+            <a:pPr lvl="0" algn="ctr"/>
+            <a:r>
+              <a:rPr lang="fr-FR" dirty="0"/>
+              <a:t>Souscripteur</a:t>
+            </a:r>
+          </a:p>
+          <a:p>
+            <a:pPr lvl="0" algn="ctr"/>
+            <a:r>
+              <a:rPr lang="fr-FR" dirty="0"/>
+              <a:t>Subscriber</a:t>
+            </a:r>
+          </a:p>
+          <a:p>
+            <a:pPr lvl="0" algn="ctr"/>
+            <a:r>
+              <a:rPr lang="fr-FR" dirty="0"/>
+              <a:t>Objet observant</a:t>
+            </a:r>
+          </a:p>
+        </p:txBody>
+      </p:sp>
+      <p:sp>
+        <p:nvSpPr>
+          <p:cNvPr id="8" name="Rectangle 7">
+            <a:extLst>
+              <a:ext uri="{FF2B5EF4-FFF2-40B4-BE49-F238E27FC236}">
+                <a16:creationId xmlns:a16="http://schemas.microsoft.com/office/drawing/2014/main" id="{1D3347D1-66F0-D7DA-01AA-C917FA4F39B3}"/>
+              </a:ext>
+            </a:extLst>
+          </p:cNvPr>
+          <p:cNvSpPr/>
+          <p:nvPr/>
+        </p:nvSpPr>
+        <p:spPr>
+          <a:xfrm>
+            <a:off x="1073728" y="3585631"/>
+            <a:ext cx="2687781" cy="1080655"/>
+          </a:xfrm>
+          <a:prstGeom prst="rect">
+            <a:avLst/>
+          </a:prstGeom>
+          <a:solidFill>
+            <a:schemeClr val="accent2"/>
+          </a:solidFill>
+        </p:spPr>
+        <p:style>
+          <a:lnRef idx="2">
+            <a:schemeClr val="accent1">
+              <a:shade val="15000"/>
+            </a:schemeClr>
+          </a:lnRef>
+          <a:fillRef idx="1">
+            <a:schemeClr val="accent1"/>
+          </a:fillRef>
+          <a:effectRef idx="0">
+            <a:schemeClr val="accent1"/>
+          </a:effectRef>
+          <a:fontRef idx="minor">
+            <a:schemeClr val="lt1"/>
+          </a:fontRef>
+        </p:style>
+        <p:txBody>
+          <a:bodyPr rtlCol="0" anchor="ctr"/>
+          <a:lstStyle/>
+          <a:p>
+            <a:pPr algn="ctr"/>
+            <a:endParaRPr lang="fr-FR"/>
+          </a:p>
+        </p:txBody>
+      </p:sp>
+      <p:sp>
+        <p:nvSpPr>
+          <p:cNvPr id="9" name="ZoneTexte 8">
+            <a:extLst>
+              <a:ext uri="{FF2B5EF4-FFF2-40B4-BE49-F238E27FC236}">
+                <a16:creationId xmlns:a16="http://schemas.microsoft.com/office/drawing/2014/main" id="{FF6E3E5C-CB8D-DA0F-E409-61F2CBD43716}"/>
+              </a:ext>
+            </a:extLst>
+          </p:cNvPr>
+          <p:cNvSpPr txBox="1"/>
+          <p:nvPr/>
+        </p:nvSpPr>
+        <p:spPr>
+          <a:xfrm>
+            <a:off x="1212273" y="3664293"/>
+            <a:ext cx="2410690" cy="923330"/>
+          </a:xfrm>
+          <a:prstGeom prst="rect">
+            <a:avLst/>
+          </a:prstGeom>
+          <a:solidFill>
+            <a:schemeClr val="accent2"/>
+          </a:solidFill>
+        </p:spPr>
+        <p:txBody>
+          <a:bodyPr wrap="square" rtlCol="0">
+            <a:spAutoFit/>
+          </a:bodyPr>
+          <a:lstStyle/>
+          <a:p>
+            <a:pPr lvl="0" algn="ctr"/>
+            <a:r>
+              <a:rPr lang="fr-FR" dirty="0"/>
+              <a:t>Souscripteur</a:t>
+            </a:r>
+          </a:p>
+          <a:p>
+            <a:pPr lvl="0" algn="ctr"/>
+            <a:r>
+              <a:rPr lang="fr-FR" dirty="0"/>
+              <a:t>Subscriber</a:t>
+            </a:r>
+          </a:p>
+          <a:p>
+            <a:pPr lvl="0" algn="ctr"/>
+            <a:r>
+              <a:rPr lang="fr-FR" dirty="0"/>
+              <a:t>Objet observant</a:t>
+            </a:r>
+          </a:p>
+        </p:txBody>
+      </p:sp>
+      <p:sp>
+        <p:nvSpPr>
+          <p:cNvPr id="10" name="Rectangle 9">
+            <a:extLst>
+              <a:ext uri="{FF2B5EF4-FFF2-40B4-BE49-F238E27FC236}">
+                <a16:creationId xmlns:a16="http://schemas.microsoft.com/office/drawing/2014/main" id="{2165F945-AA8C-B7CE-6DE9-0910EB6E3E54}"/>
+              </a:ext>
+            </a:extLst>
+          </p:cNvPr>
+          <p:cNvSpPr/>
+          <p:nvPr/>
+        </p:nvSpPr>
+        <p:spPr>
+          <a:xfrm>
+            <a:off x="1073728" y="5096308"/>
+            <a:ext cx="2687781" cy="1080655"/>
+          </a:xfrm>
+          <a:prstGeom prst="rect">
+            <a:avLst/>
+          </a:prstGeom>
+          <a:solidFill>
+            <a:schemeClr val="accent2"/>
+          </a:solidFill>
+        </p:spPr>
+        <p:style>
+          <a:lnRef idx="2">
+            <a:schemeClr val="accent1">
+              <a:shade val="15000"/>
+            </a:schemeClr>
+          </a:lnRef>
+          <a:fillRef idx="1">
+            <a:schemeClr val="accent1"/>
+          </a:fillRef>
+          <a:effectRef idx="0">
+            <a:schemeClr val="accent1"/>
+          </a:effectRef>
+          <a:fontRef idx="minor">
+            <a:schemeClr val="lt1"/>
+          </a:fontRef>
+        </p:style>
+        <p:txBody>
+          <a:bodyPr rtlCol="0" anchor="ctr"/>
+          <a:lstStyle/>
+          <a:p>
+            <a:pPr algn="ctr"/>
+            <a:endParaRPr lang="fr-FR"/>
+          </a:p>
+        </p:txBody>
+      </p:sp>
+      <p:sp>
+        <p:nvSpPr>
+          <p:cNvPr id="11" name="ZoneTexte 10">
+            <a:extLst>
+              <a:ext uri="{FF2B5EF4-FFF2-40B4-BE49-F238E27FC236}">
+                <a16:creationId xmlns:a16="http://schemas.microsoft.com/office/drawing/2014/main" id="{AB832912-F9F5-730D-07DC-760C74FA607E}"/>
+              </a:ext>
+            </a:extLst>
+          </p:cNvPr>
+          <p:cNvSpPr txBox="1"/>
+          <p:nvPr/>
+        </p:nvSpPr>
+        <p:spPr>
+          <a:xfrm>
+            <a:off x="1212273" y="5174970"/>
+            <a:ext cx="2410690" cy="923330"/>
+          </a:xfrm>
+          <a:prstGeom prst="rect">
+            <a:avLst/>
+          </a:prstGeom>
+          <a:solidFill>
+            <a:schemeClr val="accent2"/>
+          </a:solidFill>
+        </p:spPr>
+        <p:txBody>
+          <a:bodyPr wrap="square" rtlCol="0">
+            <a:spAutoFit/>
+          </a:bodyPr>
+          <a:lstStyle/>
+          <a:p>
+            <a:pPr lvl="0" algn="ctr"/>
+            <a:r>
+              <a:rPr lang="fr-FR" dirty="0"/>
+              <a:t>Souscripteur</a:t>
+            </a:r>
+          </a:p>
+          <a:p>
+            <a:pPr lvl="0" algn="ctr"/>
+            <a:r>
+              <a:rPr lang="fr-FR" dirty="0"/>
+              <a:t>Subscriber</a:t>
+            </a:r>
+          </a:p>
+          <a:p>
+            <a:pPr lvl="0" algn="ctr"/>
+            <a:r>
+              <a:rPr lang="fr-FR" dirty="0"/>
+              <a:t>Objet observant</a:t>
+            </a:r>
+          </a:p>
+        </p:txBody>
+      </p:sp>
+      <p:cxnSp>
+        <p:nvCxnSpPr>
+          <p:cNvPr id="12" name="Connecteur droit avec flèche 11">
+            <a:extLst>
+              <a:ext uri="{FF2B5EF4-FFF2-40B4-BE49-F238E27FC236}">
+                <a16:creationId xmlns:a16="http://schemas.microsoft.com/office/drawing/2014/main" id="{6D29E859-D85F-9170-6E0A-165A5B4638CE}"/>
+              </a:ext>
+            </a:extLst>
+          </p:cNvPr>
+          <p:cNvCxnSpPr>
+            <a:cxnSpLocks/>
+            <a:stCxn id="6" idx="3"/>
+          </p:cNvCxnSpPr>
+          <p:nvPr/>
+        </p:nvCxnSpPr>
+        <p:spPr>
+          <a:xfrm>
+            <a:off x="3761509" y="2582055"/>
+            <a:ext cx="4904507" cy="1312280"/>
+          </a:xfrm>
+          <a:prstGeom prst="straightConnector1">
+            <a:avLst/>
+          </a:prstGeom>
+          <a:ln>
+            <a:tailEnd type="triangle"/>
+          </a:ln>
+        </p:spPr>
+        <p:style>
+          <a:lnRef idx="1">
+            <a:schemeClr val="accent1"/>
+          </a:lnRef>
+          <a:fillRef idx="0">
+            <a:schemeClr val="accent1"/>
+          </a:fillRef>
+          <a:effectRef idx="0">
+            <a:schemeClr val="accent1"/>
+          </a:effectRef>
+          <a:fontRef idx="minor">
+            <a:schemeClr val="tx1"/>
+          </a:fontRef>
+        </p:style>
+      </p:cxnSp>
+      <p:cxnSp>
+        <p:nvCxnSpPr>
+          <p:cNvPr id="13" name="Connecteur droit avec flèche 12">
+            <a:extLst>
+              <a:ext uri="{FF2B5EF4-FFF2-40B4-BE49-F238E27FC236}">
+                <a16:creationId xmlns:a16="http://schemas.microsoft.com/office/drawing/2014/main" id="{3C258238-4645-40D4-C070-6C30F758F83A}"/>
+              </a:ext>
+            </a:extLst>
+          </p:cNvPr>
+          <p:cNvCxnSpPr>
+            <a:stCxn id="8" idx="3"/>
+            <a:endCxn id="4" idx="1"/>
+          </p:cNvCxnSpPr>
+          <p:nvPr/>
+        </p:nvCxnSpPr>
+        <p:spPr>
+          <a:xfrm>
+            <a:off x="3761509" y="4125959"/>
+            <a:ext cx="4904508" cy="0"/>
+          </a:xfrm>
+          <a:prstGeom prst="straightConnector1">
+            <a:avLst/>
+          </a:prstGeom>
+          <a:ln>
+            <a:tailEnd type="triangle"/>
+          </a:ln>
+        </p:spPr>
+        <p:style>
+          <a:lnRef idx="1">
+            <a:schemeClr val="accent1"/>
+          </a:lnRef>
+          <a:fillRef idx="0">
+            <a:schemeClr val="accent1"/>
+          </a:fillRef>
+          <a:effectRef idx="0">
+            <a:schemeClr val="accent1"/>
+          </a:effectRef>
+          <a:fontRef idx="minor">
+            <a:schemeClr val="tx1"/>
+          </a:fontRef>
+        </p:style>
+      </p:cxnSp>
+      <p:cxnSp>
+        <p:nvCxnSpPr>
+          <p:cNvPr id="14" name="Connecteur droit avec flèche 13">
+            <a:extLst>
+              <a:ext uri="{FF2B5EF4-FFF2-40B4-BE49-F238E27FC236}">
+                <a16:creationId xmlns:a16="http://schemas.microsoft.com/office/drawing/2014/main" id="{7272ECE0-9F16-4F3B-B328-05113EB720F8}"/>
+              </a:ext>
+            </a:extLst>
+          </p:cNvPr>
+          <p:cNvCxnSpPr>
+            <a:cxnSpLocks/>
+            <a:stCxn id="10" idx="3"/>
+          </p:cNvCxnSpPr>
+          <p:nvPr/>
+        </p:nvCxnSpPr>
+        <p:spPr>
+          <a:xfrm flipV="1">
+            <a:off x="3761509" y="4309891"/>
+            <a:ext cx="4904507" cy="1326745"/>
+          </a:xfrm>
+          <a:prstGeom prst="straightConnector1">
+            <a:avLst/>
+          </a:prstGeom>
+          <a:ln>
+            <a:tailEnd type="triangle"/>
+          </a:ln>
+        </p:spPr>
+        <p:style>
+          <a:lnRef idx="1">
+            <a:schemeClr val="accent1"/>
+          </a:lnRef>
+          <a:fillRef idx="0">
+            <a:schemeClr val="accent1"/>
+          </a:fillRef>
+          <a:effectRef idx="0">
+            <a:schemeClr val="accent1"/>
+          </a:effectRef>
+          <a:fontRef idx="minor">
+            <a:schemeClr val="tx1"/>
+          </a:fontRef>
+        </p:style>
+      </p:cxnSp>
+      <p:sp>
+        <p:nvSpPr>
+          <p:cNvPr id="15" name="ZoneTexte 14">
+            <a:extLst>
+              <a:ext uri="{FF2B5EF4-FFF2-40B4-BE49-F238E27FC236}">
+                <a16:creationId xmlns:a16="http://schemas.microsoft.com/office/drawing/2014/main" id="{E92B16F0-D815-3862-205B-13E4065CF474}"/>
+              </a:ext>
+            </a:extLst>
+          </p:cNvPr>
+          <p:cNvSpPr txBox="1"/>
+          <p:nvPr/>
+        </p:nvSpPr>
+        <p:spPr>
+          <a:xfrm>
+            <a:off x="5257799" y="2663534"/>
+            <a:ext cx="1911928" cy="646331"/>
+          </a:xfrm>
+          <a:prstGeom prst="rect">
+            <a:avLst/>
+          </a:prstGeom>
+          <a:noFill/>
+        </p:spPr>
+        <p:txBody>
+          <a:bodyPr wrap="square" rtlCol="0">
+            <a:spAutoFit/>
+          </a:bodyPr>
+          <a:lstStyle/>
+          <a:p>
+            <a:r>
+              <a:rPr lang="fr-FR" dirty="0"/>
+              <a:t>Je m’abonne</a:t>
+            </a:r>
+          </a:p>
+          <a:p>
+            <a:r>
+              <a:rPr lang="fr-FR" dirty="0"/>
+              <a:t>J’observe</a:t>
+            </a:r>
+          </a:p>
+        </p:txBody>
+      </p:sp>
+      <p:sp>
+        <p:nvSpPr>
+          <p:cNvPr id="16" name="ZoneTexte 15">
+            <a:extLst>
+              <a:ext uri="{FF2B5EF4-FFF2-40B4-BE49-F238E27FC236}">
+                <a16:creationId xmlns:a16="http://schemas.microsoft.com/office/drawing/2014/main" id="{A3A3771C-BBA9-3E03-3215-5DE8813BB31C}"/>
+              </a:ext>
+            </a:extLst>
+          </p:cNvPr>
+          <p:cNvSpPr txBox="1"/>
+          <p:nvPr/>
+        </p:nvSpPr>
+        <p:spPr>
+          <a:xfrm>
+            <a:off x="5257799" y="3842184"/>
+            <a:ext cx="1911928" cy="646331"/>
+          </a:xfrm>
+          <a:prstGeom prst="rect">
+            <a:avLst/>
+          </a:prstGeom>
+          <a:noFill/>
+        </p:spPr>
+        <p:txBody>
+          <a:bodyPr wrap="square" rtlCol="0">
+            <a:spAutoFit/>
+          </a:bodyPr>
+          <a:lstStyle/>
+          <a:p>
+            <a:r>
+              <a:rPr lang="fr-FR" dirty="0"/>
+              <a:t>Je m’abonne</a:t>
+            </a:r>
+          </a:p>
+          <a:p>
+            <a:r>
+              <a:rPr lang="fr-FR" dirty="0"/>
+              <a:t>J’observe</a:t>
+            </a:r>
+          </a:p>
+        </p:txBody>
+      </p:sp>
+      <p:sp>
+        <p:nvSpPr>
+          <p:cNvPr id="17" name="ZoneTexte 16">
+            <a:extLst>
+              <a:ext uri="{FF2B5EF4-FFF2-40B4-BE49-F238E27FC236}">
+                <a16:creationId xmlns:a16="http://schemas.microsoft.com/office/drawing/2014/main" id="{8D4F79E8-C64E-32AD-86E2-511E354E167B}"/>
+              </a:ext>
+            </a:extLst>
+          </p:cNvPr>
+          <p:cNvSpPr txBox="1"/>
+          <p:nvPr/>
+        </p:nvSpPr>
+        <p:spPr>
+          <a:xfrm>
+            <a:off x="5333999" y="5313469"/>
+            <a:ext cx="1911928" cy="646331"/>
+          </a:xfrm>
+          <a:prstGeom prst="rect">
+            <a:avLst/>
+          </a:prstGeom>
+          <a:noFill/>
+        </p:spPr>
+        <p:txBody>
+          <a:bodyPr wrap="square" rtlCol="0">
+            <a:spAutoFit/>
+          </a:bodyPr>
+          <a:lstStyle/>
+          <a:p>
+            <a:r>
+              <a:rPr lang="fr-FR" dirty="0"/>
+              <a:t>Je m’abonne</a:t>
+            </a:r>
+          </a:p>
+          <a:p>
+            <a:r>
+              <a:rPr lang="fr-FR" dirty="0"/>
+              <a:t>J’observe</a:t>
+            </a:r>
+          </a:p>
+        </p:txBody>
+      </p:sp>
+    </p:spTree>
+    <p:extLst>
+      <p:ext uri="{BB962C8B-B14F-4D97-AF65-F5344CB8AC3E}">
+        <p14:creationId xmlns:p14="http://schemas.microsoft.com/office/powerpoint/2010/main" val="595186413"/>
+      </p:ext>
+    </p:extLst>
+  </p:cSld>
+  <p:clrMapOvr>
+    <a:masterClrMapping/>
+  </p:clrMapOvr>
+</p:sld>
+</file>
+
+<file path=ppt/slides/slide8.xml><?xml version="1.0" encoding="utf-8"?>
 <p:sld xmlns:a="http://schemas.openxmlformats.org/drawingml/2006/main" xmlns:r="http://schemas.openxmlformats.org/officeDocument/2006/relationships" xmlns:p="http://schemas.openxmlformats.org/presentationml/2006/main">
   <p:cSld>
     <p:spTree>
@@ -4063,7 +5346,7 @@
 </p:sld>
 </file>
 
-<file path=ppt/slides/slide3.xml><?xml version="1.0" encoding="utf-8"?>
+<file path=ppt/slides/slide9.xml><?xml version="1.0" encoding="utf-8"?>
 <p:sld xmlns:a="http://schemas.openxmlformats.org/drawingml/2006/main" xmlns:r="http://schemas.openxmlformats.org/officeDocument/2006/relationships" xmlns:p="http://schemas.openxmlformats.org/presentationml/2006/main">
   <p:cSld>
     <p:spTree>

</xml_diff>

<commit_message>
Sauvegarde de fin d'après-midi
</commit_message>
<xml_diff>
--- a/106_DesignPattern/Cours/Observateur/Observateur.pptx
+++ b/106_DesignPattern/Cours/Observateur/Observateur.pptx
@@ -1526,7 +1526,7 @@
           <a:p>
             <a:fld id="{1CE5E5F1-EE6C-4DDA-A64A-4A7E1B769C0F}" type="datetimeFigureOut">
               <a:rPr lang="fr-FR" smtClean="0"/>
-              <a:t>24/07/2023</a:t>
+              <a:t>25/07/2023</a:t>
             </a:fld>
             <a:endParaRPr lang="fr-FR"/>
           </a:p>
@@ -1940,7 +1940,7 @@
           <a:p>
             <a:fld id="{38B0C165-939D-4C2D-9542-B44F6E2825A5}" type="datetime1">
               <a:rPr lang="fr-FR" smtClean="0"/>
-              <a:t>24/07/2023</a:t>
+              <a:t>25/07/2023</a:t>
             </a:fld>
             <a:endParaRPr lang="fr-FR"/>
           </a:p>
@@ -2138,7 +2138,7 @@
           <a:p>
             <a:fld id="{4F9FC5AA-3FBC-4DAA-9217-D493E9F19B50}" type="datetime1">
               <a:rPr lang="fr-FR" smtClean="0"/>
-              <a:t>24/07/2023</a:t>
+              <a:t>25/07/2023</a:t>
             </a:fld>
             <a:endParaRPr lang="fr-FR"/>
           </a:p>
@@ -2346,7 +2346,7 @@
           <a:p>
             <a:fld id="{2DF99F6D-8482-4128-8FCA-8144767BE6C4}" type="datetime1">
               <a:rPr lang="fr-FR" smtClean="0"/>
-              <a:t>24/07/2023</a:t>
+              <a:t>25/07/2023</a:t>
             </a:fld>
             <a:endParaRPr lang="fr-FR"/>
           </a:p>
@@ -2544,7 +2544,7 @@
           <a:p>
             <a:fld id="{F0653D7C-1675-4C21-9257-3FD792C1F061}" type="datetime1">
               <a:rPr lang="fr-FR" smtClean="0"/>
-              <a:t>24/07/2023</a:t>
+              <a:t>25/07/2023</a:t>
             </a:fld>
             <a:endParaRPr lang="fr-FR"/>
           </a:p>
@@ -2819,7 +2819,7 @@
           <a:p>
             <a:fld id="{F9C30F9A-3224-4398-9514-FB6D3DC5456A}" type="datetime1">
               <a:rPr lang="fr-FR" smtClean="0"/>
-              <a:t>24/07/2023</a:t>
+              <a:t>25/07/2023</a:t>
             </a:fld>
             <a:endParaRPr lang="fr-FR"/>
           </a:p>
@@ -3084,7 +3084,7 @@
           <a:p>
             <a:fld id="{46D4C119-3DB6-4E1E-8216-07E9588BE929}" type="datetime1">
               <a:rPr lang="fr-FR" smtClean="0"/>
-              <a:t>24/07/2023</a:t>
+              <a:t>25/07/2023</a:t>
             </a:fld>
             <a:endParaRPr lang="fr-FR"/>
           </a:p>
@@ -3496,7 +3496,7 @@
           <a:p>
             <a:fld id="{1852BA5F-7A06-4AD9-937A-0FD19272026B}" type="datetime1">
               <a:rPr lang="fr-FR" smtClean="0"/>
-              <a:t>24/07/2023</a:t>
+              <a:t>25/07/2023</a:t>
             </a:fld>
             <a:endParaRPr lang="fr-FR"/>
           </a:p>
@@ -3637,7 +3637,7 @@
           <a:p>
             <a:fld id="{4FA24557-93DB-4E53-B9EE-2B01B9036448}" type="datetime1">
               <a:rPr lang="fr-FR" smtClean="0"/>
-              <a:t>24/07/2023</a:t>
+              <a:t>25/07/2023</a:t>
             </a:fld>
             <a:endParaRPr lang="fr-FR"/>
           </a:p>
@@ -3750,7 +3750,7 @@
           <a:p>
             <a:fld id="{D04DBBCD-B674-42DF-BB1A-61B10D8D62B1}" type="datetime1">
               <a:rPr lang="fr-FR" smtClean="0"/>
-              <a:t>24/07/2023</a:t>
+              <a:t>25/07/2023</a:t>
             </a:fld>
             <a:endParaRPr lang="fr-FR"/>
           </a:p>
@@ -4061,7 +4061,7 @@
           <a:p>
             <a:fld id="{FDA59FD7-7F80-4DBA-AE18-9F9D2F04883B}" type="datetime1">
               <a:rPr lang="fr-FR" smtClean="0"/>
-              <a:t>24/07/2023</a:t>
+              <a:t>25/07/2023</a:t>
             </a:fld>
             <a:endParaRPr lang="fr-FR"/>
           </a:p>
@@ -4349,7 +4349,7 @@
           <a:p>
             <a:fld id="{0CB3865D-A881-4B26-98D6-CFA577E18C24}" type="datetime1">
               <a:rPr lang="fr-FR" smtClean="0"/>
-              <a:t>24/07/2023</a:t>
+              <a:t>25/07/2023</a:t>
             </a:fld>
             <a:endParaRPr lang="fr-FR"/>
           </a:p>
@@ -4590,7 +4590,7 @@
           <a:p>
             <a:fld id="{8DD68F64-9063-4BFC-8B75-EB614AD88861}" type="datetime1">
               <a:rPr lang="fr-FR" smtClean="0"/>
-              <a:t>24/07/2023</a:t>
+              <a:t>25/07/2023</a:t>
             </a:fld>
             <a:endParaRPr lang="fr-FR"/>
           </a:p>
@@ -5984,10 +5984,10 @@
       </p:sp>
       <p:pic>
         <p:nvPicPr>
-          <p:cNvPr id="5" name="Image 4" descr="Une image contenant texte, capture d’écran, ligne, Police&#10;&#10;Description générée automatiquement">
-            <a:extLst>
-              <a:ext uri="{FF2B5EF4-FFF2-40B4-BE49-F238E27FC236}">
-                <a16:creationId xmlns:a16="http://schemas.microsoft.com/office/drawing/2014/main" id="{EF6620BC-D60D-C08D-5187-DECBD9E3EB95}"/>
+          <p:cNvPr id="7" name="Image 6" descr="Une image contenant texte, capture d’écran, ligne, Police&#10;&#10;Description générée automatiquement">
+            <a:extLst>
+              <a:ext uri="{FF2B5EF4-FFF2-40B4-BE49-F238E27FC236}">
+                <a16:creationId xmlns:a16="http://schemas.microsoft.com/office/drawing/2014/main" id="{97C8193F-3603-1FDB-FBD7-7FE48941053B}"/>
               </a:ext>
             </a:extLst>
           </p:cNvPr>
@@ -6010,8 +6010,8 @@
         </p:blipFill>
         <p:spPr>
           <a:xfrm>
-            <a:off x="597567" y="1819465"/>
-            <a:ext cx="11234367" cy="5046996"/>
+            <a:off x="437782" y="1819465"/>
+            <a:ext cx="11316435" cy="5038535"/>
           </a:xfrm>
           <a:prstGeom prst="rect">
             <a:avLst/>
@@ -10330,42 +10330,6 @@
           </a:p>
         </p:txBody>
       </p:sp>
-      <p:pic>
-        <p:nvPicPr>
-          <p:cNvPr id="5" name="Image 4">
-            <a:extLst>
-              <a:ext uri="{FF2B5EF4-FFF2-40B4-BE49-F238E27FC236}">
-                <a16:creationId xmlns:a16="http://schemas.microsoft.com/office/drawing/2014/main" id="{55331BB3-947F-C9C8-B1F1-B897F59AB759}"/>
-              </a:ext>
-            </a:extLst>
-          </p:cNvPr>
-          <p:cNvPicPr>
-            <a:picLocks noChangeAspect="1"/>
-          </p:cNvPicPr>
-          <p:nvPr/>
-        </p:nvPicPr>
-        <p:blipFill>
-          <a:blip r:embed="rId2">
-            <a:extLst>
-              <a:ext uri="{28A0092B-C50C-407E-A947-70E740481C1C}">
-                <a14:useLocalDpi xmlns:a14="http://schemas.microsoft.com/office/drawing/2010/main" val="0"/>
-              </a:ext>
-            </a:extLst>
-          </a:blip>
-          <a:stretch>
-            <a:fillRect/>
-          </a:stretch>
-        </p:blipFill>
-        <p:spPr>
-          <a:xfrm>
-            <a:off x="4537208" y="1690688"/>
-            <a:ext cx="4799297" cy="4545030"/>
-          </a:xfrm>
-          <a:prstGeom prst="rect">
-            <a:avLst/>
-          </a:prstGeom>
-        </p:spPr>
-      </p:pic>
       <p:sp>
         <p:nvSpPr>
           <p:cNvPr id="4" name="Espace réservé du numéro de diapositive 3">
@@ -10407,6 +10371,42 @@
           </a:p>
         </p:txBody>
       </p:sp>
+      <p:pic>
+        <p:nvPicPr>
+          <p:cNvPr id="7" name="Image 6" descr="Une image contenant texte, capture d’écran, Police, ligne&#10;&#10;Description générée automatiquement">
+            <a:extLst>
+              <a:ext uri="{FF2B5EF4-FFF2-40B4-BE49-F238E27FC236}">
+                <a16:creationId xmlns:a16="http://schemas.microsoft.com/office/drawing/2014/main" id="{AC38561D-9341-AD6B-5FC9-1A2BE032F373}"/>
+              </a:ext>
+            </a:extLst>
+          </p:cNvPr>
+          <p:cNvPicPr>
+            <a:picLocks noChangeAspect="1"/>
+          </p:cNvPicPr>
+          <p:nvPr/>
+        </p:nvPicPr>
+        <p:blipFill>
+          <a:blip r:embed="rId2">
+            <a:extLst>
+              <a:ext uri="{28A0092B-C50C-407E-A947-70E740481C1C}">
+                <a14:useLocalDpi xmlns:a14="http://schemas.microsoft.com/office/drawing/2010/main" val="0"/>
+              </a:ext>
+            </a:extLst>
+          </a:blip>
+          <a:stretch>
+            <a:fillRect/>
+          </a:stretch>
+        </p:blipFill>
+        <p:spPr>
+          <a:xfrm>
+            <a:off x="4716255" y="1825625"/>
+            <a:ext cx="4714071" cy="4380600"/>
+          </a:xfrm>
+          <a:prstGeom prst="rect">
+            <a:avLst/>
+          </a:prstGeom>
+        </p:spPr>
+      </p:pic>
     </p:spTree>
     <p:extLst>
       <p:ext uri="{BB962C8B-B14F-4D97-AF65-F5344CB8AC3E}">

</xml_diff>